<commit_message>
Updated the PowerPoint presentation
</commit_message>
<xml_diff>
--- a/DesignPatterns101.pptx
+++ b/DesignPatterns101.pptx
@@ -6,7 +6,22 @@
   </p:sldMasterIdLst>
   <p:sldIdLst>
     <p:sldId id="256" r:id="rId2"/>
-    <p:sldId id="257" r:id="rId3"/>
+    <p:sldId id="258" r:id="rId3"/>
+    <p:sldId id="257" r:id="rId4"/>
+    <p:sldId id="259" r:id="rId5"/>
+    <p:sldId id="260" r:id="rId6"/>
+    <p:sldId id="263" r:id="rId7"/>
+    <p:sldId id="261" r:id="rId8"/>
+    <p:sldId id="262" r:id="rId9"/>
+    <p:sldId id="264" r:id="rId10"/>
+    <p:sldId id="265" r:id="rId11"/>
+    <p:sldId id="266" r:id="rId12"/>
+    <p:sldId id="267" r:id="rId13"/>
+    <p:sldId id="268" r:id="rId14"/>
+    <p:sldId id="269" r:id="rId15"/>
+    <p:sldId id="270" r:id="rId16"/>
+    <p:sldId id="271" r:id="rId17"/>
+    <p:sldId id="272" r:id="rId18"/>
   </p:sldIdLst>
   <p:sldSz cx="12192000" cy="6858000"/>
   <p:notesSz cx="6858000" cy="9144000"/>
@@ -105,6 +120,11 @@
       </a:defRPr>
     </a:lvl9pPr>
   </p:defaultTextStyle>
+  <p:extLst>
+    <p:ext uri="{EFAFB233-063F-42B5-8137-9DF3F51BA10A}">
+      <p15:sldGuideLst xmlns:p15="http://schemas.microsoft.com/office/powerpoint/2012/main"/>
+    </p:ext>
+  </p:extLst>
 </p:presentation>
 </file>
 
@@ -239,7 +259,7 @@
           <a:p>
             <a:fld id="{3C4E0F72-D2FF-4111-90E8-951B982DCE49}" type="datetimeFigureOut">
               <a:rPr lang="en-CA" smtClean="0"/>
-              <a:t>2014-10-23</a:t>
+              <a:t>2014-10-24</a:t>
             </a:fld>
             <a:endParaRPr lang="en-CA"/>
           </a:p>
@@ -409,7 +429,7 @@
           <a:p>
             <a:fld id="{3C4E0F72-D2FF-4111-90E8-951B982DCE49}" type="datetimeFigureOut">
               <a:rPr lang="en-CA" smtClean="0"/>
-              <a:t>2014-10-23</a:t>
+              <a:t>2014-10-24</a:t>
             </a:fld>
             <a:endParaRPr lang="en-CA"/>
           </a:p>
@@ -589,7 +609,7 @@
           <a:p>
             <a:fld id="{3C4E0F72-D2FF-4111-90E8-951B982DCE49}" type="datetimeFigureOut">
               <a:rPr lang="en-CA" smtClean="0"/>
-              <a:t>2014-10-23</a:t>
+              <a:t>2014-10-24</a:t>
             </a:fld>
             <a:endParaRPr lang="en-CA"/>
           </a:p>
@@ -759,7 +779,7 @@
           <a:p>
             <a:fld id="{3C4E0F72-D2FF-4111-90E8-951B982DCE49}" type="datetimeFigureOut">
               <a:rPr lang="en-CA" smtClean="0"/>
-              <a:t>2014-10-23</a:t>
+              <a:t>2014-10-24</a:t>
             </a:fld>
             <a:endParaRPr lang="en-CA"/>
           </a:p>
@@ -1005,7 +1025,7 @@
           <a:p>
             <a:fld id="{3C4E0F72-D2FF-4111-90E8-951B982DCE49}" type="datetimeFigureOut">
               <a:rPr lang="en-CA" smtClean="0"/>
-              <a:t>2014-10-23</a:t>
+              <a:t>2014-10-24</a:t>
             </a:fld>
             <a:endParaRPr lang="en-CA"/>
           </a:p>
@@ -1237,7 +1257,7 @@
           <a:p>
             <a:fld id="{3C4E0F72-D2FF-4111-90E8-951B982DCE49}" type="datetimeFigureOut">
               <a:rPr lang="en-CA" smtClean="0"/>
-              <a:t>2014-10-23</a:t>
+              <a:t>2014-10-24</a:t>
             </a:fld>
             <a:endParaRPr lang="en-CA"/>
           </a:p>
@@ -1604,7 +1624,7 @@
           <a:p>
             <a:fld id="{3C4E0F72-D2FF-4111-90E8-951B982DCE49}" type="datetimeFigureOut">
               <a:rPr lang="en-CA" smtClean="0"/>
-              <a:t>2014-10-23</a:t>
+              <a:t>2014-10-24</a:t>
             </a:fld>
             <a:endParaRPr lang="en-CA"/>
           </a:p>
@@ -1722,7 +1742,7 @@
           <a:p>
             <a:fld id="{3C4E0F72-D2FF-4111-90E8-951B982DCE49}" type="datetimeFigureOut">
               <a:rPr lang="en-CA" smtClean="0"/>
-              <a:t>2014-10-23</a:t>
+              <a:t>2014-10-24</a:t>
             </a:fld>
             <a:endParaRPr lang="en-CA"/>
           </a:p>
@@ -1817,7 +1837,7 @@
           <a:p>
             <a:fld id="{3C4E0F72-D2FF-4111-90E8-951B982DCE49}" type="datetimeFigureOut">
               <a:rPr lang="en-CA" smtClean="0"/>
-              <a:t>2014-10-23</a:t>
+              <a:t>2014-10-24</a:t>
             </a:fld>
             <a:endParaRPr lang="en-CA"/>
           </a:p>
@@ -2094,7 +2114,7 @@
           <a:p>
             <a:fld id="{3C4E0F72-D2FF-4111-90E8-951B982DCE49}" type="datetimeFigureOut">
               <a:rPr lang="en-CA" smtClean="0"/>
-              <a:t>2014-10-23</a:t>
+              <a:t>2014-10-24</a:t>
             </a:fld>
             <a:endParaRPr lang="en-CA"/>
           </a:p>
@@ -2347,7 +2367,7 @@
           <a:p>
             <a:fld id="{3C4E0F72-D2FF-4111-90E8-951B982DCE49}" type="datetimeFigureOut">
               <a:rPr lang="en-CA" smtClean="0"/>
-              <a:t>2014-10-23</a:t>
+              <a:t>2014-10-24</a:t>
             </a:fld>
             <a:endParaRPr lang="en-CA"/>
           </a:p>
@@ -2560,7 +2580,7 @@
           <a:p>
             <a:fld id="{3C4E0F72-D2FF-4111-90E8-951B982DCE49}" type="datetimeFigureOut">
               <a:rPr lang="en-CA" smtClean="0"/>
-              <a:t>2014-10-23</a:t>
+              <a:t>2014-10-24</a:t>
             </a:fld>
             <a:endParaRPr lang="en-CA"/>
           </a:p>
@@ -3008,6 +3028,1071 @@
 </p:sld>
 </file>
 
+<file path=ppt/slides/slide10.xml><?xml version="1.0" encoding="utf-8"?>
+<p:sld xmlns:a="http://schemas.openxmlformats.org/drawingml/2006/main" xmlns:r="http://schemas.openxmlformats.org/officeDocument/2006/relationships" xmlns:p="http://schemas.openxmlformats.org/presentationml/2006/main">
+  <p:cSld>
+    <p:spTree>
+      <p:nvGrpSpPr>
+        <p:cNvPr id="1" name=""/>
+        <p:cNvGrpSpPr/>
+        <p:nvPr/>
+      </p:nvGrpSpPr>
+      <p:grpSpPr>
+        <a:xfrm>
+          <a:off x="0" y="0"/>
+          <a:ext cx="0" cy="0"/>
+          <a:chOff x="0" y="0"/>
+          <a:chExt cx="0" cy="0"/>
+        </a:xfrm>
+      </p:grpSpPr>
+      <p:sp>
+        <p:nvSpPr>
+          <p:cNvPr id="2" name="TextBox 1"/>
+          <p:cNvSpPr txBox="1"/>
+          <p:nvPr/>
+        </p:nvSpPr>
+        <p:spPr>
+          <a:xfrm>
+            <a:off x="0" y="-3025"/>
+            <a:ext cx="11467070" cy="769441"/>
+          </a:xfrm>
+          <a:prstGeom prst="rect">
+            <a:avLst/>
+          </a:prstGeom>
+          <a:noFill/>
+        </p:spPr>
+        <p:txBody>
+          <a:bodyPr wrap="square" rtlCol="0">
+            <a:spAutoFit/>
+          </a:bodyPr>
+          <a:lstStyle/>
+          <a:p>
+            <a:r>
+              <a:rPr lang="en-CA" sz="4400" dirty="0" smtClean="0"/>
+              <a:t>Design Patterns Structure</a:t>
+            </a:r>
+            <a:endParaRPr lang="en-CA" sz="4400" dirty="0"/>
+          </a:p>
+        </p:txBody>
+      </p:sp>
+      <p:grpSp>
+        <p:nvGrpSpPr>
+          <p:cNvPr id="13" name="Group 12"/>
+          <p:cNvGrpSpPr/>
+          <p:nvPr/>
+        </p:nvGrpSpPr>
+        <p:grpSpPr>
+          <a:xfrm>
+            <a:off x="667265" y="1005002"/>
+            <a:ext cx="10354966" cy="5568795"/>
+            <a:chOff x="667265" y="1005002"/>
+            <a:chExt cx="10354966" cy="5568795"/>
+          </a:xfrm>
+        </p:grpSpPr>
+        <p:grpSp>
+          <p:nvGrpSpPr>
+            <p:cNvPr id="10" name="Group 9"/>
+            <p:cNvGrpSpPr/>
+            <p:nvPr/>
+          </p:nvGrpSpPr>
+          <p:grpSpPr>
+            <a:xfrm>
+              <a:off x="667265" y="1005002"/>
+              <a:ext cx="3122142" cy="3139170"/>
+              <a:chOff x="667265" y="1005002"/>
+              <a:chExt cx="3122142" cy="3139170"/>
+            </a:xfrm>
+          </p:grpSpPr>
+          <p:sp>
+            <p:nvSpPr>
+              <p:cNvPr id="3" name="TextBox 2"/>
+              <p:cNvSpPr txBox="1"/>
+              <p:nvPr/>
+            </p:nvSpPr>
+            <p:spPr>
+              <a:xfrm>
+                <a:off x="667265" y="1622545"/>
+                <a:ext cx="3122142" cy="2521627"/>
+              </a:xfrm>
+              <a:prstGeom prst="rect">
+                <a:avLst/>
+              </a:prstGeom>
+              <a:noFill/>
+            </p:spPr>
+            <p:txBody>
+              <a:bodyPr wrap="square" rtlCol="0">
+                <a:spAutoFit/>
+              </a:bodyPr>
+              <a:lstStyle/>
+              <a:p>
+                <a:pPr marL="285750" indent="-285750">
+                  <a:buFont typeface="Arial" panose="020B0604020202020204" pitchFamily="34" charset="0"/>
+                  <a:buChar char="•"/>
+                </a:pPr>
+                <a:r>
+                  <a:rPr lang="en-CA" sz="2800" dirty="0" smtClean="0"/>
+                  <a:t>Abstract Factory</a:t>
+                </a:r>
+                <a:endParaRPr lang="en-CA" sz="2800" dirty="0" smtClean="0"/>
+              </a:p>
+              <a:p>
+                <a:pPr marL="285750" indent="-285750">
+                  <a:buFont typeface="Arial" panose="020B0604020202020204" pitchFamily="34" charset="0"/>
+                  <a:buChar char="•"/>
+                </a:pPr>
+                <a:r>
+                  <a:rPr lang="en-CA" sz="2800" dirty="0" smtClean="0"/>
+                  <a:t>Factory Method</a:t>
+                </a:r>
+              </a:p>
+              <a:p>
+                <a:pPr marL="285750" indent="-285750">
+                  <a:buFont typeface="Arial" panose="020B0604020202020204" pitchFamily="34" charset="0"/>
+                  <a:buChar char="•"/>
+                </a:pPr>
+                <a:r>
+                  <a:rPr lang="en-CA" sz="2800" dirty="0" smtClean="0"/>
+                  <a:t>Builder </a:t>
+                </a:r>
+              </a:p>
+              <a:p>
+                <a:pPr marL="285750" indent="-285750">
+                  <a:buFont typeface="Arial" panose="020B0604020202020204" pitchFamily="34" charset="0"/>
+                  <a:buChar char="•"/>
+                </a:pPr>
+                <a:r>
+                  <a:rPr lang="en-CA" sz="2800" dirty="0" smtClean="0"/>
+                  <a:t>Prototype  </a:t>
+                </a:r>
+                <a:endParaRPr lang="en-CA" sz="2800" dirty="0" smtClean="0"/>
+              </a:p>
+              <a:p>
+                <a:pPr marL="285750" indent="-285750">
+                  <a:buFont typeface="Arial" panose="020B0604020202020204" pitchFamily="34" charset="0"/>
+                  <a:buChar char="•"/>
+                </a:pPr>
+                <a:r>
+                  <a:rPr lang="en-CA" sz="2800" dirty="0" smtClean="0"/>
+                  <a:t>Singleton</a:t>
+                </a:r>
+                <a:endParaRPr lang="en-CA" sz="2800" dirty="0" smtClean="0"/>
+              </a:p>
+              <a:p>
+                <a:pPr marL="285750" indent="-285750">
+                  <a:buFont typeface="Arial" panose="020B0604020202020204" pitchFamily="34" charset="0"/>
+                  <a:buChar char="•"/>
+                </a:pPr>
+                <a:endParaRPr lang="en-CA" sz="2800" dirty="0" smtClean="0"/>
+              </a:p>
+            </p:txBody>
+          </p:sp>
+          <p:sp>
+            <p:nvSpPr>
+              <p:cNvPr id="7" name="TextBox 6"/>
+              <p:cNvSpPr txBox="1"/>
+              <p:nvPr/>
+            </p:nvSpPr>
+            <p:spPr>
+              <a:xfrm>
+                <a:off x="798893" y="1005002"/>
+                <a:ext cx="2154885" cy="646331"/>
+              </a:xfrm>
+              <a:prstGeom prst="rect">
+                <a:avLst/>
+              </a:prstGeom>
+              <a:noFill/>
+            </p:spPr>
+            <p:txBody>
+              <a:bodyPr wrap="none" rtlCol="0">
+                <a:spAutoFit/>
+              </a:bodyPr>
+              <a:lstStyle/>
+              <a:p>
+                <a:r>
+                  <a:rPr lang="en-CA" sz="3600" b="1" dirty="0" smtClean="0"/>
+                  <a:t>Creational</a:t>
+                </a:r>
+                <a:endParaRPr lang="en-CA" b="1" dirty="0"/>
+              </a:p>
+            </p:txBody>
+          </p:sp>
+        </p:grpSp>
+        <p:grpSp>
+          <p:nvGrpSpPr>
+            <p:cNvPr id="11" name="Group 10"/>
+            <p:cNvGrpSpPr/>
+            <p:nvPr/>
+          </p:nvGrpSpPr>
+          <p:grpSpPr>
+            <a:xfrm>
+              <a:off x="4226014" y="1005002"/>
+              <a:ext cx="3122142" cy="3948203"/>
+              <a:chOff x="4226014" y="1005002"/>
+              <a:chExt cx="3122142" cy="3948203"/>
+            </a:xfrm>
+          </p:grpSpPr>
+          <p:sp>
+            <p:nvSpPr>
+              <p:cNvPr id="4" name="TextBox 3"/>
+              <p:cNvSpPr txBox="1"/>
+              <p:nvPr/>
+            </p:nvSpPr>
+            <p:spPr>
+              <a:xfrm>
+                <a:off x="4226014" y="1620020"/>
+                <a:ext cx="3122142" cy="3333185"/>
+              </a:xfrm>
+              <a:prstGeom prst="rect">
+                <a:avLst/>
+              </a:prstGeom>
+              <a:noFill/>
+            </p:spPr>
+            <p:txBody>
+              <a:bodyPr wrap="square" rtlCol="0">
+                <a:spAutoFit/>
+              </a:bodyPr>
+              <a:lstStyle/>
+              <a:p>
+                <a:pPr marL="285750" indent="-285750">
+                  <a:buFont typeface="Arial" panose="020B0604020202020204" pitchFamily="34" charset="0"/>
+                  <a:buChar char="•"/>
+                </a:pPr>
+                <a:r>
+                  <a:rPr lang="en-CA" sz="2800" dirty="0" smtClean="0"/>
+                  <a:t>Adapter</a:t>
+                </a:r>
+                <a:endParaRPr lang="en-CA" sz="2800" dirty="0" smtClean="0"/>
+              </a:p>
+              <a:p>
+                <a:pPr marL="285750" indent="-285750">
+                  <a:buFont typeface="Arial" panose="020B0604020202020204" pitchFamily="34" charset="0"/>
+                  <a:buChar char="•"/>
+                </a:pPr>
+                <a:r>
+                  <a:rPr lang="en-CA" sz="2800" dirty="0" smtClean="0"/>
+                  <a:t>Bridge</a:t>
+                </a:r>
+              </a:p>
+              <a:p>
+                <a:pPr marL="285750" indent="-285750">
+                  <a:buFont typeface="Arial" panose="020B0604020202020204" pitchFamily="34" charset="0"/>
+                  <a:buChar char="•"/>
+                </a:pPr>
+                <a:r>
+                  <a:rPr lang="en-CA" sz="2800" dirty="0" smtClean="0"/>
+                  <a:t>Composite</a:t>
+                </a:r>
+              </a:p>
+              <a:p>
+                <a:pPr marL="285750" indent="-285750">
+                  <a:buFont typeface="Arial" panose="020B0604020202020204" pitchFamily="34" charset="0"/>
+                  <a:buChar char="•"/>
+                </a:pPr>
+                <a:r>
+                  <a:rPr lang="en-CA" sz="2800" dirty="0" smtClean="0"/>
+                  <a:t>Decorator  </a:t>
+                </a:r>
+                <a:endParaRPr lang="en-CA" sz="2800" dirty="0" smtClean="0"/>
+              </a:p>
+              <a:p>
+                <a:pPr marL="285750" indent="-285750">
+                  <a:buFont typeface="Arial" panose="020B0604020202020204" pitchFamily="34" charset="0"/>
+                  <a:buChar char="•"/>
+                </a:pPr>
+                <a:r>
+                  <a:rPr lang="en-CA" sz="2800" dirty="0" smtClean="0"/>
+                  <a:t>Facade</a:t>
+                </a:r>
+              </a:p>
+              <a:p>
+                <a:pPr marL="285750" indent="-285750">
+                  <a:buFont typeface="Arial" panose="020B0604020202020204" pitchFamily="34" charset="0"/>
+                  <a:buChar char="•"/>
+                </a:pPr>
+                <a:r>
+                  <a:rPr lang="en-CA" sz="2800" dirty="0" smtClean="0"/>
+                  <a:t>Flyweight</a:t>
+                </a:r>
+              </a:p>
+              <a:p>
+                <a:pPr marL="285750" indent="-285750">
+                  <a:buFont typeface="Arial" panose="020B0604020202020204" pitchFamily="34" charset="0"/>
+                  <a:buChar char="•"/>
+                </a:pPr>
+                <a:r>
+                  <a:rPr lang="en-CA" sz="2800" dirty="0" smtClean="0"/>
+                  <a:t>Proxy</a:t>
+                </a:r>
+                <a:endParaRPr lang="en-CA" sz="2800" dirty="0" smtClean="0"/>
+              </a:p>
+              <a:p>
+                <a:pPr marL="285750" indent="-285750">
+                  <a:buFont typeface="Arial" panose="020B0604020202020204" pitchFamily="34" charset="0"/>
+                  <a:buChar char="•"/>
+                </a:pPr>
+                <a:endParaRPr lang="en-CA" sz="2800" dirty="0" smtClean="0"/>
+              </a:p>
+            </p:txBody>
+          </p:sp>
+          <p:sp>
+            <p:nvSpPr>
+              <p:cNvPr id="8" name="TextBox 7"/>
+              <p:cNvSpPr txBox="1"/>
+              <p:nvPr/>
+            </p:nvSpPr>
+            <p:spPr>
+              <a:xfrm>
+                <a:off x="4413080" y="1005002"/>
+                <a:ext cx="2072490" cy="646331"/>
+              </a:xfrm>
+              <a:prstGeom prst="rect">
+                <a:avLst/>
+              </a:prstGeom>
+              <a:noFill/>
+            </p:spPr>
+            <p:txBody>
+              <a:bodyPr wrap="none" rtlCol="0">
+                <a:spAutoFit/>
+              </a:bodyPr>
+              <a:lstStyle/>
+              <a:p>
+                <a:r>
+                  <a:rPr lang="en-CA" sz="3600" b="1" dirty="0" smtClean="0"/>
+                  <a:t>Structural</a:t>
+                </a:r>
+                <a:endParaRPr lang="en-CA" b="1" dirty="0"/>
+              </a:p>
+            </p:txBody>
+          </p:sp>
+        </p:grpSp>
+        <p:grpSp>
+          <p:nvGrpSpPr>
+            <p:cNvPr id="12" name="Group 11"/>
+            <p:cNvGrpSpPr/>
+            <p:nvPr/>
+          </p:nvGrpSpPr>
+          <p:grpSpPr>
+            <a:xfrm>
+              <a:off x="7900089" y="1005002"/>
+              <a:ext cx="3122142" cy="5568795"/>
+              <a:chOff x="7900089" y="1005002"/>
+              <a:chExt cx="3122142" cy="5568795"/>
+            </a:xfrm>
+          </p:grpSpPr>
+          <p:sp>
+            <p:nvSpPr>
+              <p:cNvPr id="5" name="TextBox 4"/>
+              <p:cNvSpPr txBox="1"/>
+              <p:nvPr/>
+            </p:nvSpPr>
+            <p:spPr>
+              <a:xfrm>
+                <a:off x="7900089" y="1617495"/>
+                <a:ext cx="3122142" cy="4956302"/>
+              </a:xfrm>
+              <a:prstGeom prst="rect">
+                <a:avLst/>
+              </a:prstGeom>
+              <a:noFill/>
+            </p:spPr>
+            <p:txBody>
+              <a:bodyPr wrap="square" rtlCol="0">
+                <a:spAutoFit/>
+              </a:bodyPr>
+              <a:lstStyle/>
+              <a:p>
+                <a:pPr marL="285750" indent="-285750">
+                  <a:buFont typeface="Arial" panose="020B0604020202020204" pitchFamily="34" charset="0"/>
+                  <a:buChar char="•"/>
+                </a:pPr>
+                <a:r>
+                  <a:rPr lang="en-CA" sz="2800" dirty="0" smtClean="0"/>
+                  <a:t>Chain of Resp.</a:t>
+                </a:r>
+                <a:endParaRPr lang="en-CA" sz="2800" dirty="0" smtClean="0"/>
+              </a:p>
+              <a:p>
+                <a:pPr marL="285750" indent="-285750">
+                  <a:buFont typeface="Arial" panose="020B0604020202020204" pitchFamily="34" charset="0"/>
+                  <a:buChar char="•"/>
+                </a:pPr>
+                <a:r>
+                  <a:rPr lang="en-CA" sz="2800" dirty="0" smtClean="0"/>
+                  <a:t>Command</a:t>
+                </a:r>
+              </a:p>
+              <a:p>
+                <a:pPr marL="285750" indent="-285750">
+                  <a:buFont typeface="Arial" panose="020B0604020202020204" pitchFamily="34" charset="0"/>
+                  <a:buChar char="•"/>
+                </a:pPr>
+                <a:r>
+                  <a:rPr lang="en-CA" sz="2800" dirty="0" smtClean="0"/>
+                  <a:t>Interpreter </a:t>
+                </a:r>
+              </a:p>
+              <a:p>
+                <a:pPr marL="285750" indent="-285750">
+                  <a:buFont typeface="Arial" panose="020B0604020202020204" pitchFamily="34" charset="0"/>
+                  <a:buChar char="•"/>
+                </a:pPr>
+                <a:r>
+                  <a:rPr lang="en-CA" sz="2800" dirty="0" smtClean="0"/>
+                  <a:t>Iterator</a:t>
+                </a:r>
+                <a:endParaRPr lang="en-CA" sz="2800" dirty="0" smtClean="0"/>
+              </a:p>
+              <a:p>
+                <a:pPr marL="285750" indent="-285750">
+                  <a:buFont typeface="Arial" panose="020B0604020202020204" pitchFamily="34" charset="0"/>
+                  <a:buChar char="•"/>
+                </a:pPr>
+                <a:r>
+                  <a:rPr lang="en-CA" sz="2800" dirty="0" smtClean="0"/>
+                  <a:t>Mediator</a:t>
+                </a:r>
+                <a:endParaRPr lang="en-CA" sz="2800" dirty="0" smtClean="0"/>
+              </a:p>
+              <a:p>
+                <a:pPr marL="285750" indent="-285750">
+                  <a:buFont typeface="Arial" panose="020B0604020202020204" pitchFamily="34" charset="0"/>
+                  <a:buChar char="•"/>
+                </a:pPr>
+                <a:r>
+                  <a:rPr lang="en-CA" sz="2800" dirty="0" smtClean="0"/>
+                  <a:t>Memento</a:t>
+                </a:r>
+              </a:p>
+              <a:p>
+                <a:pPr marL="285750" indent="-285750">
+                  <a:buFont typeface="Arial" panose="020B0604020202020204" pitchFamily="34" charset="0"/>
+                  <a:buChar char="•"/>
+                </a:pPr>
+                <a:r>
+                  <a:rPr lang="en-CA" sz="2800" dirty="0" smtClean="0"/>
+                  <a:t>Observer</a:t>
+                </a:r>
+              </a:p>
+              <a:p>
+                <a:pPr marL="285750" indent="-285750">
+                  <a:buFont typeface="Arial" panose="020B0604020202020204" pitchFamily="34" charset="0"/>
+                  <a:buChar char="•"/>
+                </a:pPr>
+                <a:r>
+                  <a:rPr lang="en-CA" sz="2800" dirty="0" smtClean="0"/>
+                  <a:t>State</a:t>
+                </a:r>
+              </a:p>
+              <a:p>
+                <a:pPr marL="285750" indent="-285750">
+                  <a:buFont typeface="Arial" panose="020B0604020202020204" pitchFamily="34" charset="0"/>
+                  <a:buChar char="•"/>
+                </a:pPr>
+                <a:r>
+                  <a:rPr lang="en-CA" sz="2800" dirty="0" smtClean="0"/>
+                  <a:t>Strategy</a:t>
+                </a:r>
+              </a:p>
+              <a:p>
+                <a:pPr marL="285750" indent="-285750">
+                  <a:buFont typeface="Arial" panose="020B0604020202020204" pitchFamily="34" charset="0"/>
+                  <a:buChar char="•"/>
+                </a:pPr>
+                <a:r>
+                  <a:rPr lang="en-CA" sz="2800" dirty="0" smtClean="0"/>
+                  <a:t>Template Method</a:t>
+                </a:r>
+              </a:p>
+              <a:p>
+                <a:pPr marL="285750" indent="-285750">
+                  <a:buFont typeface="Arial" panose="020B0604020202020204" pitchFamily="34" charset="0"/>
+                  <a:buChar char="•"/>
+                </a:pPr>
+                <a:r>
+                  <a:rPr lang="en-CA" sz="2800" dirty="0" smtClean="0"/>
+                  <a:t>Visitor</a:t>
+                </a:r>
+                <a:endParaRPr lang="en-CA" sz="2800" dirty="0" smtClean="0"/>
+              </a:p>
+              <a:p>
+                <a:pPr marL="285750" indent="-285750">
+                  <a:buFont typeface="Arial" panose="020B0604020202020204" pitchFamily="34" charset="0"/>
+                  <a:buChar char="•"/>
+                </a:pPr>
+                <a:endParaRPr lang="en-CA" sz="2800" dirty="0" smtClean="0"/>
+              </a:p>
+            </p:txBody>
+          </p:sp>
+          <p:sp>
+            <p:nvSpPr>
+              <p:cNvPr id="9" name="TextBox 8"/>
+              <p:cNvSpPr txBox="1"/>
+              <p:nvPr/>
+            </p:nvSpPr>
+            <p:spPr>
+              <a:xfrm>
+                <a:off x="8087155" y="1005002"/>
+                <a:ext cx="2219838" cy="646331"/>
+              </a:xfrm>
+              <a:prstGeom prst="rect">
+                <a:avLst/>
+              </a:prstGeom>
+              <a:noFill/>
+            </p:spPr>
+            <p:txBody>
+              <a:bodyPr wrap="none" rtlCol="0">
+                <a:spAutoFit/>
+              </a:bodyPr>
+              <a:lstStyle/>
+              <a:p>
+                <a:r>
+                  <a:rPr lang="en-CA" sz="3600" b="1" dirty="0" smtClean="0"/>
+                  <a:t>Behavioral</a:t>
+                </a:r>
+                <a:endParaRPr lang="en-CA" b="1" dirty="0"/>
+              </a:p>
+            </p:txBody>
+          </p:sp>
+        </p:grpSp>
+      </p:grpSp>
+    </p:spTree>
+    <p:extLst>
+      <p:ext uri="{BB962C8B-B14F-4D97-AF65-F5344CB8AC3E}">
+        <p14:creationId xmlns:p14="http://schemas.microsoft.com/office/powerpoint/2010/main" val="2910375621"/>
+      </p:ext>
+    </p:extLst>
+  </p:cSld>
+  <p:clrMapOvr>
+    <a:masterClrMapping/>
+  </p:clrMapOvr>
+</p:sld>
+</file>
+
+<file path=ppt/slides/slide11.xml><?xml version="1.0" encoding="utf-8"?>
+<p:sld xmlns:a="http://schemas.openxmlformats.org/drawingml/2006/main" xmlns:r="http://schemas.openxmlformats.org/officeDocument/2006/relationships" xmlns:p="http://schemas.openxmlformats.org/presentationml/2006/main">
+  <p:cSld>
+    <p:spTree>
+      <p:nvGrpSpPr>
+        <p:cNvPr id="1" name=""/>
+        <p:cNvGrpSpPr/>
+        <p:nvPr/>
+      </p:nvGrpSpPr>
+      <p:grpSpPr>
+        <a:xfrm>
+          <a:off x="0" y="0"/>
+          <a:ext cx="0" cy="0"/>
+          <a:chOff x="0" y="0"/>
+          <a:chExt cx="0" cy="0"/>
+        </a:xfrm>
+      </p:grpSpPr>
+      <p:sp>
+        <p:nvSpPr>
+          <p:cNvPr id="2" name="TextBox 1"/>
+          <p:cNvSpPr txBox="1"/>
+          <p:nvPr/>
+        </p:nvSpPr>
+        <p:spPr>
+          <a:xfrm>
+            <a:off x="0" y="-3025"/>
+            <a:ext cx="11467070" cy="769441"/>
+          </a:xfrm>
+          <a:prstGeom prst="rect">
+            <a:avLst/>
+          </a:prstGeom>
+          <a:noFill/>
+        </p:spPr>
+        <p:txBody>
+          <a:bodyPr wrap="square" rtlCol="0">
+            <a:spAutoFit/>
+          </a:bodyPr>
+          <a:lstStyle/>
+          <a:p>
+            <a:r>
+              <a:rPr lang="en-CA" sz="4400" dirty="0" smtClean="0"/>
+              <a:t>Most commonly used</a:t>
+            </a:r>
+            <a:endParaRPr lang="en-CA" sz="4400" dirty="0"/>
+          </a:p>
+        </p:txBody>
+      </p:sp>
+      <p:sp>
+        <p:nvSpPr>
+          <p:cNvPr id="3" name="TextBox 2"/>
+          <p:cNvSpPr txBox="1"/>
+          <p:nvPr/>
+        </p:nvSpPr>
+        <p:spPr>
+          <a:xfrm>
+            <a:off x="667264" y="1622545"/>
+            <a:ext cx="5741773" cy="3108543"/>
+          </a:xfrm>
+          <a:prstGeom prst="rect">
+            <a:avLst/>
+          </a:prstGeom>
+          <a:noFill/>
+        </p:spPr>
+        <p:txBody>
+          <a:bodyPr wrap="square" rtlCol="0">
+            <a:spAutoFit/>
+          </a:bodyPr>
+          <a:lstStyle/>
+          <a:p>
+            <a:pPr marL="285750" indent="-285750">
+              <a:buFont typeface="Arial" panose="020B0604020202020204" pitchFamily="34" charset="0"/>
+              <a:buChar char="•"/>
+            </a:pPr>
+            <a:r>
+              <a:rPr lang="en-CA" sz="2800" dirty="0" smtClean="0"/>
+              <a:t>Strategy</a:t>
+            </a:r>
+            <a:endParaRPr lang="en-CA" sz="2800" dirty="0" smtClean="0"/>
+          </a:p>
+          <a:p>
+            <a:pPr marL="285750" indent="-285750">
+              <a:buFont typeface="Arial" panose="020B0604020202020204" pitchFamily="34" charset="0"/>
+              <a:buChar char="•"/>
+            </a:pPr>
+            <a:r>
+              <a:rPr lang="en-CA" sz="2800" dirty="0" smtClean="0"/>
+              <a:t>Factory and Factory Method</a:t>
+            </a:r>
+          </a:p>
+          <a:p>
+            <a:pPr marL="285750" indent="-285750">
+              <a:buFont typeface="Arial" panose="020B0604020202020204" pitchFamily="34" charset="0"/>
+              <a:buChar char="•"/>
+            </a:pPr>
+            <a:r>
+              <a:rPr lang="en-CA" sz="2800" dirty="0" smtClean="0"/>
+              <a:t>Singleton </a:t>
+            </a:r>
+          </a:p>
+          <a:p>
+            <a:pPr marL="285750" indent="-285750">
+              <a:buFont typeface="Arial" panose="020B0604020202020204" pitchFamily="34" charset="0"/>
+              <a:buChar char="•"/>
+            </a:pPr>
+            <a:r>
+              <a:rPr lang="en-CA" sz="2800" dirty="0" smtClean="0"/>
+              <a:t>Chain of Responsibility </a:t>
+            </a:r>
+            <a:endParaRPr lang="en-CA" sz="2800" dirty="0" smtClean="0"/>
+          </a:p>
+          <a:p>
+            <a:pPr marL="285750" indent="-285750">
+              <a:buFont typeface="Arial" panose="020B0604020202020204" pitchFamily="34" charset="0"/>
+              <a:buChar char="•"/>
+            </a:pPr>
+            <a:r>
+              <a:rPr lang="en-CA" sz="2800" dirty="0" smtClean="0"/>
+              <a:t>Observer</a:t>
+            </a:r>
+          </a:p>
+          <a:p>
+            <a:pPr marL="285750" indent="-285750">
+              <a:buFont typeface="Arial" panose="020B0604020202020204" pitchFamily="34" charset="0"/>
+              <a:buChar char="•"/>
+            </a:pPr>
+            <a:r>
+              <a:rPr lang="en-CA" sz="2800" dirty="0" smtClean="0"/>
+              <a:t>Template Method</a:t>
+            </a:r>
+            <a:endParaRPr lang="en-CA" sz="2800" dirty="0" smtClean="0"/>
+          </a:p>
+          <a:p>
+            <a:pPr marL="285750" indent="-285750">
+              <a:buFont typeface="Arial" panose="020B0604020202020204" pitchFamily="34" charset="0"/>
+              <a:buChar char="•"/>
+            </a:pPr>
+            <a:endParaRPr lang="en-CA" sz="2800" dirty="0" smtClean="0"/>
+          </a:p>
+        </p:txBody>
+      </p:sp>
+    </p:spTree>
+    <p:extLst>
+      <p:ext uri="{BB962C8B-B14F-4D97-AF65-F5344CB8AC3E}">
+        <p14:creationId xmlns:p14="http://schemas.microsoft.com/office/powerpoint/2010/main" val="163462713"/>
+      </p:ext>
+    </p:extLst>
+  </p:cSld>
+  <p:clrMapOvr>
+    <a:masterClrMapping/>
+  </p:clrMapOvr>
+</p:sld>
+</file>
+
+<file path=ppt/slides/slide12.xml><?xml version="1.0" encoding="utf-8"?>
+<p:sld xmlns:a="http://schemas.openxmlformats.org/drawingml/2006/main" xmlns:r="http://schemas.openxmlformats.org/officeDocument/2006/relationships" xmlns:p="http://schemas.openxmlformats.org/presentationml/2006/main">
+  <p:cSld>
+    <p:spTree>
+      <p:nvGrpSpPr>
+        <p:cNvPr id="1" name=""/>
+        <p:cNvGrpSpPr/>
+        <p:nvPr/>
+      </p:nvGrpSpPr>
+      <p:grpSpPr>
+        <a:xfrm>
+          <a:off x="0" y="0"/>
+          <a:ext cx="0" cy="0"/>
+          <a:chOff x="0" y="0"/>
+          <a:chExt cx="0" cy="0"/>
+        </a:xfrm>
+      </p:grpSpPr>
+      <p:sp>
+        <p:nvSpPr>
+          <p:cNvPr id="2" name="TextBox 1"/>
+          <p:cNvSpPr txBox="1"/>
+          <p:nvPr/>
+        </p:nvSpPr>
+        <p:spPr>
+          <a:xfrm>
+            <a:off x="0" y="-3025"/>
+            <a:ext cx="11467070" cy="769441"/>
+          </a:xfrm>
+          <a:prstGeom prst="rect">
+            <a:avLst/>
+          </a:prstGeom>
+          <a:noFill/>
+        </p:spPr>
+        <p:txBody>
+          <a:bodyPr wrap="square" rtlCol="0">
+            <a:spAutoFit/>
+          </a:bodyPr>
+          <a:lstStyle/>
+          <a:p>
+            <a:r>
+              <a:rPr lang="en-CA" sz="4400" dirty="0" smtClean="0"/>
+              <a:t>Singleton Pattern</a:t>
+            </a:r>
+            <a:endParaRPr lang="en-CA" sz="4400" dirty="0"/>
+          </a:p>
+        </p:txBody>
+      </p:sp>
+    </p:spTree>
+    <p:extLst>
+      <p:ext uri="{BB962C8B-B14F-4D97-AF65-F5344CB8AC3E}">
+        <p14:creationId xmlns:p14="http://schemas.microsoft.com/office/powerpoint/2010/main" val="2227657093"/>
+      </p:ext>
+    </p:extLst>
+  </p:cSld>
+  <p:clrMapOvr>
+    <a:masterClrMapping/>
+  </p:clrMapOvr>
+</p:sld>
+</file>
+
+<file path=ppt/slides/slide13.xml><?xml version="1.0" encoding="utf-8"?>
+<p:sld xmlns:a="http://schemas.openxmlformats.org/drawingml/2006/main" xmlns:r="http://schemas.openxmlformats.org/officeDocument/2006/relationships" xmlns:p="http://schemas.openxmlformats.org/presentationml/2006/main">
+  <p:cSld>
+    <p:spTree>
+      <p:nvGrpSpPr>
+        <p:cNvPr id="1" name=""/>
+        <p:cNvGrpSpPr/>
+        <p:nvPr/>
+      </p:nvGrpSpPr>
+      <p:grpSpPr>
+        <a:xfrm>
+          <a:off x="0" y="0"/>
+          <a:ext cx="0" cy="0"/>
+          <a:chOff x="0" y="0"/>
+          <a:chExt cx="0" cy="0"/>
+        </a:xfrm>
+      </p:grpSpPr>
+      <p:sp>
+        <p:nvSpPr>
+          <p:cNvPr id="2" name="TextBox 1"/>
+          <p:cNvSpPr txBox="1"/>
+          <p:nvPr/>
+        </p:nvSpPr>
+        <p:spPr>
+          <a:xfrm>
+            <a:off x="0" y="-3025"/>
+            <a:ext cx="11467070" cy="769441"/>
+          </a:xfrm>
+          <a:prstGeom prst="rect">
+            <a:avLst/>
+          </a:prstGeom>
+          <a:noFill/>
+        </p:spPr>
+        <p:txBody>
+          <a:bodyPr wrap="square" rtlCol="0">
+            <a:spAutoFit/>
+          </a:bodyPr>
+          <a:lstStyle/>
+          <a:p>
+            <a:r>
+              <a:rPr lang="en-CA" sz="4400" dirty="0" smtClean="0"/>
+              <a:t>Template Method Pattern</a:t>
+            </a:r>
+            <a:endParaRPr lang="en-CA" sz="4400" dirty="0"/>
+          </a:p>
+        </p:txBody>
+      </p:sp>
+    </p:spTree>
+    <p:extLst>
+      <p:ext uri="{BB962C8B-B14F-4D97-AF65-F5344CB8AC3E}">
+        <p14:creationId xmlns:p14="http://schemas.microsoft.com/office/powerpoint/2010/main" val="522790167"/>
+      </p:ext>
+    </p:extLst>
+  </p:cSld>
+  <p:clrMapOvr>
+    <a:masterClrMapping/>
+  </p:clrMapOvr>
+</p:sld>
+</file>
+
+<file path=ppt/slides/slide14.xml><?xml version="1.0" encoding="utf-8"?>
+<p:sld xmlns:a="http://schemas.openxmlformats.org/drawingml/2006/main" xmlns:r="http://schemas.openxmlformats.org/officeDocument/2006/relationships" xmlns:p="http://schemas.openxmlformats.org/presentationml/2006/main">
+  <p:cSld>
+    <p:spTree>
+      <p:nvGrpSpPr>
+        <p:cNvPr id="1" name=""/>
+        <p:cNvGrpSpPr/>
+        <p:nvPr/>
+      </p:nvGrpSpPr>
+      <p:grpSpPr>
+        <a:xfrm>
+          <a:off x="0" y="0"/>
+          <a:ext cx="0" cy="0"/>
+          <a:chOff x="0" y="0"/>
+          <a:chExt cx="0" cy="0"/>
+        </a:xfrm>
+      </p:grpSpPr>
+      <p:sp>
+        <p:nvSpPr>
+          <p:cNvPr id="2" name="TextBox 1"/>
+          <p:cNvSpPr txBox="1"/>
+          <p:nvPr/>
+        </p:nvSpPr>
+        <p:spPr>
+          <a:xfrm>
+            <a:off x="0" y="-3025"/>
+            <a:ext cx="11467070" cy="769441"/>
+          </a:xfrm>
+          <a:prstGeom prst="rect">
+            <a:avLst/>
+          </a:prstGeom>
+          <a:noFill/>
+        </p:spPr>
+        <p:txBody>
+          <a:bodyPr wrap="square" rtlCol="0">
+            <a:spAutoFit/>
+          </a:bodyPr>
+          <a:lstStyle/>
+          <a:p>
+            <a:r>
+              <a:rPr lang="en-CA" sz="4400" dirty="0" smtClean="0"/>
+              <a:t>Factory and Factory Method</a:t>
+            </a:r>
+            <a:r>
+              <a:rPr lang="en-CA" sz="4400" dirty="0" smtClean="0"/>
+              <a:t> Pattern</a:t>
+            </a:r>
+            <a:endParaRPr lang="en-CA" sz="4400" dirty="0"/>
+          </a:p>
+        </p:txBody>
+      </p:sp>
+    </p:spTree>
+    <p:extLst>
+      <p:ext uri="{BB962C8B-B14F-4D97-AF65-F5344CB8AC3E}">
+        <p14:creationId xmlns:p14="http://schemas.microsoft.com/office/powerpoint/2010/main" val="2806079054"/>
+      </p:ext>
+    </p:extLst>
+  </p:cSld>
+  <p:clrMapOvr>
+    <a:masterClrMapping/>
+  </p:clrMapOvr>
+</p:sld>
+</file>
+
+<file path=ppt/slides/slide15.xml><?xml version="1.0" encoding="utf-8"?>
+<p:sld xmlns:a="http://schemas.openxmlformats.org/drawingml/2006/main" xmlns:r="http://schemas.openxmlformats.org/officeDocument/2006/relationships" xmlns:p="http://schemas.openxmlformats.org/presentationml/2006/main">
+  <p:cSld>
+    <p:spTree>
+      <p:nvGrpSpPr>
+        <p:cNvPr id="1" name=""/>
+        <p:cNvGrpSpPr/>
+        <p:nvPr/>
+      </p:nvGrpSpPr>
+      <p:grpSpPr>
+        <a:xfrm>
+          <a:off x="0" y="0"/>
+          <a:ext cx="0" cy="0"/>
+          <a:chOff x="0" y="0"/>
+          <a:chExt cx="0" cy="0"/>
+        </a:xfrm>
+      </p:grpSpPr>
+      <p:sp>
+        <p:nvSpPr>
+          <p:cNvPr id="2" name="TextBox 1"/>
+          <p:cNvSpPr txBox="1"/>
+          <p:nvPr/>
+        </p:nvSpPr>
+        <p:spPr>
+          <a:xfrm>
+            <a:off x="0" y="-3025"/>
+            <a:ext cx="11467070" cy="769441"/>
+          </a:xfrm>
+          <a:prstGeom prst="rect">
+            <a:avLst/>
+          </a:prstGeom>
+          <a:noFill/>
+        </p:spPr>
+        <p:txBody>
+          <a:bodyPr wrap="square" rtlCol="0">
+            <a:spAutoFit/>
+          </a:bodyPr>
+          <a:lstStyle/>
+          <a:p>
+            <a:r>
+              <a:rPr lang="en-CA" sz="4400" dirty="0" smtClean="0"/>
+              <a:t>Strategy Pattern</a:t>
+            </a:r>
+            <a:endParaRPr lang="en-CA" sz="4400" dirty="0"/>
+          </a:p>
+        </p:txBody>
+      </p:sp>
+    </p:spTree>
+    <p:extLst>
+      <p:ext uri="{BB962C8B-B14F-4D97-AF65-F5344CB8AC3E}">
+        <p14:creationId xmlns:p14="http://schemas.microsoft.com/office/powerpoint/2010/main" val="1514467016"/>
+      </p:ext>
+    </p:extLst>
+  </p:cSld>
+  <p:clrMapOvr>
+    <a:masterClrMapping/>
+  </p:clrMapOvr>
+</p:sld>
+</file>
+
+<file path=ppt/slides/slide16.xml><?xml version="1.0" encoding="utf-8"?>
+<p:sld xmlns:a="http://schemas.openxmlformats.org/drawingml/2006/main" xmlns:r="http://schemas.openxmlformats.org/officeDocument/2006/relationships" xmlns:p="http://schemas.openxmlformats.org/presentationml/2006/main">
+  <p:cSld>
+    <p:spTree>
+      <p:nvGrpSpPr>
+        <p:cNvPr id="1" name=""/>
+        <p:cNvGrpSpPr/>
+        <p:nvPr/>
+      </p:nvGrpSpPr>
+      <p:grpSpPr>
+        <a:xfrm>
+          <a:off x="0" y="0"/>
+          <a:ext cx="0" cy="0"/>
+          <a:chOff x="0" y="0"/>
+          <a:chExt cx="0" cy="0"/>
+        </a:xfrm>
+      </p:grpSpPr>
+      <p:sp>
+        <p:nvSpPr>
+          <p:cNvPr id="2" name="TextBox 1"/>
+          <p:cNvSpPr txBox="1"/>
+          <p:nvPr/>
+        </p:nvSpPr>
+        <p:spPr>
+          <a:xfrm>
+            <a:off x="0" y="-3025"/>
+            <a:ext cx="11467070" cy="769441"/>
+          </a:xfrm>
+          <a:prstGeom prst="rect">
+            <a:avLst/>
+          </a:prstGeom>
+          <a:noFill/>
+        </p:spPr>
+        <p:txBody>
+          <a:bodyPr wrap="square" rtlCol="0">
+            <a:spAutoFit/>
+          </a:bodyPr>
+          <a:lstStyle/>
+          <a:p>
+            <a:r>
+              <a:rPr lang="en-CA" sz="4400" dirty="0" smtClean="0"/>
+              <a:t>Chain of Responsibility</a:t>
+            </a:r>
+            <a:r>
+              <a:rPr lang="en-CA" sz="4400" dirty="0" smtClean="0"/>
+              <a:t> Pattern</a:t>
+            </a:r>
+            <a:endParaRPr lang="en-CA" sz="4400" dirty="0"/>
+          </a:p>
+        </p:txBody>
+      </p:sp>
+    </p:spTree>
+    <p:extLst>
+      <p:ext uri="{BB962C8B-B14F-4D97-AF65-F5344CB8AC3E}">
+        <p14:creationId xmlns:p14="http://schemas.microsoft.com/office/powerpoint/2010/main" val="1615841322"/>
+      </p:ext>
+    </p:extLst>
+  </p:cSld>
+  <p:clrMapOvr>
+    <a:masterClrMapping/>
+  </p:clrMapOvr>
+</p:sld>
+</file>
+
+<file path=ppt/slides/slide17.xml><?xml version="1.0" encoding="utf-8"?>
+<p:sld xmlns:a="http://schemas.openxmlformats.org/drawingml/2006/main" xmlns:r="http://schemas.openxmlformats.org/officeDocument/2006/relationships" xmlns:p="http://schemas.openxmlformats.org/presentationml/2006/main">
+  <p:cSld>
+    <p:spTree>
+      <p:nvGrpSpPr>
+        <p:cNvPr id="1" name=""/>
+        <p:cNvGrpSpPr/>
+        <p:nvPr/>
+      </p:nvGrpSpPr>
+      <p:grpSpPr>
+        <a:xfrm>
+          <a:off x="0" y="0"/>
+          <a:ext cx="0" cy="0"/>
+          <a:chOff x="0" y="0"/>
+          <a:chExt cx="0" cy="0"/>
+        </a:xfrm>
+      </p:grpSpPr>
+      <p:sp>
+        <p:nvSpPr>
+          <p:cNvPr id="2" name="TextBox 1"/>
+          <p:cNvSpPr txBox="1"/>
+          <p:nvPr/>
+        </p:nvSpPr>
+        <p:spPr>
+          <a:xfrm>
+            <a:off x="0" y="-3025"/>
+            <a:ext cx="11467070" cy="769441"/>
+          </a:xfrm>
+          <a:prstGeom prst="rect">
+            <a:avLst/>
+          </a:prstGeom>
+          <a:noFill/>
+        </p:spPr>
+        <p:txBody>
+          <a:bodyPr wrap="square" rtlCol="0">
+            <a:spAutoFit/>
+          </a:bodyPr>
+          <a:lstStyle/>
+          <a:p>
+            <a:r>
+              <a:rPr lang="en-CA" sz="4400" dirty="0" smtClean="0"/>
+              <a:t>Observer</a:t>
+            </a:r>
+            <a:r>
+              <a:rPr lang="en-CA" sz="4400" dirty="0" smtClean="0"/>
+              <a:t> Pattern</a:t>
+            </a:r>
+            <a:endParaRPr lang="en-CA" sz="4400" dirty="0"/>
+          </a:p>
+        </p:txBody>
+      </p:sp>
+    </p:spTree>
+    <p:extLst>
+      <p:ext uri="{BB962C8B-B14F-4D97-AF65-F5344CB8AC3E}">
+        <p14:creationId xmlns:p14="http://schemas.microsoft.com/office/powerpoint/2010/main" val="3902739632"/>
+      </p:ext>
+    </p:extLst>
+  </p:cSld>
+  <p:clrMapOvr>
+    <a:masterClrMapping/>
+  </p:clrMapOvr>
+</p:sld>
+</file>
+
 <file path=ppt/slides/slide2.xml><?xml version="1.0" encoding="utf-8"?>
 <p:sld xmlns:a="http://schemas.openxmlformats.org/drawingml/2006/main" xmlns:r="http://schemas.openxmlformats.org/officeDocument/2006/relationships" xmlns:p="http://schemas.openxmlformats.org/presentationml/2006/main">
   <p:cSld>
@@ -3049,7 +4134,7 @@
           <a:p>
             <a:r>
               <a:rPr lang="en-CA" sz="4400" dirty="0" smtClean="0"/>
-              <a:t>Introduction To Design Patterns</a:t>
+              <a:t>Agenda</a:t>
             </a:r>
             <a:endParaRPr lang="en-CA" sz="4400" dirty="0"/>
           </a:p>
@@ -3064,7 +4149,7 @@
         <p:spPr>
           <a:xfrm>
             <a:off x="1771134" y="2364259"/>
-            <a:ext cx="8748585" cy="1815882"/>
+            <a:ext cx="8748585" cy="2246769"/>
           </a:xfrm>
           <a:prstGeom prst="rect">
             <a:avLst/>
@@ -3083,8 +4168,9 @@
             </a:pPr>
             <a:r>
               <a:rPr lang="en-CA" sz="2800" dirty="0" smtClean="0"/>
-              <a:t>What are Design Pattern and where do they come from </a:t>
-            </a:r>
+              <a:t>About Design Patterns </a:t>
+            </a:r>
+            <a:endParaRPr lang="en-CA" sz="2800" dirty="0" smtClean="0"/>
           </a:p>
           <a:p>
             <a:pPr marL="285750" indent="-285750">
@@ -3093,8 +4179,9 @@
             </a:pPr>
             <a:r>
               <a:rPr lang="en-CA" sz="2800" dirty="0" smtClean="0"/>
-              <a:t>Why do we care about patterns </a:t>
-            </a:r>
+              <a:t>Patterns Catalog and Classification </a:t>
+            </a:r>
+            <a:endParaRPr lang="en-CA" sz="2800" dirty="0" smtClean="0"/>
           </a:p>
           <a:p>
             <a:pPr marL="285750" indent="-285750">
@@ -3103,7 +4190,7 @@
             </a:pPr>
             <a:r>
               <a:rPr lang="en-CA" sz="2800" dirty="0" smtClean="0"/>
-              <a:t>When to apply Design Pattern</a:t>
+              <a:t>Most used Patterns and Examples</a:t>
             </a:r>
           </a:p>
           <a:p>
@@ -3113,8 +4200,167 @@
             </a:pPr>
             <a:r>
               <a:rPr lang="en-CA" sz="2800" dirty="0" smtClean="0"/>
-              <a:t>Design Patterns Developer Cycle</a:t>
-            </a:r>
+              <a:t>Other Patterns you might have heard of</a:t>
+            </a:r>
+          </a:p>
+          <a:p>
+            <a:pPr marL="285750" indent="-285750">
+              <a:buFont typeface="Arial" panose="020B0604020202020204" pitchFamily="34" charset="0"/>
+              <a:buChar char="•"/>
+            </a:pPr>
+            <a:r>
+              <a:rPr lang="en-CA" sz="2800" dirty="0" smtClean="0"/>
+              <a:t>Summary </a:t>
+            </a:r>
+            <a:endParaRPr lang="en-CA" sz="2800" dirty="0" smtClean="0"/>
+          </a:p>
+        </p:txBody>
+      </p:sp>
+    </p:spTree>
+    <p:extLst>
+      <p:ext uri="{BB962C8B-B14F-4D97-AF65-F5344CB8AC3E}">
+        <p14:creationId xmlns:p14="http://schemas.microsoft.com/office/powerpoint/2010/main" val="3352486"/>
+      </p:ext>
+    </p:extLst>
+  </p:cSld>
+  <p:clrMapOvr>
+    <a:masterClrMapping/>
+  </p:clrMapOvr>
+</p:sld>
+</file>
+
+<file path=ppt/slides/slide3.xml><?xml version="1.0" encoding="utf-8"?>
+<p:sld xmlns:a="http://schemas.openxmlformats.org/drawingml/2006/main" xmlns:r="http://schemas.openxmlformats.org/officeDocument/2006/relationships" xmlns:p="http://schemas.openxmlformats.org/presentationml/2006/main">
+  <p:cSld>
+    <p:spTree>
+      <p:nvGrpSpPr>
+        <p:cNvPr id="1" name=""/>
+        <p:cNvGrpSpPr/>
+        <p:nvPr/>
+      </p:nvGrpSpPr>
+      <p:grpSpPr>
+        <a:xfrm>
+          <a:off x="0" y="0"/>
+          <a:ext cx="0" cy="0"/>
+          <a:chOff x="0" y="0"/>
+          <a:chExt cx="0" cy="0"/>
+        </a:xfrm>
+      </p:grpSpPr>
+      <p:sp>
+        <p:nvSpPr>
+          <p:cNvPr id="4" name="TextBox 3"/>
+          <p:cNvSpPr txBox="1"/>
+          <p:nvPr/>
+        </p:nvSpPr>
+        <p:spPr>
+          <a:xfrm>
+            <a:off x="0" y="-3025"/>
+            <a:ext cx="8311978" cy="769441"/>
+          </a:xfrm>
+          <a:prstGeom prst="rect">
+            <a:avLst/>
+          </a:prstGeom>
+          <a:noFill/>
+        </p:spPr>
+        <p:txBody>
+          <a:bodyPr wrap="square" rtlCol="0">
+            <a:spAutoFit/>
+          </a:bodyPr>
+          <a:lstStyle/>
+          <a:p>
+            <a:r>
+              <a:rPr lang="en-CA" sz="4400" dirty="0" smtClean="0"/>
+              <a:t>Introduction To Design Patterns</a:t>
+            </a:r>
+            <a:endParaRPr lang="en-CA" sz="4400" dirty="0"/>
+          </a:p>
+        </p:txBody>
+      </p:sp>
+      <p:sp>
+        <p:nvSpPr>
+          <p:cNvPr id="5" name="TextBox 4"/>
+          <p:cNvSpPr txBox="1"/>
+          <p:nvPr/>
+        </p:nvSpPr>
+        <p:spPr>
+          <a:xfrm>
+            <a:off x="1771134" y="2364259"/>
+            <a:ext cx="8748585" cy="2246769"/>
+          </a:xfrm>
+          <a:prstGeom prst="rect">
+            <a:avLst/>
+          </a:prstGeom>
+          <a:noFill/>
+        </p:spPr>
+        <p:txBody>
+          <a:bodyPr wrap="square" rtlCol="0">
+            <a:spAutoFit/>
+          </a:bodyPr>
+          <a:lstStyle/>
+          <a:p>
+            <a:pPr marL="285750" indent="-285750">
+              <a:buFont typeface="Arial" panose="020B0604020202020204" pitchFamily="34" charset="0"/>
+              <a:buChar char="•"/>
+            </a:pPr>
+            <a:r>
+              <a:rPr lang="en-CA" sz="2800" dirty="0" smtClean="0"/>
+              <a:t>What are Design Pattern and where do they come from </a:t>
+            </a:r>
+          </a:p>
+          <a:p>
+            <a:pPr marL="285750" indent="-285750">
+              <a:buFont typeface="Arial" panose="020B0604020202020204" pitchFamily="34" charset="0"/>
+              <a:buChar char="•"/>
+            </a:pPr>
+            <a:r>
+              <a:rPr lang="en-CA" sz="2800" dirty="0" smtClean="0"/>
+              <a:t>Why do we care about </a:t>
+            </a:r>
+            <a:r>
+              <a:rPr lang="en-CA" sz="2800" dirty="0" smtClean="0"/>
+              <a:t>Design Patterns</a:t>
+            </a:r>
+          </a:p>
+          <a:p>
+            <a:pPr marL="285750" indent="-285750">
+              <a:buFont typeface="Arial" panose="020B0604020202020204" pitchFamily="34" charset="0"/>
+              <a:buChar char="•"/>
+            </a:pPr>
+            <a:r>
+              <a:rPr lang="en-CA" sz="2800" dirty="0" smtClean="0"/>
+              <a:t>Design Patterns Categories</a:t>
+            </a:r>
+            <a:r>
+              <a:rPr lang="en-CA" sz="2800" dirty="0" smtClean="0"/>
+              <a:t> </a:t>
+            </a:r>
+            <a:endParaRPr lang="en-CA" sz="2800" dirty="0" smtClean="0"/>
+          </a:p>
+          <a:p>
+            <a:pPr marL="285750" indent="-285750">
+              <a:buFont typeface="Arial" panose="020B0604020202020204" pitchFamily="34" charset="0"/>
+              <a:buChar char="•"/>
+            </a:pPr>
+            <a:r>
+              <a:rPr lang="en-CA" sz="2800" dirty="0" smtClean="0"/>
+              <a:t>When to apply Design </a:t>
+            </a:r>
+            <a:r>
+              <a:rPr lang="en-CA" sz="2800" dirty="0" smtClean="0"/>
+              <a:t>Patterns</a:t>
+            </a:r>
+            <a:endParaRPr lang="en-CA" sz="2800" dirty="0" smtClean="0"/>
+          </a:p>
+          <a:p>
+            <a:pPr marL="285750" indent="-285750">
+              <a:buFont typeface="Arial" panose="020B0604020202020204" pitchFamily="34" charset="0"/>
+              <a:buChar char="•"/>
+            </a:pPr>
+            <a:r>
+              <a:rPr lang="en-CA" sz="2800" dirty="0" smtClean="0"/>
+              <a:t>Developer life with Patterns</a:t>
+            </a:r>
+            <a:endParaRPr lang="en-CA" sz="2800" dirty="0" smtClean="0"/>
           </a:p>
         </p:txBody>
       </p:sp>
@@ -3122,6 +4368,859 @@
     <p:extLst>
       <p:ext uri="{BB962C8B-B14F-4D97-AF65-F5344CB8AC3E}">
         <p14:creationId xmlns:p14="http://schemas.microsoft.com/office/powerpoint/2010/main" val="344064583"/>
+      </p:ext>
+    </p:extLst>
+  </p:cSld>
+  <p:clrMapOvr>
+    <a:masterClrMapping/>
+  </p:clrMapOvr>
+</p:sld>
+</file>
+
+<file path=ppt/slides/slide4.xml><?xml version="1.0" encoding="utf-8"?>
+<p:sld xmlns:a="http://schemas.openxmlformats.org/drawingml/2006/main" xmlns:r="http://schemas.openxmlformats.org/officeDocument/2006/relationships" xmlns:p="http://schemas.openxmlformats.org/presentationml/2006/main">
+  <p:cSld>
+    <p:spTree>
+      <p:nvGrpSpPr>
+        <p:cNvPr id="1" name=""/>
+        <p:cNvGrpSpPr/>
+        <p:nvPr/>
+      </p:nvGrpSpPr>
+      <p:grpSpPr>
+        <a:xfrm>
+          <a:off x="0" y="0"/>
+          <a:ext cx="0" cy="0"/>
+          <a:chOff x="0" y="0"/>
+          <a:chExt cx="0" cy="0"/>
+        </a:xfrm>
+      </p:grpSpPr>
+      <p:sp>
+        <p:nvSpPr>
+          <p:cNvPr id="2" name="TextBox 1"/>
+          <p:cNvSpPr txBox="1"/>
+          <p:nvPr/>
+        </p:nvSpPr>
+        <p:spPr>
+          <a:xfrm>
+            <a:off x="0" y="-3025"/>
+            <a:ext cx="8311978" cy="769441"/>
+          </a:xfrm>
+          <a:prstGeom prst="rect">
+            <a:avLst/>
+          </a:prstGeom>
+          <a:noFill/>
+        </p:spPr>
+        <p:txBody>
+          <a:bodyPr wrap="square" rtlCol="0">
+            <a:spAutoFit/>
+          </a:bodyPr>
+          <a:lstStyle/>
+          <a:p>
+            <a:r>
+              <a:rPr lang="en-CA" sz="4400" dirty="0" smtClean="0"/>
+              <a:t>What are Design Patterns</a:t>
+            </a:r>
+            <a:endParaRPr lang="en-CA" sz="4400" dirty="0"/>
+          </a:p>
+        </p:txBody>
+      </p:sp>
+      <p:sp>
+        <p:nvSpPr>
+          <p:cNvPr id="3" name="TextBox 2"/>
+          <p:cNvSpPr txBox="1"/>
+          <p:nvPr/>
+        </p:nvSpPr>
+        <p:spPr>
+          <a:xfrm>
+            <a:off x="1771134" y="2364259"/>
+            <a:ext cx="8748585" cy="3539430"/>
+          </a:xfrm>
+          <a:prstGeom prst="rect">
+            <a:avLst/>
+          </a:prstGeom>
+          <a:noFill/>
+        </p:spPr>
+        <p:txBody>
+          <a:bodyPr wrap="square" rtlCol="0">
+            <a:spAutoFit/>
+          </a:bodyPr>
+          <a:lstStyle/>
+          <a:p>
+            <a:pPr marL="285750" indent="-285750">
+              <a:buFont typeface="Arial" panose="020B0604020202020204" pitchFamily="34" charset="0"/>
+              <a:buChar char="•"/>
+            </a:pPr>
+            <a:r>
+              <a:rPr lang="en-CA" sz="2800" dirty="0" smtClean="0"/>
+              <a:t>General solution to a common recurring problem presented on software development</a:t>
+            </a:r>
+            <a:endParaRPr lang="en-CA" sz="2800" dirty="0" smtClean="0"/>
+          </a:p>
+          <a:p>
+            <a:pPr marL="285750" indent="-285750">
+              <a:buFont typeface="Arial" panose="020B0604020202020204" pitchFamily="34" charset="0"/>
+              <a:buChar char="•"/>
+            </a:pPr>
+            <a:r>
+              <a:rPr lang="en-CA" sz="2800" dirty="0" smtClean="0"/>
+              <a:t>Dictates how in the particular solution class related to each other or interact with each other</a:t>
+            </a:r>
+          </a:p>
+          <a:p>
+            <a:pPr marL="285750" indent="-285750">
+              <a:buFont typeface="Arial" panose="020B0604020202020204" pitchFamily="34" charset="0"/>
+              <a:buChar char="•"/>
+            </a:pPr>
+            <a:r>
+              <a:rPr lang="en-CA" sz="2800" dirty="0" smtClean="0"/>
+              <a:t>Emerges from the experiences of community trying to solve software design problems</a:t>
+            </a:r>
+            <a:endParaRPr lang="en-CA" sz="2800" dirty="0" smtClean="0"/>
+          </a:p>
+          <a:p>
+            <a:pPr marL="285750" indent="-285750">
+              <a:buFont typeface="Arial" panose="020B0604020202020204" pitchFamily="34" charset="0"/>
+              <a:buChar char="•"/>
+            </a:pPr>
+            <a:r>
+              <a:rPr lang="en-CA" sz="2800" dirty="0" smtClean="0"/>
+              <a:t>Abstractions on top of code</a:t>
+            </a:r>
+            <a:endParaRPr lang="en-CA" sz="2800" dirty="0" smtClean="0"/>
+          </a:p>
+          <a:p>
+            <a:pPr marL="285750" indent="-285750">
+              <a:buFont typeface="Arial" panose="020B0604020202020204" pitchFamily="34" charset="0"/>
+              <a:buChar char="•"/>
+            </a:pPr>
+            <a:r>
+              <a:rPr lang="en-CA" sz="2800" dirty="0" smtClean="0"/>
+              <a:t>A framework for developers to exchange experiences on</a:t>
+            </a:r>
+            <a:endParaRPr lang="en-CA" sz="2800" dirty="0" smtClean="0"/>
+          </a:p>
+        </p:txBody>
+      </p:sp>
+    </p:spTree>
+    <p:extLst>
+      <p:ext uri="{BB962C8B-B14F-4D97-AF65-F5344CB8AC3E}">
+        <p14:creationId xmlns:p14="http://schemas.microsoft.com/office/powerpoint/2010/main" val="2590747760"/>
+      </p:ext>
+    </p:extLst>
+  </p:cSld>
+  <p:clrMapOvr>
+    <a:masterClrMapping/>
+  </p:clrMapOvr>
+</p:sld>
+</file>
+
+<file path=ppt/slides/slide5.xml><?xml version="1.0" encoding="utf-8"?>
+<p:sld xmlns:a="http://schemas.openxmlformats.org/drawingml/2006/main" xmlns:r="http://schemas.openxmlformats.org/officeDocument/2006/relationships" xmlns:p="http://schemas.openxmlformats.org/presentationml/2006/main">
+  <p:cSld>
+    <p:spTree>
+      <p:nvGrpSpPr>
+        <p:cNvPr id="1" name=""/>
+        <p:cNvGrpSpPr/>
+        <p:nvPr/>
+      </p:nvGrpSpPr>
+      <p:grpSpPr>
+        <a:xfrm>
+          <a:off x="0" y="0"/>
+          <a:ext cx="0" cy="0"/>
+          <a:chOff x="0" y="0"/>
+          <a:chExt cx="0" cy="0"/>
+        </a:xfrm>
+      </p:grpSpPr>
+      <p:sp>
+        <p:nvSpPr>
+          <p:cNvPr id="2" name="TextBox 1"/>
+          <p:cNvSpPr txBox="1"/>
+          <p:nvPr/>
+        </p:nvSpPr>
+        <p:spPr>
+          <a:xfrm>
+            <a:off x="0" y="-3025"/>
+            <a:ext cx="8311978" cy="769441"/>
+          </a:xfrm>
+          <a:prstGeom prst="rect">
+            <a:avLst/>
+          </a:prstGeom>
+          <a:noFill/>
+        </p:spPr>
+        <p:txBody>
+          <a:bodyPr wrap="square" rtlCol="0">
+            <a:spAutoFit/>
+          </a:bodyPr>
+          <a:lstStyle/>
+          <a:p>
+            <a:r>
+              <a:rPr lang="en-CA" sz="4400" dirty="0" smtClean="0"/>
+              <a:t>What Design Patterns are not</a:t>
+            </a:r>
+            <a:endParaRPr lang="en-CA" sz="4400" dirty="0"/>
+          </a:p>
+        </p:txBody>
+      </p:sp>
+      <p:sp>
+        <p:nvSpPr>
+          <p:cNvPr id="3" name="TextBox 2"/>
+          <p:cNvSpPr txBox="1"/>
+          <p:nvPr/>
+        </p:nvSpPr>
+        <p:spPr>
+          <a:xfrm>
+            <a:off x="1771134" y="2364259"/>
+            <a:ext cx="8748585" cy="1384995"/>
+          </a:xfrm>
+          <a:prstGeom prst="rect">
+            <a:avLst/>
+          </a:prstGeom>
+          <a:noFill/>
+        </p:spPr>
+        <p:txBody>
+          <a:bodyPr wrap="square" rtlCol="0">
+            <a:spAutoFit/>
+          </a:bodyPr>
+          <a:lstStyle/>
+          <a:p>
+            <a:pPr marL="285750" indent="-285750">
+              <a:buFont typeface="Arial" panose="020B0604020202020204" pitchFamily="34" charset="0"/>
+              <a:buChar char="•"/>
+            </a:pPr>
+            <a:r>
+              <a:rPr lang="en-CA" sz="2800" dirty="0" smtClean="0"/>
+              <a:t>Are not a finished solution</a:t>
+            </a:r>
+            <a:endParaRPr lang="en-CA" sz="2800" dirty="0" smtClean="0"/>
+          </a:p>
+          <a:p>
+            <a:pPr marL="285750" indent="-285750">
+              <a:buFont typeface="Arial" panose="020B0604020202020204" pitchFamily="34" charset="0"/>
+              <a:buChar char="•"/>
+            </a:pPr>
+            <a:r>
+              <a:rPr lang="en-CA" sz="2800" dirty="0" smtClean="0"/>
+              <a:t>Are not algorithms </a:t>
+            </a:r>
+            <a:endParaRPr lang="en-CA" sz="2800" dirty="0" smtClean="0"/>
+          </a:p>
+          <a:p>
+            <a:pPr marL="285750" indent="-285750">
+              <a:buFont typeface="Arial" panose="020B0604020202020204" pitchFamily="34" charset="0"/>
+              <a:buChar char="•"/>
+            </a:pPr>
+            <a:r>
+              <a:rPr lang="en-CA" sz="2800" dirty="0" smtClean="0"/>
+              <a:t>Are not specific implementations of problems</a:t>
+            </a:r>
+            <a:endParaRPr lang="en-CA" sz="2800" dirty="0" smtClean="0"/>
+          </a:p>
+        </p:txBody>
+      </p:sp>
+    </p:spTree>
+    <p:extLst>
+      <p:ext uri="{BB962C8B-B14F-4D97-AF65-F5344CB8AC3E}">
+        <p14:creationId xmlns:p14="http://schemas.microsoft.com/office/powerpoint/2010/main" val="3662282833"/>
+      </p:ext>
+    </p:extLst>
+  </p:cSld>
+  <p:clrMapOvr>
+    <a:masterClrMapping/>
+  </p:clrMapOvr>
+</p:sld>
+</file>
+
+<file path=ppt/slides/slide6.xml><?xml version="1.0" encoding="utf-8"?>
+<p:sld xmlns:a="http://schemas.openxmlformats.org/drawingml/2006/main" xmlns:r="http://schemas.openxmlformats.org/officeDocument/2006/relationships" xmlns:p="http://schemas.openxmlformats.org/presentationml/2006/main">
+  <p:cSld>
+    <p:spTree>
+      <p:nvGrpSpPr>
+        <p:cNvPr id="1" name=""/>
+        <p:cNvGrpSpPr/>
+        <p:nvPr/>
+      </p:nvGrpSpPr>
+      <p:grpSpPr>
+        <a:xfrm>
+          <a:off x="0" y="0"/>
+          <a:ext cx="0" cy="0"/>
+          <a:chOff x="0" y="0"/>
+          <a:chExt cx="0" cy="0"/>
+        </a:xfrm>
+      </p:grpSpPr>
+      <p:sp>
+        <p:nvSpPr>
+          <p:cNvPr id="2" name="TextBox 1"/>
+          <p:cNvSpPr txBox="1"/>
+          <p:nvPr/>
+        </p:nvSpPr>
+        <p:spPr>
+          <a:xfrm>
+            <a:off x="0" y="-3025"/>
+            <a:ext cx="9951308" cy="769441"/>
+          </a:xfrm>
+          <a:prstGeom prst="rect">
+            <a:avLst/>
+          </a:prstGeom>
+          <a:noFill/>
+        </p:spPr>
+        <p:txBody>
+          <a:bodyPr wrap="square" rtlCol="0">
+            <a:spAutoFit/>
+          </a:bodyPr>
+          <a:lstStyle/>
+          <a:p>
+            <a:r>
+              <a:rPr lang="en-CA" sz="4400" dirty="0" smtClean="0"/>
+              <a:t>Why do I care about Design Patterns</a:t>
+            </a:r>
+            <a:endParaRPr lang="en-CA" sz="4400" dirty="0"/>
+          </a:p>
+        </p:txBody>
+      </p:sp>
+      <p:sp>
+        <p:nvSpPr>
+          <p:cNvPr id="3" name="TextBox 2"/>
+          <p:cNvSpPr txBox="1"/>
+          <p:nvPr/>
+        </p:nvSpPr>
+        <p:spPr>
+          <a:xfrm>
+            <a:off x="1771134" y="2364259"/>
+            <a:ext cx="8748585" cy="2246769"/>
+          </a:xfrm>
+          <a:prstGeom prst="rect">
+            <a:avLst/>
+          </a:prstGeom>
+          <a:noFill/>
+        </p:spPr>
+        <p:txBody>
+          <a:bodyPr wrap="square" rtlCol="0">
+            <a:spAutoFit/>
+          </a:bodyPr>
+          <a:lstStyle/>
+          <a:p>
+            <a:pPr marL="285750" indent="-285750">
+              <a:buFont typeface="Arial" panose="020B0604020202020204" pitchFamily="34" charset="0"/>
+              <a:buChar char="•"/>
+            </a:pPr>
+            <a:r>
+              <a:rPr lang="en-CA" sz="2800" dirty="0" smtClean="0"/>
+              <a:t>Speed up development </a:t>
+            </a:r>
+            <a:endParaRPr lang="en-CA" sz="2800" dirty="0" smtClean="0"/>
+          </a:p>
+          <a:p>
+            <a:pPr marL="285750" indent="-285750">
+              <a:buFont typeface="Arial" panose="020B0604020202020204" pitchFamily="34" charset="0"/>
+              <a:buChar char="•"/>
+            </a:pPr>
+            <a:r>
+              <a:rPr lang="en-CA" sz="2800" dirty="0" smtClean="0"/>
+              <a:t>Gives a shared language between developers</a:t>
+            </a:r>
+          </a:p>
+          <a:p>
+            <a:pPr marL="285750" indent="-285750">
+              <a:buFont typeface="Arial" panose="020B0604020202020204" pitchFamily="34" charset="0"/>
+              <a:buChar char="•"/>
+            </a:pPr>
+            <a:r>
+              <a:rPr lang="en-CA" sz="2800" dirty="0" smtClean="0"/>
+              <a:t>Avoids re-inventing de wheel over and over </a:t>
+            </a:r>
+          </a:p>
+          <a:p>
+            <a:pPr marL="285750" indent="-285750">
+              <a:buFont typeface="Arial" panose="020B0604020202020204" pitchFamily="34" charset="0"/>
+              <a:buChar char="•"/>
+            </a:pPr>
+            <a:r>
+              <a:rPr lang="en-CA" sz="2800" dirty="0" smtClean="0"/>
+              <a:t>Provides a strong proven solution to an specific problem</a:t>
+            </a:r>
+          </a:p>
+          <a:p>
+            <a:pPr marL="285750" indent="-285750">
+              <a:buFont typeface="Arial" panose="020B0604020202020204" pitchFamily="34" charset="0"/>
+              <a:buChar char="•"/>
+            </a:pPr>
+            <a:r>
+              <a:rPr lang="en-CA" sz="2800" dirty="0" smtClean="0"/>
+              <a:t>Improves system and application design </a:t>
+            </a:r>
+          </a:p>
+        </p:txBody>
+      </p:sp>
+    </p:spTree>
+    <p:extLst>
+      <p:ext uri="{BB962C8B-B14F-4D97-AF65-F5344CB8AC3E}">
+        <p14:creationId xmlns:p14="http://schemas.microsoft.com/office/powerpoint/2010/main" val="1073521117"/>
+      </p:ext>
+    </p:extLst>
+  </p:cSld>
+  <p:clrMapOvr>
+    <a:masterClrMapping/>
+  </p:clrMapOvr>
+</p:sld>
+</file>
+
+<file path=ppt/slides/slide7.xml><?xml version="1.0" encoding="utf-8"?>
+<p:sld xmlns:a="http://schemas.openxmlformats.org/drawingml/2006/main" xmlns:r="http://schemas.openxmlformats.org/officeDocument/2006/relationships" xmlns:p="http://schemas.openxmlformats.org/presentationml/2006/main">
+  <p:cSld>
+    <p:spTree>
+      <p:nvGrpSpPr>
+        <p:cNvPr id="1" name=""/>
+        <p:cNvGrpSpPr/>
+        <p:nvPr/>
+      </p:nvGrpSpPr>
+      <p:grpSpPr>
+        <a:xfrm>
+          <a:off x="0" y="0"/>
+          <a:ext cx="0" cy="0"/>
+          <a:chOff x="0" y="0"/>
+          <a:chExt cx="0" cy="0"/>
+        </a:xfrm>
+      </p:grpSpPr>
+      <p:sp>
+        <p:nvSpPr>
+          <p:cNvPr id="2" name="TextBox 1"/>
+          <p:cNvSpPr txBox="1"/>
+          <p:nvPr/>
+        </p:nvSpPr>
+        <p:spPr>
+          <a:xfrm>
+            <a:off x="0" y="-3025"/>
+            <a:ext cx="11467070" cy="769441"/>
+          </a:xfrm>
+          <a:prstGeom prst="rect">
+            <a:avLst/>
+          </a:prstGeom>
+          <a:noFill/>
+        </p:spPr>
+        <p:txBody>
+          <a:bodyPr wrap="square" rtlCol="0">
+            <a:spAutoFit/>
+          </a:bodyPr>
+          <a:lstStyle/>
+          <a:p>
+            <a:r>
+              <a:rPr lang="en-CA" sz="4400" dirty="0" smtClean="0"/>
+              <a:t>Design Patterns categories or classifications </a:t>
+            </a:r>
+            <a:endParaRPr lang="en-CA" sz="4400" dirty="0"/>
+          </a:p>
+        </p:txBody>
+      </p:sp>
+      <p:sp>
+        <p:nvSpPr>
+          <p:cNvPr id="3" name="TextBox 2"/>
+          <p:cNvSpPr txBox="1"/>
+          <p:nvPr/>
+        </p:nvSpPr>
+        <p:spPr>
+          <a:xfrm>
+            <a:off x="1771134" y="2364259"/>
+            <a:ext cx="8748585" cy="954107"/>
+          </a:xfrm>
+          <a:prstGeom prst="rect">
+            <a:avLst/>
+          </a:prstGeom>
+          <a:noFill/>
+        </p:spPr>
+        <p:txBody>
+          <a:bodyPr wrap="square" rtlCol="0">
+            <a:spAutoFit/>
+          </a:bodyPr>
+          <a:lstStyle/>
+          <a:p>
+            <a:pPr marL="285750" indent="-285750">
+              <a:buFont typeface="Arial" panose="020B0604020202020204" pitchFamily="34" charset="0"/>
+              <a:buChar char="•"/>
+            </a:pPr>
+            <a:r>
+              <a:rPr lang="en-CA" sz="2800" dirty="0" smtClean="0"/>
+              <a:t>Higher Level Enterprise Patterns </a:t>
+            </a:r>
+            <a:endParaRPr lang="en-CA" sz="2800" dirty="0" smtClean="0"/>
+          </a:p>
+          <a:p>
+            <a:pPr marL="285750" indent="-285750">
+              <a:buFont typeface="Arial" panose="020B0604020202020204" pitchFamily="34" charset="0"/>
+              <a:buChar char="•"/>
+            </a:pPr>
+            <a:r>
+              <a:rPr lang="en-CA" sz="2800" b="1" dirty="0" smtClean="0"/>
+              <a:t>Lower Level Application Patterns</a:t>
+            </a:r>
+          </a:p>
+        </p:txBody>
+      </p:sp>
+    </p:spTree>
+    <p:extLst>
+      <p:ext uri="{BB962C8B-B14F-4D97-AF65-F5344CB8AC3E}">
+        <p14:creationId xmlns:p14="http://schemas.microsoft.com/office/powerpoint/2010/main" val="474753401"/>
+      </p:ext>
+    </p:extLst>
+  </p:cSld>
+  <p:clrMapOvr>
+    <a:masterClrMapping/>
+  </p:clrMapOvr>
+</p:sld>
+</file>
+
+<file path=ppt/slides/slide8.xml><?xml version="1.0" encoding="utf-8"?>
+<p:sld xmlns:a="http://schemas.openxmlformats.org/drawingml/2006/main" xmlns:r="http://schemas.openxmlformats.org/officeDocument/2006/relationships" xmlns:p="http://schemas.openxmlformats.org/presentationml/2006/main">
+  <p:cSld>
+    <p:spTree>
+      <p:nvGrpSpPr>
+        <p:cNvPr id="1" name=""/>
+        <p:cNvGrpSpPr/>
+        <p:nvPr/>
+      </p:nvGrpSpPr>
+      <p:grpSpPr>
+        <a:xfrm>
+          <a:off x="0" y="0"/>
+          <a:ext cx="0" cy="0"/>
+          <a:chOff x="0" y="0"/>
+          <a:chExt cx="0" cy="0"/>
+        </a:xfrm>
+      </p:grpSpPr>
+      <p:sp>
+        <p:nvSpPr>
+          <p:cNvPr id="2" name="TextBox 1"/>
+          <p:cNvSpPr txBox="1"/>
+          <p:nvPr/>
+        </p:nvSpPr>
+        <p:spPr>
+          <a:xfrm>
+            <a:off x="0" y="-3025"/>
+            <a:ext cx="11467070" cy="769441"/>
+          </a:xfrm>
+          <a:prstGeom prst="rect">
+            <a:avLst/>
+          </a:prstGeom>
+          <a:noFill/>
+        </p:spPr>
+        <p:txBody>
+          <a:bodyPr wrap="square" rtlCol="0">
+            <a:spAutoFit/>
+          </a:bodyPr>
+          <a:lstStyle/>
+          <a:p>
+            <a:r>
+              <a:rPr lang="en-CA" sz="4400" dirty="0" smtClean="0"/>
+              <a:t>Design Patterns Organization</a:t>
+            </a:r>
+            <a:endParaRPr lang="en-CA" sz="4400" dirty="0"/>
+          </a:p>
+        </p:txBody>
+      </p:sp>
+      <p:sp>
+        <p:nvSpPr>
+          <p:cNvPr id="3" name="TextBox 2"/>
+          <p:cNvSpPr txBox="1"/>
+          <p:nvPr/>
+        </p:nvSpPr>
+        <p:spPr>
+          <a:xfrm>
+            <a:off x="1771135" y="2364259"/>
+            <a:ext cx="3122142" cy="3108543"/>
+          </a:xfrm>
+          <a:prstGeom prst="rect">
+            <a:avLst/>
+          </a:prstGeom>
+          <a:noFill/>
+        </p:spPr>
+        <p:txBody>
+          <a:bodyPr wrap="square" rtlCol="0">
+            <a:spAutoFit/>
+          </a:bodyPr>
+          <a:lstStyle/>
+          <a:p>
+            <a:pPr marL="285750" indent="-285750">
+              <a:buFont typeface="Arial" panose="020B0604020202020204" pitchFamily="34" charset="0"/>
+              <a:buChar char="•"/>
+            </a:pPr>
+            <a:r>
+              <a:rPr lang="en-CA" sz="2800" dirty="0" smtClean="0"/>
+              <a:t>Creational</a:t>
+            </a:r>
+            <a:endParaRPr lang="en-CA" sz="2800" dirty="0" smtClean="0"/>
+          </a:p>
+          <a:p>
+            <a:pPr marL="285750" indent="-285750">
+              <a:buFont typeface="Arial" panose="020B0604020202020204" pitchFamily="34" charset="0"/>
+              <a:buChar char="•"/>
+            </a:pPr>
+            <a:r>
+              <a:rPr lang="en-CA" sz="2800" dirty="0" smtClean="0"/>
+              <a:t>Structural</a:t>
+            </a:r>
+          </a:p>
+          <a:p>
+            <a:pPr marL="285750" indent="-285750">
+              <a:buFont typeface="Arial" panose="020B0604020202020204" pitchFamily="34" charset="0"/>
+              <a:buChar char="•"/>
+            </a:pPr>
+            <a:r>
+              <a:rPr lang="en-CA" sz="2800" dirty="0" smtClean="0"/>
+              <a:t>Behavioral </a:t>
+            </a:r>
+          </a:p>
+          <a:p>
+            <a:pPr marL="285750" indent="-285750">
+              <a:buFont typeface="Arial" panose="020B0604020202020204" pitchFamily="34" charset="0"/>
+              <a:buChar char="•"/>
+            </a:pPr>
+            <a:r>
+              <a:rPr lang="en-CA" sz="2800" dirty="0" smtClean="0"/>
+              <a:t>Security  </a:t>
+            </a:r>
+            <a:endParaRPr lang="en-CA" sz="2800" dirty="0" smtClean="0"/>
+          </a:p>
+          <a:p>
+            <a:pPr marL="285750" indent="-285750">
+              <a:buFont typeface="Arial" panose="020B0604020202020204" pitchFamily="34" charset="0"/>
+              <a:buChar char="•"/>
+            </a:pPr>
+            <a:r>
+              <a:rPr lang="en-CA" sz="2800" dirty="0" smtClean="0"/>
+              <a:t>UI/UX Process</a:t>
+            </a:r>
+          </a:p>
+          <a:p>
+            <a:pPr marL="285750" indent="-285750">
+              <a:buFont typeface="Arial" panose="020B0604020202020204" pitchFamily="34" charset="0"/>
+              <a:buChar char="•"/>
+            </a:pPr>
+            <a:r>
+              <a:rPr lang="en-CA" sz="2800" dirty="0" smtClean="0"/>
+              <a:t>Messaging</a:t>
+            </a:r>
+            <a:endParaRPr lang="en-CA" sz="2800" dirty="0" smtClean="0"/>
+          </a:p>
+          <a:p>
+            <a:pPr marL="285750" indent="-285750">
+              <a:buFont typeface="Arial" panose="020B0604020202020204" pitchFamily="34" charset="0"/>
+              <a:buChar char="•"/>
+            </a:pPr>
+            <a:endParaRPr lang="en-CA" sz="2800" dirty="0" smtClean="0"/>
+          </a:p>
+        </p:txBody>
+      </p:sp>
+      <p:sp>
+        <p:nvSpPr>
+          <p:cNvPr id="4" name="TextBox 3"/>
+          <p:cNvSpPr txBox="1"/>
+          <p:nvPr/>
+        </p:nvSpPr>
+        <p:spPr>
+          <a:xfrm>
+            <a:off x="5259859" y="2364259"/>
+            <a:ext cx="3122142" cy="2677656"/>
+          </a:xfrm>
+          <a:prstGeom prst="rect">
+            <a:avLst/>
+          </a:prstGeom>
+          <a:noFill/>
+        </p:spPr>
+        <p:txBody>
+          <a:bodyPr wrap="square" rtlCol="0">
+            <a:spAutoFit/>
+          </a:bodyPr>
+          <a:lstStyle/>
+          <a:p>
+            <a:pPr marL="285750" indent="-285750">
+              <a:buFont typeface="Arial" panose="020B0604020202020204" pitchFamily="34" charset="0"/>
+              <a:buChar char="•"/>
+            </a:pPr>
+            <a:r>
+              <a:rPr lang="en-CA" sz="2800" dirty="0" smtClean="0"/>
+              <a:t>Distributed</a:t>
+            </a:r>
+            <a:endParaRPr lang="en-CA" sz="2800" dirty="0" smtClean="0"/>
+          </a:p>
+          <a:p>
+            <a:pPr marL="285750" indent="-285750">
+              <a:buFont typeface="Arial" panose="020B0604020202020204" pitchFamily="34" charset="0"/>
+              <a:buChar char="•"/>
+            </a:pPr>
+            <a:r>
+              <a:rPr lang="en-CA" sz="2800" dirty="0" smtClean="0"/>
+              <a:t>Concurrency</a:t>
+            </a:r>
+          </a:p>
+          <a:p>
+            <a:pPr marL="285750" indent="-285750">
+              <a:buFont typeface="Arial" panose="020B0604020202020204" pitchFamily="34" charset="0"/>
+              <a:buChar char="•"/>
+            </a:pPr>
+            <a:r>
+              <a:rPr lang="en-CA" sz="2800" dirty="0" smtClean="0"/>
+              <a:t>Real time</a:t>
+            </a:r>
+          </a:p>
+          <a:p>
+            <a:pPr marL="285750" indent="-285750">
+              <a:buFont typeface="Arial" panose="020B0604020202020204" pitchFamily="34" charset="0"/>
+              <a:buChar char="•"/>
+            </a:pPr>
+            <a:r>
+              <a:rPr lang="en-CA" sz="2800" dirty="0" smtClean="0"/>
+              <a:t>Architectural</a:t>
+            </a:r>
+            <a:endParaRPr lang="en-CA" sz="2800" dirty="0" smtClean="0"/>
+          </a:p>
+          <a:p>
+            <a:endParaRPr lang="en-CA" sz="2800" dirty="0" smtClean="0"/>
+          </a:p>
+          <a:p>
+            <a:pPr marL="285750" indent="-285750">
+              <a:buFont typeface="Arial" panose="020B0604020202020204" pitchFamily="34" charset="0"/>
+              <a:buChar char="•"/>
+            </a:pPr>
+            <a:endParaRPr lang="en-CA" sz="2800" dirty="0" smtClean="0"/>
+          </a:p>
+        </p:txBody>
+      </p:sp>
+    </p:spTree>
+    <p:extLst>
+      <p:ext uri="{BB962C8B-B14F-4D97-AF65-F5344CB8AC3E}">
+        <p14:creationId xmlns:p14="http://schemas.microsoft.com/office/powerpoint/2010/main" val="3197916234"/>
+      </p:ext>
+    </p:extLst>
+  </p:cSld>
+  <p:clrMapOvr>
+    <a:masterClrMapping/>
+  </p:clrMapOvr>
+</p:sld>
+</file>
+
+<file path=ppt/slides/slide9.xml><?xml version="1.0" encoding="utf-8"?>
+<p:sld xmlns:a="http://schemas.openxmlformats.org/drawingml/2006/main" xmlns:r="http://schemas.openxmlformats.org/officeDocument/2006/relationships" xmlns:p="http://schemas.openxmlformats.org/presentationml/2006/main">
+  <p:cSld>
+    <p:spTree>
+      <p:nvGrpSpPr>
+        <p:cNvPr id="1" name=""/>
+        <p:cNvGrpSpPr/>
+        <p:nvPr/>
+      </p:nvGrpSpPr>
+      <p:grpSpPr>
+        <a:xfrm>
+          <a:off x="0" y="0"/>
+          <a:ext cx="0" cy="0"/>
+          <a:chOff x="0" y="0"/>
+          <a:chExt cx="0" cy="0"/>
+        </a:xfrm>
+      </p:grpSpPr>
+      <p:sp>
+        <p:nvSpPr>
+          <p:cNvPr id="2" name="TextBox 1"/>
+          <p:cNvSpPr txBox="1"/>
+          <p:nvPr/>
+        </p:nvSpPr>
+        <p:spPr>
+          <a:xfrm>
+            <a:off x="0" y="-3025"/>
+            <a:ext cx="11467070" cy="769441"/>
+          </a:xfrm>
+          <a:prstGeom prst="rect">
+            <a:avLst/>
+          </a:prstGeom>
+          <a:noFill/>
+        </p:spPr>
+        <p:txBody>
+          <a:bodyPr wrap="square" rtlCol="0">
+            <a:spAutoFit/>
+          </a:bodyPr>
+          <a:lstStyle/>
+          <a:p>
+            <a:r>
+              <a:rPr lang="en-CA" sz="4400" dirty="0" smtClean="0"/>
+              <a:t>Design Patterns Structure</a:t>
+            </a:r>
+            <a:endParaRPr lang="en-CA" sz="4400" dirty="0"/>
+          </a:p>
+        </p:txBody>
+      </p:sp>
+      <p:sp>
+        <p:nvSpPr>
+          <p:cNvPr id="3" name="TextBox 2"/>
+          <p:cNvSpPr txBox="1"/>
+          <p:nvPr/>
+        </p:nvSpPr>
+        <p:spPr>
+          <a:xfrm>
+            <a:off x="1771134" y="2364259"/>
+            <a:ext cx="8748585" cy="2246769"/>
+          </a:xfrm>
+          <a:prstGeom prst="rect">
+            <a:avLst/>
+          </a:prstGeom>
+          <a:noFill/>
+        </p:spPr>
+        <p:txBody>
+          <a:bodyPr wrap="square" rtlCol="0">
+            <a:spAutoFit/>
+          </a:bodyPr>
+          <a:lstStyle/>
+          <a:p>
+            <a:pPr marL="285750" indent="-285750">
+              <a:buFont typeface="Arial" panose="020B0604020202020204" pitchFamily="34" charset="0"/>
+              <a:buChar char="•"/>
+            </a:pPr>
+            <a:r>
+              <a:rPr lang="en-CA" sz="2800" dirty="0" smtClean="0"/>
+              <a:t>Definition</a:t>
+            </a:r>
+          </a:p>
+          <a:p>
+            <a:pPr marL="285750" indent="-285750">
+              <a:buFont typeface="Arial" panose="020B0604020202020204" pitchFamily="34" charset="0"/>
+              <a:buChar char="•"/>
+            </a:pPr>
+            <a:r>
+              <a:rPr lang="en-CA" sz="2800" dirty="0" smtClean="0"/>
+              <a:t>UML </a:t>
+            </a:r>
+          </a:p>
+          <a:p>
+            <a:pPr marL="285750" indent="-285750">
+              <a:buFont typeface="Arial" panose="020B0604020202020204" pitchFamily="34" charset="0"/>
+              <a:buChar char="•"/>
+            </a:pPr>
+            <a:r>
+              <a:rPr lang="en-CA" sz="2800" dirty="0" smtClean="0"/>
+              <a:t>Collaborators or Participants</a:t>
+            </a:r>
+          </a:p>
+          <a:p>
+            <a:pPr marL="285750" indent="-285750">
+              <a:buFont typeface="Arial" panose="020B0604020202020204" pitchFamily="34" charset="0"/>
+              <a:buChar char="•"/>
+            </a:pPr>
+            <a:r>
+              <a:rPr lang="en-CA" sz="2800" dirty="0" smtClean="0"/>
+              <a:t>Code Example</a:t>
+            </a:r>
+          </a:p>
+          <a:p>
+            <a:pPr marL="285750" indent="-285750">
+              <a:buFont typeface="Arial" panose="020B0604020202020204" pitchFamily="34" charset="0"/>
+              <a:buChar char="•"/>
+            </a:pPr>
+            <a:r>
+              <a:rPr lang="en-CA" sz="2800" dirty="0" smtClean="0"/>
+              <a:t>Real World Example</a:t>
+            </a:r>
+            <a:endParaRPr lang="en-CA" sz="2800" dirty="0" smtClean="0"/>
+          </a:p>
+        </p:txBody>
+      </p:sp>
+    </p:spTree>
+    <p:extLst>
+      <p:ext uri="{BB962C8B-B14F-4D97-AF65-F5344CB8AC3E}">
+        <p14:creationId xmlns:p14="http://schemas.microsoft.com/office/powerpoint/2010/main" val="1893907108"/>
       </p:ext>
     </p:extLst>
   </p:cSld>

</xml_diff>

<commit_message>
Added the code for the factory and singleton
</commit_message>
<xml_diff>
--- a/DesignPatterns101.pptx
+++ b/DesignPatterns101.pptx
@@ -3768,6 +3768,99 @@
           </a:p>
         </p:txBody>
       </p:sp>
+      <p:sp>
+        <p:nvSpPr>
+          <p:cNvPr id="3" name="TextBox 2"/>
+          <p:cNvSpPr txBox="1"/>
+          <p:nvPr/>
+        </p:nvSpPr>
+        <p:spPr>
+          <a:xfrm>
+            <a:off x="502507" y="766416"/>
+            <a:ext cx="8748585" cy="4278094"/>
+          </a:xfrm>
+          <a:prstGeom prst="rect">
+            <a:avLst/>
+          </a:prstGeom>
+          <a:noFill/>
+        </p:spPr>
+        <p:txBody>
+          <a:bodyPr wrap="square" rtlCol="0">
+            <a:spAutoFit/>
+          </a:bodyPr>
+          <a:lstStyle/>
+          <a:p>
+            <a:pPr marL="285750" indent="-285750">
+              <a:buFont typeface="Arial" panose="020B0604020202020204" pitchFamily="34" charset="0"/>
+              <a:buChar char="•"/>
+            </a:pPr>
+            <a:r>
+              <a:rPr lang="en-CA" sz="2800" dirty="0" smtClean="0"/>
+              <a:t>Definition:</a:t>
+            </a:r>
+          </a:p>
+          <a:p>
+            <a:pPr lvl="1"/>
+            <a:r>
+              <a:rPr lang="en-CA" sz="2000" dirty="0" smtClean="0"/>
+              <a:t>Ensures that a class has only one instance and provides a global access point to it</a:t>
+            </a:r>
+            <a:endParaRPr lang="en-CA" sz="2000" dirty="0"/>
+          </a:p>
+          <a:p>
+            <a:pPr marL="285750" indent="-285750">
+              <a:buFont typeface="Arial" panose="020B0604020202020204" pitchFamily="34" charset="0"/>
+              <a:buChar char="•"/>
+            </a:pPr>
+            <a:endParaRPr lang="en-CA" sz="2800" dirty="0" smtClean="0"/>
+          </a:p>
+          <a:p>
+            <a:pPr marL="285750" indent="-285750">
+              <a:buFont typeface="Arial" panose="020B0604020202020204" pitchFamily="34" charset="0"/>
+              <a:buChar char="•"/>
+            </a:pPr>
+            <a:endParaRPr lang="en-CA" sz="2800" dirty="0"/>
+          </a:p>
+          <a:p>
+            <a:pPr marL="285750" indent="-285750">
+              <a:buFont typeface="Arial" panose="020B0604020202020204" pitchFamily="34" charset="0"/>
+              <a:buChar char="•"/>
+            </a:pPr>
+            <a:r>
+              <a:rPr lang="en-CA" sz="2800" dirty="0" smtClean="0"/>
+              <a:t>Participants</a:t>
+            </a:r>
+          </a:p>
+          <a:p>
+            <a:pPr lvl="1"/>
+            <a:r>
+              <a:rPr lang="en-CA" sz="2000" b="1" dirty="0" smtClean="0"/>
+              <a:t>Singleton Class: </a:t>
+            </a:r>
+          </a:p>
+          <a:p>
+            <a:pPr lvl="2"/>
+            <a:r>
+              <a:rPr lang="en-CA" sz="1600" dirty="0" smtClean="0"/>
+              <a:t>Defines and manage the unique class instance and provide access to all clients.</a:t>
+            </a:r>
+            <a:endParaRPr lang="en-CA" sz="2000" dirty="0"/>
+          </a:p>
+          <a:p>
+            <a:endParaRPr lang="en-CA" sz="2800" dirty="0" smtClean="0"/>
+          </a:p>
+          <a:p>
+            <a:endParaRPr lang="en-CA" sz="2800" dirty="0"/>
+          </a:p>
+          <a:p>
+            <a:r>
+              <a:rPr lang="en-CA" sz="2800" dirty="0" smtClean="0"/>
+              <a:t>sample code… </a:t>
+            </a:r>
+            <a:endParaRPr lang="en-CA" sz="2800" dirty="0"/>
+          </a:p>
+        </p:txBody>
+      </p:sp>
     </p:spTree>
     <p:extLst>
       <p:ext uri="{BB962C8B-B14F-4D97-AF65-F5344CB8AC3E}">
@@ -3825,6 +3918,121 @@
               <a:t>Template Method Pattern</a:t>
             </a:r>
             <a:endParaRPr lang="en-CA" sz="4400" dirty="0"/>
+          </a:p>
+        </p:txBody>
+      </p:sp>
+      <p:sp>
+        <p:nvSpPr>
+          <p:cNvPr id="3" name="TextBox 2"/>
+          <p:cNvSpPr txBox="1"/>
+          <p:nvPr/>
+        </p:nvSpPr>
+        <p:spPr>
+          <a:xfrm>
+            <a:off x="502507" y="766416"/>
+            <a:ext cx="8748585" cy="5324535"/>
+          </a:xfrm>
+          <a:prstGeom prst="rect">
+            <a:avLst/>
+          </a:prstGeom>
+          <a:noFill/>
+        </p:spPr>
+        <p:txBody>
+          <a:bodyPr wrap="square" rtlCol="0">
+            <a:spAutoFit/>
+          </a:bodyPr>
+          <a:lstStyle/>
+          <a:p>
+            <a:pPr marL="285750" indent="-285750">
+              <a:buFont typeface="Arial" panose="020B0604020202020204" pitchFamily="34" charset="0"/>
+              <a:buChar char="•"/>
+            </a:pPr>
+            <a:r>
+              <a:rPr lang="en-CA" sz="2800" dirty="0" smtClean="0"/>
+              <a:t>Definition:</a:t>
+            </a:r>
+          </a:p>
+          <a:p>
+            <a:pPr lvl="1"/>
+            <a:r>
+              <a:rPr lang="en-CA" sz="2000" dirty="0" smtClean="0"/>
+              <a:t>Defines the skeleton of an algorithm in discrete operation, deferring steps to the subclasses. Lets subclasses redefine certain or all steps. </a:t>
+            </a:r>
+            <a:endParaRPr lang="en-CA" sz="2000" dirty="0"/>
+          </a:p>
+          <a:p>
+            <a:endParaRPr lang="en-CA" sz="2800" dirty="0"/>
+          </a:p>
+          <a:p>
+            <a:pPr marL="285750" indent="-285750">
+              <a:buFont typeface="Arial" panose="020B0604020202020204" pitchFamily="34" charset="0"/>
+              <a:buChar char="•"/>
+            </a:pPr>
+            <a:r>
+              <a:rPr lang="en-CA" sz="2800" dirty="0" smtClean="0"/>
+              <a:t>Participants</a:t>
+            </a:r>
+          </a:p>
+          <a:p>
+            <a:pPr lvl="1"/>
+            <a:r>
+              <a:rPr lang="en-CA" sz="2000" b="1" dirty="0" smtClean="0"/>
+              <a:t>Abstract Class (Template) : </a:t>
+            </a:r>
+          </a:p>
+          <a:p>
+            <a:pPr lvl="2"/>
+            <a:r>
+              <a:rPr lang="en-CA" sz="1600" dirty="0" smtClean="0"/>
+              <a:t>Defines the algorithm and the primitive operations that the concrete classes will implement. Calls the primitive abstract operation inside the defined algorithm as well as other defined locally </a:t>
+            </a:r>
+          </a:p>
+          <a:p>
+            <a:pPr lvl="1"/>
+            <a:r>
+              <a:rPr lang="en-CA" sz="2000" b="1" dirty="0" smtClean="0"/>
+              <a:t>Concrete Class (Implementation) </a:t>
+            </a:r>
+            <a:r>
+              <a:rPr lang="en-CA" sz="2000" b="1" dirty="0"/>
+              <a:t>: </a:t>
+            </a:r>
+          </a:p>
+          <a:p>
+            <a:pPr lvl="2"/>
+            <a:r>
+              <a:rPr lang="en-CA" sz="1600" dirty="0" smtClean="0"/>
+              <a:t>Provides the implementation of the primitive operation by sub classing the abstract class or template.</a:t>
+            </a:r>
+            <a:endParaRPr lang="en-CA" sz="2000" dirty="0"/>
+          </a:p>
+          <a:p>
+            <a:pPr lvl="1"/>
+            <a:endParaRPr lang="en-CA" sz="2000" dirty="0"/>
+          </a:p>
+          <a:p>
+            <a:pPr marL="457200" indent="-457200">
+              <a:buFont typeface="Arial" panose="020B0604020202020204" pitchFamily="34" charset="0"/>
+              <a:buChar char="•"/>
+            </a:pPr>
+            <a:r>
+              <a:rPr lang="en-CA" sz="2800" dirty="0" smtClean="0"/>
+              <a:t>Real World Example </a:t>
+            </a:r>
+          </a:p>
+          <a:p>
+            <a:pPr lvl="2"/>
+            <a:r>
+              <a:rPr lang="en-CA" sz="2000" b="1" dirty="0" err="1" smtClean="0"/>
+              <a:t>System.Web.UI.Page</a:t>
+            </a:r>
+            <a:r>
+              <a:rPr lang="en-CA" sz="2000" dirty="0" smtClean="0"/>
+              <a:t> asp.net web forms page.</a:t>
+            </a:r>
+          </a:p>
+          <a:p>
+            <a:endParaRPr lang="en-CA" sz="2800" dirty="0"/>
           </a:p>
         </p:txBody>
       </p:sp>

</xml_diff>

<commit_message>
Added more samples and updated the powerpoint presentation
</commit_message>
<xml_diff>
--- a/DesignPatterns101.pptx
+++ b/DesignPatterns101.pptx
@@ -22,6 +22,20 @@
     <p:sldId id="270" r:id="rId16"/>
     <p:sldId id="271" r:id="rId17"/>
     <p:sldId id="272" r:id="rId18"/>
+    <p:sldId id="273" r:id="rId19"/>
+    <p:sldId id="286" r:id="rId20"/>
+    <p:sldId id="274" r:id="rId21"/>
+    <p:sldId id="275" r:id="rId22"/>
+    <p:sldId id="276" r:id="rId23"/>
+    <p:sldId id="277" r:id="rId24"/>
+    <p:sldId id="278" r:id="rId25"/>
+    <p:sldId id="279" r:id="rId26"/>
+    <p:sldId id="280" r:id="rId27"/>
+    <p:sldId id="281" r:id="rId28"/>
+    <p:sldId id="282" r:id="rId29"/>
+    <p:sldId id="283" r:id="rId30"/>
+    <p:sldId id="284" r:id="rId31"/>
+    <p:sldId id="285" r:id="rId32"/>
   </p:sldIdLst>
   <p:sldSz cx="12192000" cy="6858000"/>
   <p:notesSz cx="6858000" cy="9144000"/>
@@ -259,7 +273,7 @@
           <a:p>
             <a:fld id="{3C4E0F72-D2FF-4111-90E8-951B982DCE49}" type="datetimeFigureOut">
               <a:rPr lang="en-CA" smtClean="0"/>
-              <a:t>2014-10-24</a:t>
+              <a:t>2014-10-29</a:t>
             </a:fld>
             <a:endParaRPr lang="en-CA"/>
           </a:p>
@@ -429,7 +443,7 @@
           <a:p>
             <a:fld id="{3C4E0F72-D2FF-4111-90E8-951B982DCE49}" type="datetimeFigureOut">
               <a:rPr lang="en-CA" smtClean="0"/>
-              <a:t>2014-10-24</a:t>
+              <a:t>2014-10-29</a:t>
             </a:fld>
             <a:endParaRPr lang="en-CA"/>
           </a:p>
@@ -609,7 +623,7 @@
           <a:p>
             <a:fld id="{3C4E0F72-D2FF-4111-90E8-951B982DCE49}" type="datetimeFigureOut">
               <a:rPr lang="en-CA" smtClean="0"/>
-              <a:t>2014-10-24</a:t>
+              <a:t>2014-10-29</a:t>
             </a:fld>
             <a:endParaRPr lang="en-CA"/>
           </a:p>
@@ -779,7 +793,7 @@
           <a:p>
             <a:fld id="{3C4E0F72-D2FF-4111-90E8-951B982DCE49}" type="datetimeFigureOut">
               <a:rPr lang="en-CA" smtClean="0"/>
-              <a:t>2014-10-24</a:t>
+              <a:t>2014-10-29</a:t>
             </a:fld>
             <a:endParaRPr lang="en-CA"/>
           </a:p>
@@ -1025,7 +1039,7 @@
           <a:p>
             <a:fld id="{3C4E0F72-D2FF-4111-90E8-951B982DCE49}" type="datetimeFigureOut">
               <a:rPr lang="en-CA" smtClean="0"/>
-              <a:t>2014-10-24</a:t>
+              <a:t>2014-10-29</a:t>
             </a:fld>
             <a:endParaRPr lang="en-CA"/>
           </a:p>
@@ -1257,7 +1271,7 @@
           <a:p>
             <a:fld id="{3C4E0F72-D2FF-4111-90E8-951B982DCE49}" type="datetimeFigureOut">
               <a:rPr lang="en-CA" smtClean="0"/>
-              <a:t>2014-10-24</a:t>
+              <a:t>2014-10-29</a:t>
             </a:fld>
             <a:endParaRPr lang="en-CA"/>
           </a:p>
@@ -1624,7 +1638,7 @@
           <a:p>
             <a:fld id="{3C4E0F72-D2FF-4111-90E8-951B982DCE49}" type="datetimeFigureOut">
               <a:rPr lang="en-CA" smtClean="0"/>
-              <a:t>2014-10-24</a:t>
+              <a:t>2014-10-29</a:t>
             </a:fld>
             <a:endParaRPr lang="en-CA"/>
           </a:p>
@@ -1742,7 +1756,7 @@
           <a:p>
             <a:fld id="{3C4E0F72-D2FF-4111-90E8-951B982DCE49}" type="datetimeFigureOut">
               <a:rPr lang="en-CA" smtClean="0"/>
-              <a:t>2014-10-24</a:t>
+              <a:t>2014-10-29</a:t>
             </a:fld>
             <a:endParaRPr lang="en-CA"/>
           </a:p>
@@ -1837,7 +1851,7 @@
           <a:p>
             <a:fld id="{3C4E0F72-D2FF-4111-90E8-951B982DCE49}" type="datetimeFigureOut">
               <a:rPr lang="en-CA" smtClean="0"/>
-              <a:t>2014-10-24</a:t>
+              <a:t>2014-10-29</a:t>
             </a:fld>
             <a:endParaRPr lang="en-CA"/>
           </a:p>
@@ -2114,7 +2128,7 @@
           <a:p>
             <a:fld id="{3C4E0F72-D2FF-4111-90E8-951B982DCE49}" type="datetimeFigureOut">
               <a:rPr lang="en-CA" smtClean="0"/>
-              <a:t>2014-10-24</a:t>
+              <a:t>2014-10-29</a:t>
             </a:fld>
             <a:endParaRPr lang="en-CA"/>
           </a:p>
@@ -2367,7 +2381,7 @@
           <a:p>
             <a:fld id="{3C4E0F72-D2FF-4111-90E8-951B982DCE49}" type="datetimeFigureOut">
               <a:rPr lang="en-CA" smtClean="0"/>
-              <a:t>2014-10-24</a:t>
+              <a:t>2014-10-29</a:t>
             </a:fld>
             <a:endParaRPr lang="en-CA"/>
           </a:p>
@@ -2580,7 +2594,7 @@
           <a:p>
             <a:fld id="{3C4E0F72-D2FF-4111-90E8-951B982DCE49}" type="datetimeFigureOut">
               <a:rPr lang="en-CA" smtClean="0"/>
-              <a:t>2014-10-24</a:t>
+              <a:t>2014-10-29</a:t>
             </a:fld>
             <a:endParaRPr lang="en-CA"/>
           </a:p>
@@ -3133,7 +3147,6 @@
                   <a:rPr lang="en-CA" sz="2800" dirty="0" smtClean="0"/>
                   <a:t>Abstract Factory</a:t>
                 </a:r>
-                <a:endParaRPr lang="en-CA" sz="2800" dirty="0" smtClean="0"/>
               </a:p>
               <a:p>
                 <a:pPr marL="285750" indent="-285750">
@@ -3164,7 +3177,6 @@
                   <a:rPr lang="en-CA" sz="2800" dirty="0" smtClean="0"/>
                   <a:t>Prototype  </a:t>
                 </a:r>
-                <a:endParaRPr lang="en-CA" sz="2800" dirty="0" smtClean="0"/>
               </a:p>
               <a:p>
                 <a:pPr marL="285750" indent="-285750">
@@ -3175,7 +3187,6 @@
                   <a:rPr lang="en-CA" sz="2800" dirty="0" smtClean="0"/>
                   <a:t>Singleton</a:t>
                 </a:r>
-                <a:endParaRPr lang="en-CA" sz="2800" dirty="0" smtClean="0"/>
               </a:p>
               <a:p>
                 <a:pPr marL="285750" indent="-285750">
@@ -3261,7 +3272,6 @@
                   <a:rPr lang="en-CA" sz="2800" dirty="0" smtClean="0"/>
                   <a:t>Adapter</a:t>
                 </a:r>
-                <a:endParaRPr lang="en-CA" sz="2800" dirty="0" smtClean="0"/>
               </a:p>
               <a:p>
                 <a:pPr marL="285750" indent="-285750">
@@ -3292,7 +3302,6 @@
                   <a:rPr lang="en-CA" sz="2800" dirty="0" smtClean="0"/>
                   <a:t>Decorator  </a:t>
                 </a:r>
-                <a:endParaRPr lang="en-CA" sz="2800" dirty="0" smtClean="0"/>
               </a:p>
               <a:p>
                 <a:pPr marL="285750" indent="-285750">
@@ -3323,7 +3332,6 @@
                   <a:rPr lang="en-CA" sz="2800" dirty="0" smtClean="0"/>
                   <a:t>Proxy</a:t>
                 </a:r>
-                <a:endParaRPr lang="en-CA" sz="2800" dirty="0" smtClean="0"/>
               </a:p>
               <a:p>
                 <a:pPr marL="285750" indent="-285750">
@@ -3409,7 +3417,6 @@
                   <a:rPr lang="en-CA" sz="2800" dirty="0" smtClean="0"/>
                   <a:t>Chain of Resp.</a:t>
                 </a:r>
-                <a:endParaRPr lang="en-CA" sz="2800" dirty="0" smtClean="0"/>
               </a:p>
               <a:p>
                 <a:pPr marL="285750" indent="-285750">
@@ -3440,7 +3447,6 @@
                   <a:rPr lang="en-CA" sz="2800" dirty="0" smtClean="0"/>
                   <a:t>Iterator</a:t>
                 </a:r>
-                <a:endParaRPr lang="en-CA" sz="2800" dirty="0" smtClean="0"/>
               </a:p>
               <a:p>
                 <a:pPr marL="285750" indent="-285750">
@@ -3451,7 +3457,6 @@
                   <a:rPr lang="en-CA" sz="2800" dirty="0" smtClean="0"/>
                   <a:t>Mediator</a:t>
                 </a:r>
-                <a:endParaRPr lang="en-CA" sz="2800" dirty="0" smtClean="0"/>
               </a:p>
               <a:p>
                 <a:pPr marL="285750" indent="-285750">
@@ -3512,7 +3517,6 @@
                   <a:rPr lang="en-CA" sz="2800" dirty="0" smtClean="0"/>
                   <a:t>Visitor</a:t>
                 </a:r>
-                <a:endParaRPr lang="en-CA" sz="2800" dirty="0" smtClean="0"/>
               </a:p>
               <a:p>
                 <a:pPr marL="285750" indent="-285750">
@@ -3645,7 +3649,6 @@
               <a:rPr lang="en-CA" sz="2800" dirty="0" smtClean="0"/>
               <a:t>Strategy</a:t>
             </a:r>
-            <a:endParaRPr lang="en-CA" sz="2800" dirty="0" smtClean="0"/>
           </a:p>
           <a:p>
             <a:pPr marL="285750" indent="-285750">
@@ -3676,7 +3679,6 @@
               <a:rPr lang="en-CA" sz="2800" dirty="0" smtClean="0"/>
               <a:t>Chain of Responsibility </a:t>
             </a:r>
-            <a:endParaRPr lang="en-CA" sz="2800" dirty="0" smtClean="0"/>
           </a:p>
           <a:p>
             <a:pPr marL="285750" indent="-285750">
@@ -3697,7 +3699,6 @@
               <a:rPr lang="en-CA" sz="2800" dirty="0" smtClean="0"/>
               <a:t>Template Method</a:t>
             </a:r>
-            <a:endParaRPr lang="en-CA" sz="2800" dirty="0" smtClean="0"/>
           </a:p>
           <a:p>
             <a:pPr marL="285750" indent="-285750">
@@ -3850,12 +3851,20 @@
             <a:endParaRPr lang="en-CA" sz="2800" dirty="0" smtClean="0"/>
           </a:p>
           <a:p>
-            <a:endParaRPr lang="en-CA" sz="2800" dirty="0"/>
-          </a:p>
-          <a:p>
-            <a:r>
-              <a:rPr lang="en-CA" sz="2800" dirty="0" smtClean="0"/>
-              <a:t>sample code… </a:t>
+            <a:pPr marL="457200" indent="-457200">
+              <a:buFont typeface="Arial" panose="020B0604020202020204" pitchFamily="34" charset="0"/>
+              <a:buChar char="•"/>
+            </a:pPr>
+            <a:r>
+              <a:rPr lang="en-CA" sz="2800" dirty="0" smtClean="0"/>
+              <a:t>Real World Example </a:t>
+            </a:r>
+          </a:p>
+          <a:p>
+            <a:pPr lvl="1"/>
+            <a:r>
+              <a:rPr lang="en-CA" sz="2800" dirty="0" smtClean="0"/>
+              <a:t>System.</a:t>
             </a:r>
             <a:endParaRPr lang="en-CA" sz="2800" dirty="0"/>
           </a:p>
@@ -4090,13 +4099,166 @@
           <a:p>
             <a:r>
               <a:rPr lang="en-CA" sz="4400" dirty="0" smtClean="0"/>
-              <a:t>Factory and Factory Method</a:t>
-            </a:r>
-            <a:r>
-              <a:rPr lang="en-CA" sz="4400" dirty="0" smtClean="0"/>
-              <a:t> Pattern</a:t>
+              <a:t>Factory and Factory Method Pattern</a:t>
             </a:r>
             <a:endParaRPr lang="en-CA" sz="4400" dirty="0"/>
+          </a:p>
+        </p:txBody>
+      </p:sp>
+      <p:sp>
+        <p:nvSpPr>
+          <p:cNvPr id="3" name="TextBox 2"/>
+          <p:cNvSpPr txBox="1"/>
+          <p:nvPr/>
+        </p:nvSpPr>
+        <p:spPr>
+          <a:xfrm>
+            <a:off x="502507" y="766416"/>
+            <a:ext cx="8748585" cy="6001643"/>
+          </a:xfrm>
+          <a:prstGeom prst="rect">
+            <a:avLst/>
+          </a:prstGeom>
+          <a:noFill/>
+        </p:spPr>
+        <p:txBody>
+          <a:bodyPr wrap="square" rtlCol="0">
+            <a:spAutoFit/>
+          </a:bodyPr>
+          <a:lstStyle/>
+          <a:p>
+            <a:pPr marL="285750" indent="-285750">
+              <a:buFont typeface="Arial" panose="020B0604020202020204" pitchFamily="34" charset="0"/>
+              <a:buChar char="•"/>
+            </a:pPr>
+            <a:r>
+              <a:rPr lang="en-CA" sz="2800" dirty="0" smtClean="0"/>
+              <a:t>Definition:</a:t>
+            </a:r>
+          </a:p>
+          <a:p>
+            <a:pPr lvl="1"/>
+            <a:r>
+              <a:rPr lang="en-US" sz="2000" dirty="0"/>
+              <a:t>Define an interface for creating an object, but let subclasses decide which class to instantiate. Factory Method lets a class defer instantiation to subclasses</a:t>
+            </a:r>
+            <a:r>
+              <a:rPr lang="en-US" sz="2000" dirty="0" smtClean="0"/>
+              <a:t>.</a:t>
+            </a:r>
+            <a:r>
+              <a:rPr lang="en-CA" sz="2000" dirty="0" smtClean="0"/>
+              <a:t> </a:t>
+            </a:r>
+            <a:endParaRPr lang="en-CA" sz="2000" dirty="0"/>
+          </a:p>
+          <a:p>
+            <a:endParaRPr lang="en-CA" sz="2800" dirty="0"/>
+          </a:p>
+          <a:p>
+            <a:pPr marL="285750" indent="-285750">
+              <a:buFont typeface="Arial" panose="020B0604020202020204" pitchFamily="34" charset="0"/>
+              <a:buChar char="•"/>
+            </a:pPr>
+            <a:r>
+              <a:rPr lang="en-CA" sz="2800" dirty="0" smtClean="0"/>
+              <a:t>Participants</a:t>
+            </a:r>
+          </a:p>
+          <a:p>
+            <a:pPr lvl="1"/>
+            <a:r>
+              <a:rPr lang="en-CA" sz="2000" b="1" dirty="0" smtClean="0"/>
+              <a:t>Product  : </a:t>
+            </a:r>
+          </a:p>
+          <a:p>
+            <a:pPr lvl="2"/>
+            <a:r>
+              <a:rPr lang="en-CA" sz="1600" dirty="0" smtClean="0"/>
+              <a:t>Defines the interface of the objects to be created </a:t>
+            </a:r>
+          </a:p>
+          <a:p>
+            <a:pPr lvl="2"/>
+            <a:r>
+              <a:rPr lang="en-CA" sz="1600" dirty="0" smtClean="0"/>
+              <a:t> </a:t>
+            </a:r>
+          </a:p>
+          <a:p>
+            <a:pPr lvl="1"/>
+            <a:r>
+              <a:rPr lang="en-CA" sz="2000" b="1" dirty="0" smtClean="0"/>
+              <a:t>Concrete Product </a:t>
+            </a:r>
+            <a:r>
+              <a:rPr lang="en-CA" sz="2000" b="1" dirty="0"/>
+              <a:t>: </a:t>
+            </a:r>
+          </a:p>
+          <a:p>
+            <a:pPr lvl="2"/>
+            <a:r>
+              <a:rPr lang="en-CA" sz="1600" dirty="0" smtClean="0"/>
+              <a:t>Concrete product implementation or implementation of the interface.</a:t>
+            </a:r>
+          </a:p>
+          <a:p>
+            <a:pPr lvl="1"/>
+            <a:endParaRPr lang="en-CA" sz="2000" dirty="0"/>
+          </a:p>
+          <a:p>
+            <a:pPr lvl="1"/>
+            <a:r>
+              <a:rPr lang="en-CA" sz="2000" b="1" dirty="0" smtClean="0"/>
+              <a:t>Creator : </a:t>
+            </a:r>
+            <a:endParaRPr lang="en-CA" sz="2000" b="1" dirty="0"/>
+          </a:p>
+          <a:p>
+            <a:pPr lvl="2"/>
+            <a:r>
+              <a:rPr lang="en-CA" sz="1600" dirty="0"/>
+              <a:t>Provides the </a:t>
+            </a:r>
+            <a:r>
+              <a:rPr lang="en-CA" sz="1600" dirty="0" smtClean="0"/>
+              <a:t>factory method that will return the concrete implementation.</a:t>
+            </a:r>
+            <a:endParaRPr lang="en-CA" sz="1600" dirty="0"/>
+          </a:p>
+          <a:p>
+            <a:pPr lvl="1"/>
+            <a:endParaRPr lang="en-CA" sz="2000" dirty="0"/>
+          </a:p>
+          <a:p>
+            <a:pPr marL="457200" indent="-457200">
+              <a:buFont typeface="Arial" panose="020B0604020202020204" pitchFamily="34" charset="0"/>
+              <a:buChar char="•"/>
+            </a:pPr>
+            <a:r>
+              <a:rPr lang="en-CA" sz="2800" dirty="0" smtClean="0"/>
+              <a:t>Real World Example </a:t>
+            </a:r>
+          </a:p>
+          <a:p>
+            <a:pPr lvl="2"/>
+            <a:r>
+              <a:rPr lang="en-CA" sz="2000" b="1" dirty="0" err="1" smtClean="0"/>
+              <a:t>System.Guid.NewGuid</a:t>
+            </a:r>
+            <a:r>
+              <a:rPr lang="en-CA" sz="2000" b="1" dirty="0" smtClean="0"/>
+              <a:t>()</a:t>
+            </a:r>
+            <a:r>
+              <a:rPr lang="en-CA" sz="2000" dirty="0" smtClean="0"/>
+              <a:t> .NET framework GUID type.</a:t>
+            </a:r>
+          </a:p>
+          <a:p>
+            <a:endParaRPr lang="en-CA" sz="2800" dirty="0"/>
           </a:p>
         </p:txBody>
       </p:sp>
@@ -4160,6 +4322,157 @@
           </a:p>
         </p:txBody>
       </p:sp>
+      <p:sp>
+        <p:nvSpPr>
+          <p:cNvPr id="3" name="TextBox 2"/>
+          <p:cNvSpPr txBox="1"/>
+          <p:nvPr/>
+        </p:nvSpPr>
+        <p:spPr>
+          <a:xfrm>
+            <a:off x="502507" y="766416"/>
+            <a:ext cx="8748585" cy="6001643"/>
+          </a:xfrm>
+          <a:prstGeom prst="rect">
+            <a:avLst/>
+          </a:prstGeom>
+          <a:noFill/>
+        </p:spPr>
+        <p:txBody>
+          <a:bodyPr wrap="square" rtlCol="0">
+            <a:spAutoFit/>
+          </a:bodyPr>
+          <a:lstStyle/>
+          <a:p>
+            <a:pPr marL="285750" indent="-285750">
+              <a:buFont typeface="Arial" panose="020B0604020202020204" pitchFamily="34" charset="0"/>
+              <a:buChar char="•"/>
+            </a:pPr>
+            <a:r>
+              <a:rPr lang="en-CA" sz="2800" dirty="0" smtClean="0"/>
+              <a:t>Definition:</a:t>
+            </a:r>
+          </a:p>
+          <a:p>
+            <a:pPr lvl="1"/>
+            <a:r>
+              <a:rPr lang="en-US" sz="2000" dirty="0"/>
+              <a:t>Define a family of algorithms, encapsulate each one, and make them interchangeable. Strategy lets the algorithm vary independently from clients that use </a:t>
+            </a:r>
+            <a:r>
+              <a:rPr lang="en-US" sz="2000" dirty="0" smtClean="0"/>
+              <a:t>it.</a:t>
+            </a:r>
+            <a:r>
+              <a:rPr lang="en-CA" sz="2000" dirty="0" smtClean="0"/>
+              <a:t> </a:t>
+            </a:r>
+            <a:endParaRPr lang="en-CA" sz="2000" dirty="0"/>
+          </a:p>
+          <a:p>
+            <a:endParaRPr lang="en-CA" sz="2800" dirty="0"/>
+          </a:p>
+          <a:p>
+            <a:pPr marL="285750" indent="-285750">
+              <a:buFont typeface="Arial" panose="020B0604020202020204" pitchFamily="34" charset="0"/>
+              <a:buChar char="•"/>
+            </a:pPr>
+            <a:r>
+              <a:rPr lang="en-CA" sz="2800" dirty="0" smtClean="0"/>
+              <a:t>Participants</a:t>
+            </a:r>
+          </a:p>
+          <a:p>
+            <a:pPr lvl="1"/>
+            <a:r>
+              <a:rPr lang="en-CA" sz="2000" b="1" dirty="0" smtClean="0"/>
+              <a:t>Strategy: </a:t>
+            </a:r>
+          </a:p>
+          <a:p>
+            <a:pPr lvl="2"/>
+            <a:r>
+              <a:rPr lang="en-CA" sz="1600" dirty="0" smtClean="0"/>
+              <a:t>Defines the interface of how the strategy is going to be used by the context </a:t>
+            </a:r>
+          </a:p>
+          <a:p>
+            <a:pPr lvl="2"/>
+            <a:r>
+              <a:rPr lang="en-CA" sz="1600" dirty="0" smtClean="0"/>
+              <a:t> </a:t>
+            </a:r>
+          </a:p>
+          <a:p>
+            <a:pPr lvl="1"/>
+            <a:r>
+              <a:rPr lang="en-CA" sz="2000" b="1" dirty="0" smtClean="0"/>
+              <a:t>Concrete Strategy: </a:t>
+            </a:r>
+            <a:endParaRPr lang="en-CA" sz="2000" b="1" dirty="0"/>
+          </a:p>
+          <a:p>
+            <a:pPr lvl="2"/>
+            <a:r>
+              <a:rPr lang="en-CA" sz="1600" dirty="0" smtClean="0"/>
+              <a:t>Concrete strategy implementation.</a:t>
+            </a:r>
+          </a:p>
+          <a:p>
+            <a:pPr lvl="1"/>
+            <a:endParaRPr lang="en-CA" sz="2000" dirty="0"/>
+          </a:p>
+          <a:p>
+            <a:pPr lvl="1"/>
+            <a:r>
+              <a:rPr lang="en-CA" sz="2000" b="1" dirty="0" smtClean="0"/>
+              <a:t>Context: </a:t>
+            </a:r>
+            <a:endParaRPr lang="en-CA" sz="2000" b="1" dirty="0"/>
+          </a:p>
+          <a:p>
+            <a:pPr lvl="2"/>
+            <a:r>
+              <a:rPr lang="en-CA" sz="1600" dirty="0" smtClean="0"/>
+              <a:t>Uses the concrete strategy was setup for.</a:t>
+            </a:r>
+            <a:endParaRPr lang="en-CA" sz="1600" dirty="0"/>
+          </a:p>
+          <a:p>
+            <a:pPr lvl="1"/>
+            <a:endParaRPr lang="en-CA" sz="2000" dirty="0"/>
+          </a:p>
+          <a:p>
+            <a:pPr marL="457200" indent="-457200">
+              <a:buFont typeface="Arial" panose="020B0604020202020204" pitchFamily="34" charset="0"/>
+              <a:buChar char="•"/>
+            </a:pPr>
+            <a:r>
+              <a:rPr lang="en-CA" sz="2800" dirty="0" smtClean="0"/>
+              <a:t>Real World Example </a:t>
+            </a:r>
+          </a:p>
+          <a:p>
+            <a:pPr lvl="2"/>
+            <a:r>
+              <a:rPr lang="en-CA" sz="2000" b="1" dirty="0" smtClean="0"/>
+              <a:t>ASP.NET Membership provider, LINQ, List&lt;T&gt;.Sort(</a:t>
+            </a:r>
+            <a:r>
+              <a:rPr lang="en-CA" sz="2000" b="1" dirty="0" err="1" smtClean="0"/>
+              <a:t>IComparer</a:t>
+            </a:r>
+            <a:r>
+              <a:rPr lang="en-CA" sz="2000" b="1" dirty="0" smtClean="0"/>
+              <a:t>&lt;T&gt;)</a:t>
+            </a:r>
+            <a:endParaRPr lang="en-CA" sz="2000" dirty="0" smtClean="0"/>
+          </a:p>
+          <a:p>
+            <a:endParaRPr lang="en-CA" sz="2800" dirty="0"/>
+          </a:p>
+        </p:txBody>
+      </p:sp>
     </p:spTree>
     <p:extLst>
       <p:ext uri="{BB962C8B-B14F-4D97-AF65-F5344CB8AC3E}">
@@ -4214,13 +4527,163 @@
           <a:p>
             <a:r>
               <a:rPr lang="en-CA" sz="4400" dirty="0" smtClean="0"/>
-              <a:t>Chain of Responsibility</a:t>
-            </a:r>
-            <a:r>
-              <a:rPr lang="en-CA" sz="4400" dirty="0" smtClean="0"/>
-              <a:t> Pattern</a:t>
+              <a:t>Chain of Responsibility Pattern</a:t>
             </a:r>
             <a:endParaRPr lang="en-CA" sz="4400" dirty="0"/>
+          </a:p>
+        </p:txBody>
+      </p:sp>
+      <p:sp>
+        <p:nvSpPr>
+          <p:cNvPr id="3" name="TextBox 2"/>
+          <p:cNvSpPr txBox="1"/>
+          <p:nvPr/>
+        </p:nvSpPr>
+        <p:spPr>
+          <a:xfrm>
+            <a:off x="502507" y="766416"/>
+            <a:ext cx="8748585" cy="6001643"/>
+          </a:xfrm>
+          <a:prstGeom prst="rect">
+            <a:avLst/>
+          </a:prstGeom>
+          <a:noFill/>
+        </p:spPr>
+        <p:txBody>
+          <a:bodyPr wrap="square" rtlCol="0">
+            <a:spAutoFit/>
+          </a:bodyPr>
+          <a:lstStyle/>
+          <a:p>
+            <a:pPr marL="285750" indent="-285750">
+              <a:buFont typeface="Arial" panose="020B0604020202020204" pitchFamily="34" charset="0"/>
+              <a:buChar char="•"/>
+            </a:pPr>
+            <a:r>
+              <a:rPr lang="en-CA" sz="2800" dirty="0" smtClean="0"/>
+              <a:t>Definition:</a:t>
+            </a:r>
+          </a:p>
+          <a:p>
+            <a:pPr lvl="1"/>
+            <a:r>
+              <a:rPr lang="en-US" sz="2000" dirty="0"/>
+              <a:t>Avoid coupling the sender of a request to its receiver by giving more than one object a chance to handle the request. Chain the receiving objects and pass the request along the chain until an object handles it</a:t>
+            </a:r>
+            <a:r>
+              <a:rPr lang="en-US" sz="2000" dirty="0" smtClean="0"/>
+              <a:t>.</a:t>
+            </a:r>
+            <a:r>
+              <a:rPr lang="en-CA" sz="2000" dirty="0" smtClean="0"/>
+              <a:t> </a:t>
+            </a:r>
+            <a:endParaRPr lang="en-CA" sz="2000" dirty="0"/>
+          </a:p>
+          <a:p>
+            <a:endParaRPr lang="en-CA" sz="2800" dirty="0"/>
+          </a:p>
+          <a:p>
+            <a:pPr marL="285750" indent="-285750">
+              <a:buFont typeface="Arial" panose="020B0604020202020204" pitchFamily="34" charset="0"/>
+              <a:buChar char="•"/>
+            </a:pPr>
+            <a:r>
+              <a:rPr lang="en-CA" sz="2800" dirty="0" smtClean="0"/>
+              <a:t>Participants</a:t>
+            </a:r>
+          </a:p>
+          <a:p>
+            <a:pPr lvl="1"/>
+            <a:r>
+              <a:rPr lang="en-CA" sz="2000" b="1" dirty="0" smtClean="0"/>
+              <a:t>Handler Interface: </a:t>
+            </a:r>
+          </a:p>
+          <a:p>
+            <a:pPr lvl="2"/>
+            <a:r>
+              <a:rPr lang="en-CA" sz="1600" dirty="0" smtClean="0"/>
+              <a:t>Defines the interface of how the handlers are going to accepts the messages </a:t>
+            </a:r>
+          </a:p>
+          <a:p>
+            <a:pPr lvl="2"/>
+            <a:r>
+              <a:rPr lang="en-CA" sz="1600" dirty="0" smtClean="0"/>
+              <a:t> </a:t>
+            </a:r>
+          </a:p>
+          <a:p>
+            <a:pPr lvl="1"/>
+            <a:r>
+              <a:rPr lang="en-CA" sz="2000" b="1" dirty="0" smtClean="0"/>
+              <a:t>Concrete Handler: </a:t>
+            </a:r>
+            <a:endParaRPr lang="en-CA" sz="2000" b="1" dirty="0"/>
+          </a:p>
+          <a:p>
+            <a:pPr lvl="2"/>
+            <a:r>
+              <a:rPr lang="en-CA" sz="1600" dirty="0" smtClean="0"/>
+              <a:t>Implements the concreate message handling logic.</a:t>
+            </a:r>
+          </a:p>
+          <a:p>
+            <a:pPr lvl="1"/>
+            <a:endParaRPr lang="en-CA" sz="2000" dirty="0"/>
+          </a:p>
+          <a:p>
+            <a:pPr lvl="1"/>
+            <a:r>
+              <a:rPr lang="en-CA" sz="2000" b="1" dirty="0" smtClean="0"/>
+              <a:t>Client: </a:t>
+            </a:r>
+            <a:endParaRPr lang="en-CA" sz="2000" b="1" dirty="0"/>
+          </a:p>
+          <a:p>
+            <a:pPr lvl="2"/>
+            <a:r>
+              <a:rPr lang="en-CA" sz="1600" dirty="0" smtClean="0"/>
+              <a:t>Uses the chain of responsibility invoking the first handler.</a:t>
+            </a:r>
+            <a:endParaRPr lang="en-CA" sz="1600" dirty="0"/>
+          </a:p>
+          <a:p>
+            <a:pPr lvl="1"/>
+            <a:endParaRPr lang="en-CA" sz="2000" dirty="0"/>
+          </a:p>
+          <a:p>
+            <a:pPr marL="457200" indent="-457200">
+              <a:buFont typeface="Arial" panose="020B0604020202020204" pitchFamily="34" charset="0"/>
+              <a:buChar char="•"/>
+            </a:pPr>
+            <a:r>
+              <a:rPr lang="en-CA" sz="2800" dirty="0" smtClean="0"/>
+              <a:t>Real World Example </a:t>
+            </a:r>
+          </a:p>
+          <a:p>
+            <a:pPr lvl="2"/>
+            <a:r>
+              <a:rPr lang="en-CA" sz="2000" b="1" dirty="0" smtClean="0"/>
+              <a:t>ASP.NET </a:t>
+            </a:r>
+            <a:r>
+              <a:rPr lang="en-CA" sz="2000" b="1" dirty="0" err="1" smtClean="0"/>
+              <a:t>vNext</a:t>
+            </a:r>
+            <a:r>
+              <a:rPr lang="en-CA" sz="2000" b="1" dirty="0" smtClean="0"/>
+              <a:t> OWIN implementation, Katana</a:t>
+            </a:r>
+            <a:r>
+              <a:rPr lang="en-CA" sz="2000" dirty="0" smtClean="0"/>
+              <a:t>.</a:t>
+            </a:r>
+          </a:p>
+          <a:p>
+            <a:endParaRPr lang="en-CA" sz="2800" dirty="0"/>
           </a:p>
         </p:txBody>
       </p:sp>
@@ -4278,13 +4741,167 @@
           <a:p>
             <a:r>
               <a:rPr lang="en-CA" sz="4400" dirty="0" smtClean="0"/>
-              <a:t>Observer</a:t>
-            </a:r>
-            <a:r>
-              <a:rPr lang="en-CA" sz="4400" dirty="0" smtClean="0"/>
-              <a:t> Pattern</a:t>
+              <a:t>Observer Pattern</a:t>
             </a:r>
             <a:endParaRPr lang="en-CA" sz="4400" dirty="0"/>
+          </a:p>
+        </p:txBody>
+      </p:sp>
+      <p:sp>
+        <p:nvSpPr>
+          <p:cNvPr id="3" name="TextBox 2"/>
+          <p:cNvSpPr txBox="1"/>
+          <p:nvPr/>
+        </p:nvSpPr>
+        <p:spPr>
+          <a:xfrm>
+            <a:off x="502507" y="766416"/>
+            <a:ext cx="8748585" cy="5940088"/>
+          </a:xfrm>
+          <a:prstGeom prst="rect">
+            <a:avLst/>
+          </a:prstGeom>
+          <a:noFill/>
+        </p:spPr>
+        <p:txBody>
+          <a:bodyPr wrap="square" rtlCol="0">
+            <a:spAutoFit/>
+          </a:bodyPr>
+          <a:lstStyle/>
+          <a:p>
+            <a:pPr marL="285750" indent="-285750">
+              <a:buFont typeface="Arial" panose="020B0604020202020204" pitchFamily="34" charset="0"/>
+              <a:buChar char="•"/>
+            </a:pPr>
+            <a:r>
+              <a:rPr lang="en-CA" sz="2800" dirty="0" smtClean="0"/>
+              <a:t>Definition:</a:t>
+            </a:r>
+          </a:p>
+          <a:p>
+            <a:pPr lvl="1"/>
+            <a:r>
+              <a:rPr lang="en-US" sz="2000" dirty="0"/>
+              <a:t>Define a one-to-many dependency between objects so that when one object changes state, all its dependents are notified and updated automatically</a:t>
+            </a:r>
+            <a:r>
+              <a:rPr lang="en-US" sz="2000" dirty="0" smtClean="0"/>
+              <a:t>.</a:t>
+            </a:r>
+            <a:r>
+              <a:rPr lang="en-CA" sz="2000" dirty="0" smtClean="0"/>
+              <a:t> </a:t>
+            </a:r>
+            <a:endParaRPr lang="en-CA" sz="2000" dirty="0"/>
+          </a:p>
+          <a:p>
+            <a:endParaRPr lang="en-CA" sz="2800" dirty="0"/>
+          </a:p>
+          <a:p>
+            <a:pPr marL="285750" indent="-285750">
+              <a:buFont typeface="Arial" panose="020B0604020202020204" pitchFamily="34" charset="0"/>
+              <a:buChar char="•"/>
+            </a:pPr>
+            <a:r>
+              <a:rPr lang="en-CA" sz="2800" dirty="0" smtClean="0"/>
+              <a:t>Participants</a:t>
+            </a:r>
+          </a:p>
+          <a:p>
+            <a:pPr lvl="1"/>
+            <a:r>
+              <a:rPr lang="en-CA" sz="2000" b="1" dirty="0" smtClean="0"/>
+              <a:t>Subject: </a:t>
+            </a:r>
+          </a:p>
+          <a:p>
+            <a:pPr lvl="2"/>
+            <a:r>
+              <a:rPr lang="en-CA" sz="1600" dirty="0" smtClean="0"/>
+              <a:t>Defines the interface for attaching and detaching observers </a:t>
+            </a:r>
+          </a:p>
+          <a:p>
+            <a:pPr lvl="1"/>
+            <a:r>
+              <a:rPr lang="en-CA" sz="2000" b="1" dirty="0" smtClean="0"/>
+              <a:t>Concrete Subject: </a:t>
+            </a:r>
+            <a:endParaRPr lang="en-CA" sz="2000" b="1" dirty="0"/>
+          </a:p>
+          <a:p>
+            <a:pPr lvl="2"/>
+            <a:r>
+              <a:rPr lang="en-CA" sz="1600" dirty="0" smtClean="0"/>
+              <a:t>Implements the concreate subject logic.</a:t>
+            </a:r>
+            <a:endParaRPr lang="en-CA" sz="2000" dirty="0"/>
+          </a:p>
+          <a:p>
+            <a:pPr lvl="1"/>
+            <a:r>
+              <a:rPr lang="en-CA" sz="2000" b="1" dirty="0" smtClean="0"/>
+              <a:t>Observer: </a:t>
+            </a:r>
+            <a:endParaRPr lang="en-CA" sz="2000" b="1" dirty="0"/>
+          </a:p>
+          <a:p>
+            <a:pPr lvl="2"/>
+            <a:r>
+              <a:rPr lang="en-CA" sz="1600" dirty="0" smtClean="0"/>
+              <a:t>Defines the interface for sending the messages to all observers from the subject.</a:t>
+            </a:r>
+          </a:p>
+          <a:p>
+            <a:pPr lvl="1"/>
+            <a:r>
+              <a:rPr lang="en-CA" sz="2000" b="1" dirty="0" smtClean="0"/>
+              <a:t>Concrete Observer</a:t>
+            </a:r>
+            <a:r>
+              <a:rPr lang="en-CA" sz="2000" b="1" dirty="0"/>
+              <a:t>: </a:t>
+            </a:r>
+          </a:p>
+          <a:p>
+            <a:pPr lvl="2"/>
+            <a:r>
+              <a:rPr lang="en-CA" sz="1600" dirty="0" smtClean="0"/>
+              <a:t>Implements the concrete observer where it receives messages.</a:t>
+            </a:r>
+            <a:endParaRPr lang="en-CA" sz="1600" dirty="0"/>
+          </a:p>
+          <a:p>
+            <a:pPr lvl="1"/>
+            <a:endParaRPr lang="en-CA" sz="1600" dirty="0"/>
+          </a:p>
+          <a:p>
+            <a:pPr lvl="1"/>
+            <a:endParaRPr lang="en-CA" sz="2000" dirty="0"/>
+          </a:p>
+          <a:p>
+            <a:pPr marL="457200" indent="-457200">
+              <a:buFont typeface="Arial" panose="020B0604020202020204" pitchFamily="34" charset="0"/>
+              <a:buChar char="•"/>
+            </a:pPr>
+            <a:r>
+              <a:rPr lang="en-CA" sz="2800" dirty="0" smtClean="0"/>
+              <a:t>Real World Example </a:t>
+            </a:r>
+          </a:p>
+          <a:p>
+            <a:pPr lvl="2"/>
+            <a:r>
+              <a:rPr lang="en-CA" sz="2000" b="1" dirty="0" smtClean="0"/>
+              <a:t>Rx Library of .NET Framework</a:t>
+            </a:r>
+            <a:r>
+              <a:rPr lang="en-CA" sz="2000" dirty="0" smtClean="0"/>
+              <a:t>.</a:t>
+            </a:r>
+          </a:p>
+          <a:p>
+            <a:endParaRPr lang="en-CA" sz="2800" dirty="0"/>
           </a:p>
         </p:txBody>
       </p:sp>
@@ -4292,6 +4909,442 @@
     <p:extLst>
       <p:ext uri="{BB962C8B-B14F-4D97-AF65-F5344CB8AC3E}">
         <p14:creationId xmlns:p14="http://schemas.microsoft.com/office/powerpoint/2010/main" val="3902739632"/>
+      </p:ext>
+    </p:extLst>
+  </p:cSld>
+  <p:clrMapOvr>
+    <a:masterClrMapping/>
+  </p:clrMapOvr>
+</p:sld>
+</file>
+
+<file path=ppt/slides/slide18.xml><?xml version="1.0" encoding="utf-8"?>
+<p:sld xmlns:a="http://schemas.openxmlformats.org/drawingml/2006/main" xmlns:r="http://schemas.openxmlformats.org/officeDocument/2006/relationships" xmlns:p="http://schemas.openxmlformats.org/presentationml/2006/main">
+  <p:cSld>
+    <p:spTree>
+      <p:nvGrpSpPr>
+        <p:cNvPr id="1" name=""/>
+        <p:cNvGrpSpPr/>
+        <p:nvPr/>
+      </p:nvGrpSpPr>
+      <p:grpSpPr>
+        <a:xfrm>
+          <a:off x="0" y="0"/>
+          <a:ext cx="0" cy="0"/>
+          <a:chOff x="0" y="0"/>
+          <a:chExt cx="0" cy="0"/>
+        </a:xfrm>
+      </p:grpSpPr>
+      <p:sp>
+        <p:nvSpPr>
+          <p:cNvPr id="2" name="TextBox 1"/>
+          <p:cNvSpPr txBox="1"/>
+          <p:nvPr/>
+        </p:nvSpPr>
+        <p:spPr>
+          <a:xfrm>
+            <a:off x="0" y="-3025"/>
+            <a:ext cx="11467070" cy="769441"/>
+          </a:xfrm>
+          <a:prstGeom prst="rect">
+            <a:avLst/>
+          </a:prstGeom>
+          <a:noFill/>
+        </p:spPr>
+        <p:txBody>
+          <a:bodyPr wrap="square" rtlCol="0">
+            <a:spAutoFit/>
+          </a:bodyPr>
+          <a:lstStyle/>
+          <a:p>
+            <a:r>
+              <a:rPr lang="en-CA" sz="4400" dirty="0" smtClean="0"/>
+              <a:t>Facade Pattern</a:t>
+            </a:r>
+            <a:endParaRPr lang="en-CA" sz="4400" dirty="0"/>
+          </a:p>
+        </p:txBody>
+      </p:sp>
+      <p:sp>
+        <p:nvSpPr>
+          <p:cNvPr id="3" name="TextBox 2"/>
+          <p:cNvSpPr txBox="1"/>
+          <p:nvPr/>
+        </p:nvSpPr>
+        <p:spPr>
+          <a:xfrm>
+            <a:off x="502507" y="766416"/>
+            <a:ext cx="8748585" cy="5940088"/>
+          </a:xfrm>
+          <a:prstGeom prst="rect">
+            <a:avLst/>
+          </a:prstGeom>
+          <a:noFill/>
+        </p:spPr>
+        <p:txBody>
+          <a:bodyPr wrap="square" rtlCol="0">
+            <a:spAutoFit/>
+          </a:bodyPr>
+          <a:lstStyle/>
+          <a:p>
+            <a:pPr marL="285750" indent="-285750">
+              <a:buFont typeface="Arial" panose="020B0604020202020204" pitchFamily="34" charset="0"/>
+              <a:buChar char="•"/>
+            </a:pPr>
+            <a:r>
+              <a:rPr lang="en-CA" sz="2800" dirty="0" smtClean="0"/>
+              <a:t>Definition:</a:t>
+            </a:r>
+          </a:p>
+          <a:p>
+            <a:pPr lvl="1"/>
+            <a:r>
+              <a:rPr lang="en-US" sz="2000" dirty="0"/>
+              <a:t>Define a one-to-many dependency between objects so that when one object changes state, all its dependents are notified and updated automatically</a:t>
+            </a:r>
+            <a:r>
+              <a:rPr lang="en-US" sz="2000" dirty="0" smtClean="0"/>
+              <a:t>.</a:t>
+            </a:r>
+            <a:r>
+              <a:rPr lang="en-CA" sz="2000" dirty="0" smtClean="0"/>
+              <a:t> </a:t>
+            </a:r>
+            <a:endParaRPr lang="en-CA" sz="2000" dirty="0"/>
+          </a:p>
+          <a:p>
+            <a:endParaRPr lang="en-CA" sz="2800" dirty="0"/>
+          </a:p>
+          <a:p>
+            <a:pPr marL="285750" indent="-285750">
+              <a:buFont typeface="Arial" panose="020B0604020202020204" pitchFamily="34" charset="0"/>
+              <a:buChar char="•"/>
+            </a:pPr>
+            <a:r>
+              <a:rPr lang="en-CA" sz="2800" dirty="0" smtClean="0"/>
+              <a:t>Participants</a:t>
+            </a:r>
+          </a:p>
+          <a:p>
+            <a:pPr lvl="1"/>
+            <a:r>
+              <a:rPr lang="en-CA" sz="2000" b="1" dirty="0" smtClean="0"/>
+              <a:t>Subject: </a:t>
+            </a:r>
+          </a:p>
+          <a:p>
+            <a:pPr lvl="2"/>
+            <a:r>
+              <a:rPr lang="en-CA" sz="1600" dirty="0" smtClean="0"/>
+              <a:t>Defines the interface for attaching and detaching observers </a:t>
+            </a:r>
+          </a:p>
+          <a:p>
+            <a:pPr lvl="1"/>
+            <a:r>
+              <a:rPr lang="en-CA" sz="2000" b="1" dirty="0" smtClean="0"/>
+              <a:t>Concrete Subject: </a:t>
+            </a:r>
+            <a:endParaRPr lang="en-CA" sz="2000" b="1" dirty="0"/>
+          </a:p>
+          <a:p>
+            <a:pPr lvl="2"/>
+            <a:r>
+              <a:rPr lang="en-CA" sz="1600" dirty="0" smtClean="0"/>
+              <a:t>Implements the concreate subject logic.</a:t>
+            </a:r>
+            <a:endParaRPr lang="en-CA" sz="2000" dirty="0"/>
+          </a:p>
+          <a:p>
+            <a:pPr lvl="1"/>
+            <a:r>
+              <a:rPr lang="en-CA" sz="2000" b="1" dirty="0" smtClean="0"/>
+              <a:t>Observer: </a:t>
+            </a:r>
+            <a:endParaRPr lang="en-CA" sz="2000" b="1" dirty="0"/>
+          </a:p>
+          <a:p>
+            <a:pPr lvl="2"/>
+            <a:r>
+              <a:rPr lang="en-CA" sz="1600" dirty="0" smtClean="0"/>
+              <a:t>Defines the interface for sending the messages to all observers from the subject.</a:t>
+            </a:r>
+          </a:p>
+          <a:p>
+            <a:pPr lvl="1"/>
+            <a:r>
+              <a:rPr lang="en-CA" sz="2000" b="1" dirty="0" smtClean="0"/>
+              <a:t>Concrete Observer</a:t>
+            </a:r>
+            <a:r>
+              <a:rPr lang="en-CA" sz="2000" b="1" dirty="0"/>
+              <a:t>: </a:t>
+            </a:r>
+          </a:p>
+          <a:p>
+            <a:pPr lvl="2"/>
+            <a:r>
+              <a:rPr lang="en-CA" sz="1600" dirty="0" smtClean="0"/>
+              <a:t>Implements the concrete observer where it receives messages.</a:t>
+            </a:r>
+            <a:endParaRPr lang="en-CA" sz="1600" dirty="0"/>
+          </a:p>
+          <a:p>
+            <a:pPr lvl="1"/>
+            <a:endParaRPr lang="en-CA" sz="1600" dirty="0"/>
+          </a:p>
+          <a:p>
+            <a:pPr lvl="1"/>
+            <a:endParaRPr lang="en-CA" sz="2000" dirty="0"/>
+          </a:p>
+          <a:p>
+            <a:pPr marL="457200" indent="-457200">
+              <a:buFont typeface="Arial" panose="020B0604020202020204" pitchFamily="34" charset="0"/>
+              <a:buChar char="•"/>
+            </a:pPr>
+            <a:r>
+              <a:rPr lang="en-CA" sz="2800" dirty="0" smtClean="0"/>
+              <a:t>Real World Example </a:t>
+            </a:r>
+          </a:p>
+          <a:p>
+            <a:pPr lvl="2"/>
+            <a:r>
+              <a:rPr lang="en-CA" sz="2000" b="1" dirty="0" smtClean="0"/>
+              <a:t>Rx Library of .NET Framework</a:t>
+            </a:r>
+            <a:r>
+              <a:rPr lang="en-CA" sz="2000" dirty="0" smtClean="0"/>
+              <a:t>.</a:t>
+            </a:r>
+          </a:p>
+          <a:p>
+            <a:endParaRPr lang="en-CA" sz="2800" dirty="0"/>
+          </a:p>
+        </p:txBody>
+      </p:sp>
+    </p:spTree>
+    <p:extLst>
+      <p:ext uri="{BB962C8B-B14F-4D97-AF65-F5344CB8AC3E}">
+        <p14:creationId xmlns:p14="http://schemas.microsoft.com/office/powerpoint/2010/main" val="3491724131"/>
+      </p:ext>
+    </p:extLst>
+  </p:cSld>
+  <p:clrMapOvr>
+    <a:masterClrMapping/>
+  </p:clrMapOvr>
+</p:sld>
+</file>
+
+<file path=ppt/slides/slide19.xml><?xml version="1.0" encoding="utf-8"?>
+<p:sld xmlns:a="http://schemas.openxmlformats.org/drawingml/2006/main" xmlns:r="http://schemas.openxmlformats.org/officeDocument/2006/relationships" xmlns:p="http://schemas.openxmlformats.org/presentationml/2006/main">
+  <p:cSld>
+    <p:spTree>
+      <p:nvGrpSpPr>
+        <p:cNvPr id="1" name=""/>
+        <p:cNvGrpSpPr/>
+        <p:nvPr/>
+      </p:nvGrpSpPr>
+      <p:grpSpPr>
+        <a:xfrm>
+          <a:off x="0" y="0"/>
+          <a:ext cx="0" cy="0"/>
+          <a:chOff x="0" y="0"/>
+          <a:chExt cx="0" cy="0"/>
+        </a:xfrm>
+      </p:grpSpPr>
+      <p:sp>
+        <p:nvSpPr>
+          <p:cNvPr id="2" name="TextBox 1"/>
+          <p:cNvSpPr txBox="1"/>
+          <p:nvPr/>
+        </p:nvSpPr>
+        <p:spPr>
+          <a:xfrm>
+            <a:off x="0" y="-3025"/>
+            <a:ext cx="11467070" cy="769441"/>
+          </a:xfrm>
+          <a:prstGeom prst="rect">
+            <a:avLst/>
+          </a:prstGeom>
+          <a:noFill/>
+        </p:spPr>
+        <p:txBody>
+          <a:bodyPr wrap="square" rtlCol="0">
+            <a:spAutoFit/>
+          </a:bodyPr>
+          <a:lstStyle/>
+          <a:p>
+            <a:r>
+              <a:rPr lang="en-CA" sz="4400" dirty="0" smtClean="0"/>
+              <a:t>Builder Pattern</a:t>
+            </a:r>
+            <a:endParaRPr lang="en-CA" sz="4400" dirty="0"/>
+          </a:p>
+        </p:txBody>
+      </p:sp>
+      <p:sp>
+        <p:nvSpPr>
+          <p:cNvPr id="3" name="TextBox 2"/>
+          <p:cNvSpPr txBox="1"/>
+          <p:nvPr/>
+        </p:nvSpPr>
+        <p:spPr>
+          <a:xfrm>
+            <a:off x="502507" y="766416"/>
+            <a:ext cx="8748585" cy="5940088"/>
+          </a:xfrm>
+          <a:prstGeom prst="rect">
+            <a:avLst/>
+          </a:prstGeom>
+          <a:noFill/>
+        </p:spPr>
+        <p:txBody>
+          <a:bodyPr wrap="square" rtlCol="0">
+            <a:spAutoFit/>
+          </a:bodyPr>
+          <a:lstStyle/>
+          <a:p>
+            <a:pPr marL="285750" indent="-285750">
+              <a:buFont typeface="Arial" panose="020B0604020202020204" pitchFamily="34" charset="0"/>
+              <a:buChar char="•"/>
+            </a:pPr>
+            <a:r>
+              <a:rPr lang="en-CA" sz="2800" dirty="0" smtClean="0"/>
+              <a:t>Definition:</a:t>
+            </a:r>
+          </a:p>
+          <a:p>
+            <a:pPr lvl="1"/>
+            <a:r>
+              <a:rPr lang="en-US" sz="2000" dirty="0"/>
+              <a:t>Define a one-to-many dependency between objects so that when one object changes state, all its dependents are notified and updated automatically</a:t>
+            </a:r>
+            <a:r>
+              <a:rPr lang="en-US" sz="2000" dirty="0" smtClean="0"/>
+              <a:t>.</a:t>
+            </a:r>
+            <a:r>
+              <a:rPr lang="en-CA" sz="2000" dirty="0" smtClean="0"/>
+              <a:t> </a:t>
+            </a:r>
+            <a:endParaRPr lang="en-CA" sz="2000" dirty="0"/>
+          </a:p>
+          <a:p>
+            <a:endParaRPr lang="en-CA" sz="2800" dirty="0"/>
+          </a:p>
+          <a:p>
+            <a:pPr marL="285750" indent="-285750">
+              <a:buFont typeface="Arial" panose="020B0604020202020204" pitchFamily="34" charset="0"/>
+              <a:buChar char="•"/>
+            </a:pPr>
+            <a:r>
+              <a:rPr lang="en-CA" sz="2800" dirty="0" smtClean="0"/>
+              <a:t>Participants</a:t>
+            </a:r>
+          </a:p>
+          <a:p>
+            <a:pPr lvl="1"/>
+            <a:r>
+              <a:rPr lang="en-CA" sz="2000" b="1" dirty="0" smtClean="0"/>
+              <a:t>Subject: </a:t>
+            </a:r>
+          </a:p>
+          <a:p>
+            <a:pPr lvl="2"/>
+            <a:r>
+              <a:rPr lang="en-CA" sz="1600" dirty="0" smtClean="0"/>
+              <a:t>Defines the interface for attaching and detaching observers </a:t>
+            </a:r>
+          </a:p>
+          <a:p>
+            <a:pPr lvl="1"/>
+            <a:r>
+              <a:rPr lang="en-CA" sz="2000" b="1" dirty="0" smtClean="0"/>
+              <a:t>Concrete Subject: </a:t>
+            </a:r>
+            <a:endParaRPr lang="en-CA" sz="2000" b="1" dirty="0"/>
+          </a:p>
+          <a:p>
+            <a:pPr lvl="2"/>
+            <a:r>
+              <a:rPr lang="en-CA" sz="1600" dirty="0" smtClean="0"/>
+              <a:t>Implements the concreate subject logic.</a:t>
+            </a:r>
+            <a:endParaRPr lang="en-CA" sz="2000" dirty="0"/>
+          </a:p>
+          <a:p>
+            <a:pPr lvl="1"/>
+            <a:r>
+              <a:rPr lang="en-CA" sz="2000" b="1" dirty="0" smtClean="0"/>
+              <a:t>Observer: </a:t>
+            </a:r>
+            <a:endParaRPr lang="en-CA" sz="2000" b="1" dirty="0"/>
+          </a:p>
+          <a:p>
+            <a:pPr lvl="2"/>
+            <a:r>
+              <a:rPr lang="en-CA" sz="1600" dirty="0" smtClean="0"/>
+              <a:t>Defines the interface for sending the messages to all observers from the subject.</a:t>
+            </a:r>
+          </a:p>
+          <a:p>
+            <a:pPr lvl="1"/>
+            <a:r>
+              <a:rPr lang="en-CA" sz="2000" b="1" dirty="0" smtClean="0"/>
+              <a:t>Concrete Observer</a:t>
+            </a:r>
+            <a:r>
+              <a:rPr lang="en-CA" sz="2000" b="1" dirty="0"/>
+              <a:t>: </a:t>
+            </a:r>
+          </a:p>
+          <a:p>
+            <a:pPr lvl="2"/>
+            <a:r>
+              <a:rPr lang="en-CA" sz="1600" dirty="0" smtClean="0"/>
+              <a:t>Implements the concrete observer where it receives messages.</a:t>
+            </a:r>
+            <a:endParaRPr lang="en-CA" sz="1600" dirty="0"/>
+          </a:p>
+          <a:p>
+            <a:pPr lvl="1"/>
+            <a:endParaRPr lang="en-CA" sz="1600" dirty="0"/>
+          </a:p>
+          <a:p>
+            <a:pPr lvl="1"/>
+            <a:endParaRPr lang="en-CA" sz="2000" dirty="0"/>
+          </a:p>
+          <a:p>
+            <a:pPr marL="457200" indent="-457200">
+              <a:buFont typeface="Arial" panose="020B0604020202020204" pitchFamily="34" charset="0"/>
+              <a:buChar char="•"/>
+            </a:pPr>
+            <a:r>
+              <a:rPr lang="en-CA" sz="2800" dirty="0" smtClean="0"/>
+              <a:t>Real World Example </a:t>
+            </a:r>
+          </a:p>
+          <a:p>
+            <a:pPr lvl="2"/>
+            <a:r>
+              <a:rPr lang="en-CA" sz="2000" b="1" dirty="0" smtClean="0"/>
+              <a:t>Rx Library of .NET Framework</a:t>
+            </a:r>
+            <a:r>
+              <a:rPr lang="en-CA" sz="2000" dirty="0" smtClean="0"/>
+              <a:t>.</a:t>
+            </a:r>
+          </a:p>
+          <a:p>
+            <a:endParaRPr lang="en-CA" sz="2800" dirty="0"/>
+          </a:p>
+        </p:txBody>
+      </p:sp>
+    </p:spTree>
+    <p:extLst>
+      <p:ext uri="{BB962C8B-B14F-4D97-AF65-F5344CB8AC3E}">
+        <p14:creationId xmlns:p14="http://schemas.microsoft.com/office/powerpoint/2010/main" val="2382340776"/>
       </p:ext>
     </p:extLst>
   </p:cSld>
@@ -4378,7 +5431,6 @@
               <a:rPr lang="en-CA" sz="2800" dirty="0" smtClean="0"/>
               <a:t>About Design Patterns </a:t>
             </a:r>
-            <a:endParaRPr lang="en-CA" sz="2800" dirty="0" smtClean="0"/>
           </a:p>
           <a:p>
             <a:pPr marL="285750" indent="-285750">
@@ -4389,7 +5441,6 @@
               <a:rPr lang="en-CA" sz="2800" dirty="0" smtClean="0"/>
               <a:t>Patterns Catalog and Classification </a:t>
             </a:r>
-            <a:endParaRPr lang="en-CA" sz="2800" dirty="0" smtClean="0"/>
           </a:p>
           <a:p>
             <a:pPr marL="285750" indent="-285750">
@@ -4420,7 +5471,6 @@
               <a:rPr lang="en-CA" sz="2800" dirty="0" smtClean="0"/>
               <a:t>Summary </a:t>
             </a:r>
-            <a:endParaRPr lang="en-CA" sz="2800" dirty="0" smtClean="0"/>
           </a:p>
         </p:txBody>
       </p:sp>
@@ -4428,6 +5478,2186 @@
     <p:extLst>
       <p:ext uri="{BB962C8B-B14F-4D97-AF65-F5344CB8AC3E}">
         <p14:creationId xmlns:p14="http://schemas.microsoft.com/office/powerpoint/2010/main" val="3352486"/>
+      </p:ext>
+    </p:extLst>
+  </p:cSld>
+  <p:clrMapOvr>
+    <a:masterClrMapping/>
+  </p:clrMapOvr>
+</p:sld>
+</file>
+
+<file path=ppt/slides/slide20.xml><?xml version="1.0" encoding="utf-8"?>
+<p:sld xmlns:a="http://schemas.openxmlformats.org/drawingml/2006/main" xmlns:r="http://schemas.openxmlformats.org/officeDocument/2006/relationships" xmlns:p="http://schemas.openxmlformats.org/presentationml/2006/main">
+  <p:cSld>
+    <p:spTree>
+      <p:nvGrpSpPr>
+        <p:cNvPr id="1" name=""/>
+        <p:cNvGrpSpPr/>
+        <p:nvPr/>
+      </p:nvGrpSpPr>
+      <p:grpSpPr>
+        <a:xfrm>
+          <a:off x="0" y="0"/>
+          <a:ext cx="0" cy="0"/>
+          <a:chOff x="0" y="0"/>
+          <a:chExt cx="0" cy="0"/>
+        </a:xfrm>
+      </p:grpSpPr>
+      <p:sp>
+        <p:nvSpPr>
+          <p:cNvPr id="2" name="TextBox 1"/>
+          <p:cNvSpPr txBox="1"/>
+          <p:nvPr/>
+        </p:nvSpPr>
+        <p:spPr>
+          <a:xfrm>
+            <a:off x="0" y="-3025"/>
+            <a:ext cx="11467070" cy="769441"/>
+          </a:xfrm>
+          <a:prstGeom prst="rect">
+            <a:avLst/>
+          </a:prstGeom>
+          <a:noFill/>
+        </p:spPr>
+        <p:txBody>
+          <a:bodyPr wrap="square" rtlCol="0">
+            <a:spAutoFit/>
+          </a:bodyPr>
+          <a:lstStyle/>
+          <a:p>
+            <a:r>
+              <a:rPr lang="en-CA" sz="4400" dirty="0" smtClean="0"/>
+              <a:t>Proxy Pattern</a:t>
+            </a:r>
+            <a:endParaRPr lang="en-CA" sz="4400" dirty="0"/>
+          </a:p>
+        </p:txBody>
+      </p:sp>
+      <p:sp>
+        <p:nvSpPr>
+          <p:cNvPr id="3" name="TextBox 2"/>
+          <p:cNvSpPr txBox="1"/>
+          <p:nvPr/>
+        </p:nvSpPr>
+        <p:spPr>
+          <a:xfrm>
+            <a:off x="502507" y="766416"/>
+            <a:ext cx="8748585" cy="5940088"/>
+          </a:xfrm>
+          <a:prstGeom prst="rect">
+            <a:avLst/>
+          </a:prstGeom>
+          <a:noFill/>
+        </p:spPr>
+        <p:txBody>
+          <a:bodyPr wrap="square" rtlCol="0">
+            <a:spAutoFit/>
+          </a:bodyPr>
+          <a:lstStyle/>
+          <a:p>
+            <a:pPr marL="285750" indent="-285750">
+              <a:buFont typeface="Arial" panose="020B0604020202020204" pitchFamily="34" charset="0"/>
+              <a:buChar char="•"/>
+            </a:pPr>
+            <a:r>
+              <a:rPr lang="en-CA" sz="2800" dirty="0" smtClean="0"/>
+              <a:t>Definition:</a:t>
+            </a:r>
+          </a:p>
+          <a:p>
+            <a:pPr lvl="1"/>
+            <a:r>
+              <a:rPr lang="en-US" sz="2000" dirty="0"/>
+              <a:t>Define a one-to-many dependency between objects so that when one object changes state, all its dependents are notified and updated automatically</a:t>
+            </a:r>
+            <a:r>
+              <a:rPr lang="en-US" sz="2000" dirty="0" smtClean="0"/>
+              <a:t>.</a:t>
+            </a:r>
+            <a:r>
+              <a:rPr lang="en-CA" sz="2000" dirty="0" smtClean="0"/>
+              <a:t> </a:t>
+            </a:r>
+            <a:endParaRPr lang="en-CA" sz="2000" dirty="0"/>
+          </a:p>
+          <a:p>
+            <a:endParaRPr lang="en-CA" sz="2800" dirty="0"/>
+          </a:p>
+          <a:p>
+            <a:pPr marL="285750" indent="-285750">
+              <a:buFont typeface="Arial" panose="020B0604020202020204" pitchFamily="34" charset="0"/>
+              <a:buChar char="•"/>
+            </a:pPr>
+            <a:r>
+              <a:rPr lang="en-CA" sz="2800" dirty="0" smtClean="0"/>
+              <a:t>Participants</a:t>
+            </a:r>
+          </a:p>
+          <a:p>
+            <a:pPr lvl="1"/>
+            <a:r>
+              <a:rPr lang="en-CA" sz="2000" b="1" dirty="0" smtClean="0"/>
+              <a:t>Subject: </a:t>
+            </a:r>
+          </a:p>
+          <a:p>
+            <a:pPr lvl="2"/>
+            <a:r>
+              <a:rPr lang="en-CA" sz="1600" dirty="0" smtClean="0"/>
+              <a:t>Defines the interface for attaching and detaching observers </a:t>
+            </a:r>
+          </a:p>
+          <a:p>
+            <a:pPr lvl="1"/>
+            <a:r>
+              <a:rPr lang="en-CA" sz="2000" b="1" dirty="0" smtClean="0"/>
+              <a:t>Concrete Subject: </a:t>
+            </a:r>
+            <a:endParaRPr lang="en-CA" sz="2000" b="1" dirty="0"/>
+          </a:p>
+          <a:p>
+            <a:pPr lvl="2"/>
+            <a:r>
+              <a:rPr lang="en-CA" sz="1600" dirty="0" smtClean="0"/>
+              <a:t>Implements the concreate subject logic.</a:t>
+            </a:r>
+            <a:endParaRPr lang="en-CA" sz="2000" dirty="0"/>
+          </a:p>
+          <a:p>
+            <a:pPr lvl="1"/>
+            <a:r>
+              <a:rPr lang="en-CA" sz="2000" b="1" dirty="0" smtClean="0"/>
+              <a:t>Observer: </a:t>
+            </a:r>
+            <a:endParaRPr lang="en-CA" sz="2000" b="1" dirty="0"/>
+          </a:p>
+          <a:p>
+            <a:pPr lvl="2"/>
+            <a:r>
+              <a:rPr lang="en-CA" sz="1600" dirty="0" smtClean="0"/>
+              <a:t>Defines the interface for sending the messages to all observers from the subject.</a:t>
+            </a:r>
+          </a:p>
+          <a:p>
+            <a:pPr lvl="1"/>
+            <a:r>
+              <a:rPr lang="en-CA" sz="2000" b="1" dirty="0" smtClean="0"/>
+              <a:t>Concrete Observer</a:t>
+            </a:r>
+            <a:r>
+              <a:rPr lang="en-CA" sz="2000" b="1" dirty="0"/>
+              <a:t>: </a:t>
+            </a:r>
+          </a:p>
+          <a:p>
+            <a:pPr lvl="2"/>
+            <a:r>
+              <a:rPr lang="en-CA" sz="1600" dirty="0" smtClean="0"/>
+              <a:t>Implements the concrete observer where it receives messages.</a:t>
+            </a:r>
+            <a:endParaRPr lang="en-CA" sz="1600" dirty="0"/>
+          </a:p>
+          <a:p>
+            <a:pPr lvl="1"/>
+            <a:endParaRPr lang="en-CA" sz="1600" dirty="0"/>
+          </a:p>
+          <a:p>
+            <a:pPr lvl="1"/>
+            <a:endParaRPr lang="en-CA" sz="2000" dirty="0"/>
+          </a:p>
+          <a:p>
+            <a:pPr marL="457200" indent="-457200">
+              <a:buFont typeface="Arial" panose="020B0604020202020204" pitchFamily="34" charset="0"/>
+              <a:buChar char="•"/>
+            </a:pPr>
+            <a:r>
+              <a:rPr lang="en-CA" sz="2800" dirty="0" smtClean="0"/>
+              <a:t>Real World Example </a:t>
+            </a:r>
+          </a:p>
+          <a:p>
+            <a:pPr lvl="2"/>
+            <a:r>
+              <a:rPr lang="en-CA" sz="2000" b="1" dirty="0" smtClean="0"/>
+              <a:t>Rx Library of .NET Framework</a:t>
+            </a:r>
+            <a:r>
+              <a:rPr lang="en-CA" sz="2000" dirty="0" smtClean="0"/>
+              <a:t>.</a:t>
+            </a:r>
+          </a:p>
+          <a:p>
+            <a:endParaRPr lang="en-CA" sz="2800" dirty="0"/>
+          </a:p>
+        </p:txBody>
+      </p:sp>
+    </p:spTree>
+    <p:extLst>
+      <p:ext uri="{BB962C8B-B14F-4D97-AF65-F5344CB8AC3E}">
+        <p14:creationId xmlns:p14="http://schemas.microsoft.com/office/powerpoint/2010/main" val="3693274808"/>
+      </p:ext>
+    </p:extLst>
+  </p:cSld>
+  <p:clrMapOvr>
+    <a:masterClrMapping/>
+  </p:clrMapOvr>
+</p:sld>
+</file>
+
+<file path=ppt/slides/slide21.xml><?xml version="1.0" encoding="utf-8"?>
+<p:sld xmlns:a="http://schemas.openxmlformats.org/drawingml/2006/main" xmlns:r="http://schemas.openxmlformats.org/officeDocument/2006/relationships" xmlns:p="http://schemas.openxmlformats.org/presentationml/2006/main">
+  <p:cSld>
+    <p:spTree>
+      <p:nvGrpSpPr>
+        <p:cNvPr id="1" name=""/>
+        <p:cNvGrpSpPr/>
+        <p:nvPr/>
+      </p:nvGrpSpPr>
+      <p:grpSpPr>
+        <a:xfrm>
+          <a:off x="0" y="0"/>
+          <a:ext cx="0" cy="0"/>
+          <a:chOff x="0" y="0"/>
+          <a:chExt cx="0" cy="0"/>
+        </a:xfrm>
+      </p:grpSpPr>
+      <p:sp>
+        <p:nvSpPr>
+          <p:cNvPr id="2" name="TextBox 1"/>
+          <p:cNvSpPr txBox="1"/>
+          <p:nvPr/>
+        </p:nvSpPr>
+        <p:spPr>
+          <a:xfrm>
+            <a:off x="0" y="-3025"/>
+            <a:ext cx="11467070" cy="769441"/>
+          </a:xfrm>
+          <a:prstGeom prst="rect">
+            <a:avLst/>
+          </a:prstGeom>
+          <a:noFill/>
+        </p:spPr>
+        <p:txBody>
+          <a:bodyPr wrap="square" rtlCol="0">
+            <a:spAutoFit/>
+          </a:bodyPr>
+          <a:lstStyle/>
+          <a:p>
+            <a:r>
+              <a:rPr lang="en-CA" sz="4400" dirty="0" smtClean="0"/>
+              <a:t>Decorator Pattern</a:t>
+            </a:r>
+            <a:endParaRPr lang="en-CA" sz="4400" dirty="0"/>
+          </a:p>
+        </p:txBody>
+      </p:sp>
+      <p:sp>
+        <p:nvSpPr>
+          <p:cNvPr id="3" name="TextBox 2"/>
+          <p:cNvSpPr txBox="1"/>
+          <p:nvPr/>
+        </p:nvSpPr>
+        <p:spPr>
+          <a:xfrm>
+            <a:off x="502507" y="766416"/>
+            <a:ext cx="8748585" cy="5940088"/>
+          </a:xfrm>
+          <a:prstGeom prst="rect">
+            <a:avLst/>
+          </a:prstGeom>
+          <a:noFill/>
+        </p:spPr>
+        <p:txBody>
+          <a:bodyPr wrap="square" rtlCol="0">
+            <a:spAutoFit/>
+          </a:bodyPr>
+          <a:lstStyle/>
+          <a:p>
+            <a:pPr marL="285750" indent="-285750">
+              <a:buFont typeface="Arial" panose="020B0604020202020204" pitchFamily="34" charset="0"/>
+              <a:buChar char="•"/>
+            </a:pPr>
+            <a:r>
+              <a:rPr lang="en-CA" sz="2800" dirty="0" smtClean="0"/>
+              <a:t>Definition:</a:t>
+            </a:r>
+          </a:p>
+          <a:p>
+            <a:pPr lvl="1"/>
+            <a:r>
+              <a:rPr lang="en-US" sz="2000" dirty="0"/>
+              <a:t>Define a one-to-many dependency between objects so that when one object changes state, all its dependents are notified and updated automatically</a:t>
+            </a:r>
+            <a:r>
+              <a:rPr lang="en-US" sz="2000" dirty="0" smtClean="0"/>
+              <a:t>.</a:t>
+            </a:r>
+            <a:r>
+              <a:rPr lang="en-CA" sz="2000" dirty="0" smtClean="0"/>
+              <a:t> </a:t>
+            </a:r>
+            <a:endParaRPr lang="en-CA" sz="2000" dirty="0"/>
+          </a:p>
+          <a:p>
+            <a:endParaRPr lang="en-CA" sz="2800" dirty="0"/>
+          </a:p>
+          <a:p>
+            <a:pPr marL="285750" indent="-285750">
+              <a:buFont typeface="Arial" panose="020B0604020202020204" pitchFamily="34" charset="0"/>
+              <a:buChar char="•"/>
+            </a:pPr>
+            <a:r>
+              <a:rPr lang="en-CA" sz="2800" dirty="0" smtClean="0"/>
+              <a:t>Participants</a:t>
+            </a:r>
+          </a:p>
+          <a:p>
+            <a:pPr lvl="1"/>
+            <a:r>
+              <a:rPr lang="en-CA" sz="2000" b="1" dirty="0" smtClean="0"/>
+              <a:t>Subject: </a:t>
+            </a:r>
+          </a:p>
+          <a:p>
+            <a:pPr lvl="2"/>
+            <a:r>
+              <a:rPr lang="en-CA" sz="1600" dirty="0" smtClean="0"/>
+              <a:t>Defines the interface for attaching and detaching observers </a:t>
+            </a:r>
+          </a:p>
+          <a:p>
+            <a:pPr lvl="1"/>
+            <a:r>
+              <a:rPr lang="en-CA" sz="2000" b="1" dirty="0" smtClean="0"/>
+              <a:t>Concrete Subject: </a:t>
+            </a:r>
+            <a:endParaRPr lang="en-CA" sz="2000" b="1" dirty="0"/>
+          </a:p>
+          <a:p>
+            <a:pPr lvl="2"/>
+            <a:r>
+              <a:rPr lang="en-CA" sz="1600" dirty="0" smtClean="0"/>
+              <a:t>Implements the concreate subject logic.</a:t>
+            </a:r>
+            <a:endParaRPr lang="en-CA" sz="2000" dirty="0"/>
+          </a:p>
+          <a:p>
+            <a:pPr lvl="1"/>
+            <a:r>
+              <a:rPr lang="en-CA" sz="2000" b="1" dirty="0" smtClean="0"/>
+              <a:t>Observer: </a:t>
+            </a:r>
+            <a:endParaRPr lang="en-CA" sz="2000" b="1" dirty="0"/>
+          </a:p>
+          <a:p>
+            <a:pPr lvl="2"/>
+            <a:r>
+              <a:rPr lang="en-CA" sz="1600" dirty="0" smtClean="0"/>
+              <a:t>Defines the interface for sending the messages to all observers from the subject.</a:t>
+            </a:r>
+          </a:p>
+          <a:p>
+            <a:pPr lvl="1"/>
+            <a:r>
+              <a:rPr lang="en-CA" sz="2000" b="1" dirty="0" smtClean="0"/>
+              <a:t>Concrete Observer</a:t>
+            </a:r>
+            <a:r>
+              <a:rPr lang="en-CA" sz="2000" b="1" dirty="0"/>
+              <a:t>: </a:t>
+            </a:r>
+          </a:p>
+          <a:p>
+            <a:pPr lvl="2"/>
+            <a:r>
+              <a:rPr lang="en-CA" sz="1600" dirty="0" smtClean="0"/>
+              <a:t>Implements the concrete observer where it receives messages.</a:t>
+            </a:r>
+            <a:endParaRPr lang="en-CA" sz="1600" dirty="0"/>
+          </a:p>
+          <a:p>
+            <a:pPr lvl="1"/>
+            <a:endParaRPr lang="en-CA" sz="1600" dirty="0"/>
+          </a:p>
+          <a:p>
+            <a:pPr lvl="1"/>
+            <a:endParaRPr lang="en-CA" sz="2000" dirty="0"/>
+          </a:p>
+          <a:p>
+            <a:pPr marL="457200" indent="-457200">
+              <a:buFont typeface="Arial" panose="020B0604020202020204" pitchFamily="34" charset="0"/>
+              <a:buChar char="•"/>
+            </a:pPr>
+            <a:r>
+              <a:rPr lang="en-CA" sz="2800" dirty="0" smtClean="0"/>
+              <a:t>Real World Example </a:t>
+            </a:r>
+          </a:p>
+          <a:p>
+            <a:pPr lvl="2"/>
+            <a:r>
+              <a:rPr lang="en-CA" sz="2000" b="1" dirty="0" smtClean="0"/>
+              <a:t>Rx Library of .NET Framework</a:t>
+            </a:r>
+            <a:r>
+              <a:rPr lang="en-CA" sz="2000" dirty="0" smtClean="0"/>
+              <a:t>.</a:t>
+            </a:r>
+          </a:p>
+          <a:p>
+            <a:endParaRPr lang="en-CA" sz="2800" dirty="0"/>
+          </a:p>
+        </p:txBody>
+      </p:sp>
+    </p:spTree>
+    <p:extLst>
+      <p:ext uri="{BB962C8B-B14F-4D97-AF65-F5344CB8AC3E}">
+        <p14:creationId xmlns:p14="http://schemas.microsoft.com/office/powerpoint/2010/main" val="415827754"/>
+      </p:ext>
+    </p:extLst>
+  </p:cSld>
+  <p:clrMapOvr>
+    <a:masterClrMapping/>
+  </p:clrMapOvr>
+</p:sld>
+</file>
+
+<file path=ppt/slides/slide22.xml><?xml version="1.0" encoding="utf-8"?>
+<p:sld xmlns:a="http://schemas.openxmlformats.org/drawingml/2006/main" xmlns:r="http://schemas.openxmlformats.org/officeDocument/2006/relationships" xmlns:p="http://schemas.openxmlformats.org/presentationml/2006/main">
+  <p:cSld>
+    <p:spTree>
+      <p:nvGrpSpPr>
+        <p:cNvPr id="1" name=""/>
+        <p:cNvGrpSpPr/>
+        <p:nvPr/>
+      </p:nvGrpSpPr>
+      <p:grpSpPr>
+        <a:xfrm>
+          <a:off x="0" y="0"/>
+          <a:ext cx="0" cy="0"/>
+          <a:chOff x="0" y="0"/>
+          <a:chExt cx="0" cy="0"/>
+        </a:xfrm>
+      </p:grpSpPr>
+      <p:sp>
+        <p:nvSpPr>
+          <p:cNvPr id="2" name="TextBox 1"/>
+          <p:cNvSpPr txBox="1"/>
+          <p:nvPr/>
+        </p:nvSpPr>
+        <p:spPr>
+          <a:xfrm>
+            <a:off x="0" y="-3025"/>
+            <a:ext cx="11467070" cy="769441"/>
+          </a:xfrm>
+          <a:prstGeom prst="rect">
+            <a:avLst/>
+          </a:prstGeom>
+          <a:noFill/>
+        </p:spPr>
+        <p:txBody>
+          <a:bodyPr wrap="square" rtlCol="0">
+            <a:spAutoFit/>
+          </a:bodyPr>
+          <a:lstStyle/>
+          <a:p>
+            <a:r>
+              <a:rPr lang="en-CA" sz="4400" dirty="0" smtClean="0"/>
+              <a:t>Adapter Pattern</a:t>
+            </a:r>
+            <a:endParaRPr lang="en-CA" sz="4400" dirty="0"/>
+          </a:p>
+        </p:txBody>
+      </p:sp>
+      <p:sp>
+        <p:nvSpPr>
+          <p:cNvPr id="3" name="TextBox 2"/>
+          <p:cNvSpPr txBox="1"/>
+          <p:nvPr/>
+        </p:nvSpPr>
+        <p:spPr>
+          <a:xfrm>
+            <a:off x="502507" y="766416"/>
+            <a:ext cx="8748585" cy="5940088"/>
+          </a:xfrm>
+          <a:prstGeom prst="rect">
+            <a:avLst/>
+          </a:prstGeom>
+          <a:noFill/>
+        </p:spPr>
+        <p:txBody>
+          <a:bodyPr wrap="square" rtlCol="0">
+            <a:spAutoFit/>
+          </a:bodyPr>
+          <a:lstStyle/>
+          <a:p>
+            <a:pPr marL="285750" indent="-285750">
+              <a:buFont typeface="Arial" panose="020B0604020202020204" pitchFamily="34" charset="0"/>
+              <a:buChar char="•"/>
+            </a:pPr>
+            <a:r>
+              <a:rPr lang="en-CA" sz="2800" dirty="0" smtClean="0"/>
+              <a:t>Definition:</a:t>
+            </a:r>
+          </a:p>
+          <a:p>
+            <a:pPr lvl="1"/>
+            <a:r>
+              <a:rPr lang="en-US" sz="2000" dirty="0"/>
+              <a:t>Define a one-to-many dependency between objects so that when one object changes state, all its dependents are notified and updated automatically</a:t>
+            </a:r>
+            <a:r>
+              <a:rPr lang="en-US" sz="2000" dirty="0" smtClean="0"/>
+              <a:t>.</a:t>
+            </a:r>
+            <a:r>
+              <a:rPr lang="en-CA" sz="2000" dirty="0" smtClean="0"/>
+              <a:t> </a:t>
+            </a:r>
+            <a:endParaRPr lang="en-CA" sz="2000" dirty="0"/>
+          </a:p>
+          <a:p>
+            <a:endParaRPr lang="en-CA" sz="2800" dirty="0"/>
+          </a:p>
+          <a:p>
+            <a:pPr marL="285750" indent="-285750">
+              <a:buFont typeface="Arial" panose="020B0604020202020204" pitchFamily="34" charset="0"/>
+              <a:buChar char="•"/>
+            </a:pPr>
+            <a:r>
+              <a:rPr lang="en-CA" sz="2800" dirty="0" smtClean="0"/>
+              <a:t>Participants</a:t>
+            </a:r>
+          </a:p>
+          <a:p>
+            <a:pPr lvl="1"/>
+            <a:r>
+              <a:rPr lang="en-CA" sz="2000" b="1" dirty="0" smtClean="0"/>
+              <a:t>Subject: </a:t>
+            </a:r>
+          </a:p>
+          <a:p>
+            <a:pPr lvl="2"/>
+            <a:r>
+              <a:rPr lang="en-CA" sz="1600" dirty="0" smtClean="0"/>
+              <a:t>Defines the interface for attaching and detaching observers </a:t>
+            </a:r>
+          </a:p>
+          <a:p>
+            <a:pPr lvl="1"/>
+            <a:r>
+              <a:rPr lang="en-CA" sz="2000" b="1" dirty="0" smtClean="0"/>
+              <a:t>Concrete Subject: </a:t>
+            </a:r>
+            <a:endParaRPr lang="en-CA" sz="2000" b="1" dirty="0"/>
+          </a:p>
+          <a:p>
+            <a:pPr lvl="2"/>
+            <a:r>
+              <a:rPr lang="en-CA" sz="1600" dirty="0" smtClean="0"/>
+              <a:t>Implements the concreate subject logic.</a:t>
+            </a:r>
+            <a:endParaRPr lang="en-CA" sz="2000" dirty="0"/>
+          </a:p>
+          <a:p>
+            <a:pPr lvl="1"/>
+            <a:r>
+              <a:rPr lang="en-CA" sz="2000" b="1" dirty="0" smtClean="0"/>
+              <a:t>Observer: </a:t>
+            </a:r>
+            <a:endParaRPr lang="en-CA" sz="2000" b="1" dirty="0"/>
+          </a:p>
+          <a:p>
+            <a:pPr lvl="2"/>
+            <a:r>
+              <a:rPr lang="en-CA" sz="1600" dirty="0" smtClean="0"/>
+              <a:t>Defines the interface for sending the messages to all observers from the subject.</a:t>
+            </a:r>
+          </a:p>
+          <a:p>
+            <a:pPr lvl="1"/>
+            <a:r>
+              <a:rPr lang="en-CA" sz="2000" b="1" dirty="0" smtClean="0"/>
+              <a:t>Concrete Observer</a:t>
+            </a:r>
+            <a:r>
+              <a:rPr lang="en-CA" sz="2000" b="1" dirty="0"/>
+              <a:t>: </a:t>
+            </a:r>
+          </a:p>
+          <a:p>
+            <a:pPr lvl="2"/>
+            <a:r>
+              <a:rPr lang="en-CA" sz="1600" dirty="0" smtClean="0"/>
+              <a:t>Implements the concrete observer where it receives messages.</a:t>
+            </a:r>
+            <a:endParaRPr lang="en-CA" sz="1600" dirty="0"/>
+          </a:p>
+          <a:p>
+            <a:pPr lvl="1"/>
+            <a:endParaRPr lang="en-CA" sz="1600" dirty="0"/>
+          </a:p>
+          <a:p>
+            <a:pPr lvl="1"/>
+            <a:endParaRPr lang="en-CA" sz="2000" dirty="0"/>
+          </a:p>
+          <a:p>
+            <a:pPr marL="457200" indent="-457200">
+              <a:buFont typeface="Arial" panose="020B0604020202020204" pitchFamily="34" charset="0"/>
+              <a:buChar char="•"/>
+            </a:pPr>
+            <a:r>
+              <a:rPr lang="en-CA" sz="2800" dirty="0" smtClean="0"/>
+              <a:t>Real World Example </a:t>
+            </a:r>
+          </a:p>
+          <a:p>
+            <a:pPr lvl="2"/>
+            <a:r>
+              <a:rPr lang="en-CA" sz="2000" b="1" dirty="0" smtClean="0"/>
+              <a:t>Rx Library of .NET Framework</a:t>
+            </a:r>
+            <a:r>
+              <a:rPr lang="en-CA" sz="2000" dirty="0" smtClean="0"/>
+              <a:t>.</a:t>
+            </a:r>
+          </a:p>
+          <a:p>
+            <a:endParaRPr lang="en-CA" sz="2800" dirty="0"/>
+          </a:p>
+        </p:txBody>
+      </p:sp>
+    </p:spTree>
+    <p:extLst>
+      <p:ext uri="{BB962C8B-B14F-4D97-AF65-F5344CB8AC3E}">
+        <p14:creationId xmlns:p14="http://schemas.microsoft.com/office/powerpoint/2010/main" val="2807524481"/>
+      </p:ext>
+    </p:extLst>
+  </p:cSld>
+  <p:clrMapOvr>
+    <a:masterClrMapping/>
+  </p:clrMapOvr>
+</p:sld>
+</file>
+
+<file path=ppt/slides/slide23.xml><?xml version="1.0" encoding="utf-8"?>
+<p:sld xmlns:a="http://schemas.openxmlformats.org/drawingml/2006/main" xmlns:r="http://schemas.openxmlformats.org/officeDocument/2006/relationships" xmlns:p="http://schemas.openxmlformats.org/presentationml/2006/main">
+  <p:cSld>
+    <p:spTree>
+      <p:nvGrpSpPr>
+        <p:cNvPr id="1" name=""/>
+        <p:cNvGrpSpPr/>
+        <p:nvPr/>
+      </p:nvGrpSpPr>
+      <p:grpSpPr>
+        <a:xfrm>
+          <a:off x="0" y="0"/>
+          <a:ext cx="0" cy="0"/>
+          <a:chOff x="0" y="0"/>
+          <a:chExt cx="0" cy="0"/>
+        </a:xfrm>
+      </p:grpSpPr>
+      <p:sp>
+        <p:nvSpPr>
+          <p:cNvPr id="2" name="TextBox 1"/>
+          <p:cNvSpPr txBox="1"/>
+          <p:nvPr/>
+        </p:nvSpPr>
+        <p:spPr>
+          <a:xfrm>
+            <a:off x="0" y="-3025"/>
+            <a:ext cx="11467070" cy="769441"/>
+          </a:xfrm>
+          <a:prstGeom prst="rect">
+            <a:avLst/>
+          </a:prstGeom>
+          <a:noFill/>
+        </p:spPr>
+        <p:txBody>
+          <a:bodyPr wrap="square" rtlCol="0">
+            <a:spAutoFit/>
+          </a:bodyPr>
+          <a:lstStyle/>
+          <a:p>
+            <a:r>
+              <a:rPr lang="en-CA" sz="4400" dirty="0" smtClean="0"/>
+              <a:t>Command Pattern</a:t>
+            </a:r>
+            <a:endParaRPr lang="en-CA" sz="4400" dirty="0"/>
+          </a:p>
+        </p:txBody>
+      </p:sp>
+      <p:sp>
+        <p:nvSpPr>
+          <p:cNvPr id="3" name="TextBox 2"/>
+          <p:cNvSpPr txBox="1"/>
+          <p:nvPr/>
+        </p:nvSpPr>
+        <p:spPr>
+          <a:xfrm>
+            <a:off x="502507" y="766416"/>
+            <a:ext cx="8748585" cy="5940088"/>
+          </a:xfrm>
+          <a:prstGeom prst="rect">
+            <a:avLst/>
+          </a:prstGeom>
+          <a:noFill/>
+        </p:spPr>
+        <p:txBody>
+          <a:bodyPr wrap="square" rtlCol="0">
+            <a:spAutoFit/>
+          </a:bodyPr>
+          <a:lstStyle/>
+          <a:p>
+            <a:pPr marL="285750" indent="-285750">
+              <a:buFont typeface="Arial" panose="020B0604020202020204" pitchFamily="34" charset="0"/>
+              <a:buChar char="•"/>
+            </a:pPr>
+            <a:r>
+              <a:rPr lang="en-CA" sz="2800" dirty="0" smtClean="0"/>
+              <a:t>Definition:</a:t>
+            </a:r>
+          </a:p>
+          <a:p>
+            <a:pPr lvl="1"/>
+            <a:r>
+              <a:rPr lang="en-US" sz="2000" dirty="0"/>
+              <a:t>Define a one-to-many dependency between objects so that when one object changes state, all its dependents are notified and updated automatically</a:t>
+            </a:r>
+            <a:r>
+              <a:rPr lang="en-US" sz="2000" dirty="0" smtClean="0"/>
+              <a:t>.</a:t>
+            </a:r>
+            <a:r>
+              <a:rPr lang="en-CA" sz="2000" dirty="0" smtClean="0"/>
+              <a:t> </a:t>
+            </a:r>
+            <a:endParaRPr lang="en-CA" sz="2000" dirty="0"/>
+          </a:p>
+          <a:p>
+            <a:endParaRPr lang="en-CA" sz="2800" dirty="0"/>
+          </a:p>
+          <a:p>
+            <a:pPr marL="285750" indent="-285750">
+              <a:buFont typeface="Arial" panose="020B0604020202020204" pitchFamily="34" charset="0"/>
+              <a:buChar char="•"/>
+            </a:pPr>
+            <a:r>
+              <a:rPr lang="en-CA" sz="2800" dirty="0" smtClean="0"/>
+              <a:t>Participants</a:t>
+            </a:r>
+          </a:p>
+          <a:p>
+            <a:pPr lvl="1"/>
+            <a:r>
+              <a:rPr lang="en-CA" sz="2000" b="1" dirty="0" smtClean="0"/>
+              <a:t>Subject: </a:t>
+            </a:r>
+          </a:p>
+          <a:p>
+            <a:pPr lvl="2"/>
+            <a:r>
+              <a:rPr lang="en-CA" sz="1600" dirty="0" smtClean="0"/>
+              <a:t>Defines the interface for attaching and detaching observers </a:t>
+            </a:r>
+          </a:p>
+          <a:p>
+            <a:pPr lvl="1"/>
+            <a:r>
+              <a:rPr lang="en-CA" sz="2000" b="1" dirty="0" smtClean="0"/>
+              <a:t>Concrete Subject: </a:t>
+            </a:r>
+            <a:endParaRPr lang="en-CA" sz="2000" b="1" dirty="0"/>
+          </a:p>
+          <a:p>
+            <a:pPr lvl="2"/>
+            <a:r>
+              <a:rPr lang="en-CA" sz="1600" dirty="0" smtClean="0"/>
+              <a:t>Implements the concreate subject logic.</a:t>
+            </a:r>
+            <a:endParaRPr lang="en-CA" sz="2000" dirty="0"/>
+          </a:p>
+          <a:p>
+            <a:pPr lvl="1"/>
+            <a:r>
+              <a:rPr lang="en-CA" sz="2000" b="1" dirty="0" smtClean="0"/>
+              <a:t>Observer: </a:t>
+            </a:r>
+            <a:endParaRPr lang="en-CA" sz="2000" b="1" dirty="0"/>
+          </a:p>
+          <a:p>
+            <a:pPr lvl="2"/>
+            <a:r>
+              <a:rPr lang="en-CA" sz="1600" dirty="0" smtClean="0"/>
+              <a:t>Defines the interface for sending the messages to all observers from the subject.</a:t>
+            </a:r>
+          </a:p>
+          <a:p>
+            <a:pPr lvl="1"/>
+            <a:r>
+              <a:rPr lang="en-CA" sz="2000" b="1" dirty="0" smtClean="0"/>
+              <a:t>Concrete Observer</a:t>
+            </a:r>
+            <a:r>
+              <a:rPr lang="en-CA" sz="2000" b="1" dirty="0"/>
+              <a:t>: </a:t>
+            </a:r>
+          </a:p>
+          <a:p>
+            <a:pPr lvl="2"/>
+            <a:r>
+              <a:rPr lang="en-CA" sz="1600" dirty="0" smtClean="0"/>
+              <a:t>Implements the concrete observer where it receives messages.</a:t>
+            </a:r>
+            <a:endParaRPr lang="en-CA" sz="1600" dirty="0"/>
+          </a:p>
+          <a:p>
+            <a:pPr lvl="1"/>
+            <a:endParaRPr lang="en-CA" sz="1600" dirty="0"/>
+          </a:p>
+          <a:p>
+            <a:pPr lvl="1"/>
+            <a:endParaRPr lang="en-CA" sz="2000" dirty="0"/>
+          </a:p>
+          <a:p>
+            <a:pPr marL="457200" indent="-457200">
+              <a:buFont typeface="Arial" panose="020B0604020202020204" pitchFamily="34" charset="0"/>
+              <a:buChar char="•"/>
+            </a:pPr>
+            <a:r>
+              <a:rPr lang="en-CA" sz="2800" dirty="0" smtClean="0"/>
+              <a:t>Real World Example </a:t>
+            </a:r>
+          </a:p>
+          <a:p>
+            <a:pPr lvl="2"/>
+            <a:r>
+              <a:rPr lang="en-CA" sz="2000" b="1" dirty="0" smtClean="0"/>
+              <a:t>Rx Library of .NET Framework</a:t>
+            </a:r>
+            <a:r>
+              <a:rPr lang="en-CA" sz="2000" dirty="0" smtClean="0"/>
+              <a:t>.</a:t>
+            </a:r>
+          </a:p>
+          <a:p>
+            <a:endParaRPr lang="en-CA" sz="2800" dirty="0"/>
+          </a:p>
+        </p:txBody>
+      </p:sp>
+    </p:spTree>
+    <p:extLst>
+      <p:ext uri="{BB962C8B-B14F-4D97-AF65-F5344CB8AC3E}">
+        <p14:creationId xmlns:p14="http://schemas.microsoft.com/office/powerpoint/2010/main" val="1213438137"/>
+      </p:ext>
+    </p:extLst>
+  </p:cSld>
+  <p:clrMapOvr>
+    <a:masterClrMapping/>
+  </p:clrMapOvr>
+</p:sld>
+</file>
+
+<file path=ppt/slides/slide24.xml><?xml version="1.0" encoding="utf-8"?>
+<p:sld xmlns:a="http://schemas.openxmlformats.org/drawingml/2006/main" xmlns:r="http://schemas.openxmlformats.org/officeDocument/2006/relationships" xmlns:p="http://schemas.openxmlformats.org/presentationml/2006/main">
+  <p:cSld>
+    <p:spTree>
+      <p:nvGrpSpPr>
+        <p:cNvPr id="1" name=""/>
+        <p:cNvGrpSpPr/>
+        <p:nvPr/>
+      </p:nvGrpSpPr>
+      <p:grpSpPr>
+        <a:xfrm>
+          <a:off x="0" y="0"/>
+          <a:ext cx="0" cy="0"/>
+          <a:chOff x="0" y="0"/>
+          <a:chExt cx="0" cy="0"/>
+        </a:xfrm>
+      </p:grpSpPr>
+      <p:sp>
+        <p:nvSpPr>
+          <p:cNvPr id="2" name="TextBox 1"/>
+          <p:cNvSpPr txBox="1"/>
+          <p:nvPr/>
+        </p:nvSpPr>
+        <p:spPr>
+          <a:xfrm>
+            <a:off x="0" y="-3025"/>
+            <a:ext cx="11467070" cy="769441"/>
+          </a:xfrm>
+          <a:prstGeom prst="rect">
+            <a:avLst/>
+          </a:prstGeom>
+          <a:noFill/>
+        </p:spPr>
+        <p:txBody>
+          <a:bodyPr wrap="square" rtlCol="0">
+            <a:spAutoFit/>
+          </a:bodyPr>
+          <a:lstStyle/>
+          <a:p>
+            <a:r>
+              <a:rPr lang="en-CA" sz="4400" dirty="0" smtClean="0"/>
+              <a:t>Memento Pattern</a:t>
+            </a:r>
+            <a:endParaRPr lang="en-CA" sz="4400" dirty="0"/>
+          </a:p>
+        </p:txBody>
+      </p:sp>
+      <p:sp>
+        <p:nvSpPr>
+          <p:cNvPr id="3" name="TextBox 2"/>
+          <p:cNvSpPr txBox="1"/>
+          <p:nvPr/>
+        </p:nvSpPr>
+        <p:spPr>
+          <a:xfrm>
+            <a:off x="502507" y="766416"/>
+            <a:ext cx="8748585" cy="5940088"/>
+          </a:xfrm>
+          <a:prstGeom prst="rect">
+            <a:avLst/>
+          </a:prstGeom>
+          <a:noFill/>
+        </p:spPr>
+        <p:txBody>
+          <a:bodyPr wrap="square" rtlCol="0">
+            <a:spAutoFit/>
+          </a:bodyPr>
+          <a:lstStyle/>
+          <a:p>
+            <a:pPr marL="285750" indent="-285750">
+              <a:buFont typeface="Arial" panose="020B0604020202020204" pitchFamily="34" charset="0"/>
+              <a:buChar char="•"/>
+            </a:pPr>
+            <a:r>
+              <a:rPr lang="en-CA" sz="2800" dirty="0" smtClean="0"/>
+              <a:t>Definition:</a:t>
+            </a:r>
+          </a:p>
+          <a:p>
+            <a:pPr lvl="1"/>
+            <a:r>
+              <a:rPr lang="en-US" sz="2000" dirty="0"/>
+              <a:t>Define a one-to-many dependency between objects so that when one object changes state, all its dependents are notified and updated automatically</a:t>
+            </a:r>
+            <a:r>
+              <a:rPr lang="en-US" sz="2000" dirty="0" smtClean="0"/>
+              <a:t>.</a:t>
+            </a:r>
+            <a:r>
+              <a:rPr lang="en-CA" sz="2000" dirty="0" smtClean="0"/>
+              <a:t> </a:t>
+            </a:r>
+            <a:endParaRPr lang="en-CA" sz="2000" dirty="0"/>
+          </a:p>
+          <a:p>
+            <a:endParaRPr lang="en-CA" sz="2800" dirty="0"/>
+          </a:p>
+          <a:p>
+            <a:pPr marL="285750" indent="-285750">
+              <a:buFont typeface="Arial" panose="020B0604020202020204" pitchFamily="34" charset="0"/>
+              <a:buChar char="•"/>
+            </a:pPr>
+            <a:r>
+              <a:rPr lang="en-CA" sz="2800" dirty="0" smtClean="0"/>
+              <a:t>Participants</a:t>
+            </a:r>
+          </a:p>
+          <a:p>
+            <a:pPr lvl="1"/>
+            <a:r>
+              <a:rPr lang="en-CA" sz="2000" b="1" dirty="0" smtClean="0"/>
+              <a:t>Subject: </a:t>
+            </a:r>
+          </a:p>
+          <a:p>
+            <a:pPr lvl="2"/>
+            <a:r>
+              <a:rPr lang="en-CA" sz="1600" dirty="0" smtClean="0"/>
+              <a:t>Defines the interface for attaching and detaching observers </a:t>
+            </a:r>
+          </a:p>
+          <a:p>
+            <a:pPr lvl="1"/>
+            <a:r>
+              <a:rPr lang="en-CA" sz="2000" b="1" dirty="0" smtClean="0"/>
+              <a:t>Concrete Subject: </a:t>
+            </a:r>
+            <a:endParaRPr lang="en-CA" sz="2000" b="1" dirty="0"/>
+          </a:p>
+          <a:p>
+            <a:pPr lvl="2"/>
+            <a:r>
+              <a:rPr lang="en-CA" sz="1600" dirty="0" smtClean="0"/>
+              <a:t>Implements the concreate subject logic.</a:t>
+            </a:r>
+            <a:endParaRPr lang="en-CA" sz="2000" dirty="0"/>
+          </a:p>
+          <a:p>
+            <a:pPr lvl="1"/>
+            <a:r>
+              <a:rPr lang="en-CA" sz="2000" b="1" dirty="0" smtClean="0"/>
+              <a:t>Observer: </a:t>
+            </a:r>
+            <a:endParaRPr lang="en-CA" sz="2000" b="1" dirty="0"/>
+          </a:p>
+          <a:p>
+            <a:pPr lvl="2"/>
+            <a:r>
+              <a:rPr lang="en-CA" sz="1600" dirty="0" smtClean="0"/>
+              <a:t>Defines the interface for sending the messages to all observers from the subject.</a:t>
+            </a:r>
+          </a:p>
+          <a:p>
+            <a:pPr lvl="1"/>
+            <a:r>
+              <a:rPr lang="en-CA" sz="2000" b="1" dirty="0" smtClean="0"/>
+              <a:t>Concrete Observer</a:t>
+            </a:r>
+            <a:r>
+              <a:rPr lang="en-CA" sz="2000" b="1" dirty="0"/>
+              <a:t>: </a:t>
+            </a:r>
+          </a:p>
+          <a:p>
+            <a:pPr lvl="2"/>
+            <a:r>
+              <a:rPr lang="en-CA" sz="1600" dirty="0" smtClean="0"/>
+              <a:t>Implements the concrete observer where it receives messages.</a:t>
+            </a:r>
+            <a:endParaRPr lang="en-CA" sz="1600" dirty="0"/>
+          </a:p>
+          <a:p>
+            <a:pPr lvl="1"/>
+            <a:endParaRPr lang="en-CA" sz="1600" dirty="0"/>
+          </a:p>
+          <a:p>
+            <a:pPr lvl="1"/>
+            <a:endParaRPr lang="en-CA" sz="2000" dirty="0"/>
+          </a:p>
+          <a:p>
+            <a:pPr marL="457200" indent="-457200">
+              <a:buFont typeface="Arial" panose="020B0604020202020204" pitchFamily="34" charset="0"/>
+              <a:buChar char="•"/>
+            </a:pPr>
+            <a:r>
+              <a:rPr lang="en-CA" sz="2800" dirty="0" smtClean="0"/>
+              <a:t>Real World Example </a:t>
+            </a:r>
+          </a:p>
+          <a:p>
+            <a:pPr lvl="2"/>
+            <a:r>
+              <a:rPr lang="en-CA" sz="2000" b="1" dirty="0" smtClean="0"/>
+              <a:t>Rx Library of .NET Framework</a:t>
+            </a:r>
+            <a:r>
+              <a:rPr lang="en-CA" sz="2000" dirty="0" smtClean="0"/>
+              <a:t>.</a:t>
+            </a:r>
+          </a:p>
+          <a:p>
+            <a:endParaRPr lang="en-CA" sz="2800" dirty="0"/>
+          </a:p>
+        </p:txBody>
+      </p:sp>
+    </p:spTree>
+    <p:extLst>
+      <p:ext uri="{BB962C8B-B14F-4D97-AF65-F5344CB8AC3E}">
+        <p14:creationId xmlns:p14="http://schemas.microsoft.com/office/powerpoint/2010/main" val="1330610685"/>
+      </p:ext>
+    </p:extLst>
+  </p:cSld>
+  <p:clrMapOvr>
+    <a:masterClrMapping/>
+  </p:clrMapOvr>
+</p:sld>
+</file>
+
+<file path=ppt/slides/slide25.xml><?xml version="1.0" encoding="utf-8"?>
+<p:sld xmlns:a="http://schemas.openxmlformats.org/drawingml/2006/main" xmlns:r="http://schemas.openxmlformats.org/officeDocument/2006/relationships" xmlns:p="http://schemas.openxmlformats.org/presentationml/2006/main">
+  <p:cSld>
+    <p:spTree>
+      <p:nvGrpSpPr>
+        <p:cNvPr id="1" name=""/>
+        <p:cNvGrpSpPr/>
+        <p:nvPr/>
+      </p:nvGrpSpPr>
+      <p:grpSpPr>
+        <a:xfrm>
+          <a:off x="0" y="0"/>
+          <a:ext cx="0" cy="0"/>
+          <a:chOff x="0" y="0"/>
+          <a:chExt cx="0" cy="0"/>
+        </a:xfrm>
+      </p:grpSpPr>
+      <p:sp>
+        <p:nvSpPr>
+          <p:cNvPr id="2" name="TextBox 1"/>
+          <p:cNvSpPr txBox="1"/>
+          <p:nvPr/>
+        </p:nvSpPr>
+        <p:spPr>
+          <a:xfrm>
+            <a:off x="0" y="-3025"/>
+            <a:ext cx="11467070" cy="769441"/>
+          </a:xfrm>
+          <a:prstGeom prst="rect">
+            <a:avLst/>
+          </a:prstGeom>
+          <a:noFill/>
+        </p:spPr>
+        <p:txBody>
+          <a:bodyPr wrap="square" rtlCol="0">
+            <a:spAutoFit/>
+          </a:bodyPr>
+          <a:lstStyle/>
+          <a:p>
+            <a:r>
+              <a:rPr lang="en-CA" sz="4400" dirty="0" smtClean="0"/>
+              <a:t>State Pattern</a:t>
+            </a:r>
+            <a:endParaRPr lang="en-CA" sz="4400" dirty="0"/>
+          </a:p>
+        </p:txBody>
+      </p:sp>
+      <p:sp>
+        <p:nvSpPr>
+          <p:cNvPr id="3" name="TextBox 2"/>
+          <p:cNvSpPr txBox="1"/>
+          <p:nvPr/>
+        </p:nvSpPr>
+        <p:spPr>
+          <a:xfrm>
+            <a:off x="502507" y="766416"/>
+            <a:ext cx="8748585" cy="5940088"/>
+          </a:xfrm>
+          <a:prstGeom prst="rect">
+            <a:avLst/>
+          </a:prstGeom>
+          <a:noFill/>
+        </p:spPr>
+        <p:txBody>
+          <a:bodyPr wrap="square" rtlCol="0">
+            <a:spAutoFit/>
+          </a:bodyPr>
+          <a:lstStyle/>
+          <a:p>
+            <a:pPr marL="285750" indent="-285750">
+              <a:buFont typeface="Arial" panose="020B0604020202020204" pitchFamily="34" charset="0"/>
+              <a:buChar char="•"/>
+            </a:pPr>
+            <a:r>
+              <a:rPr lang="en-CA" sz="2800" dirty="0" smtClean="0"/>
+              <a:t>Definition:</a:t>
+            </a:r>
+          </a:p>
+          <a:p>
+            <a:pPr lvl="1"/>
+            <a:r>
+              <a:rPr lang="en-US" sz="2000" dirty="0"/>
+              <a:t>Define a one-to-many dependency between objects so that when one object changes state, all its dependents are notified and updated automatically</a:t>
+            </a:r>
+            <a:r>
+              <a:rPr lang="en-US" sz="2000" dirty="0" smtClean="0"/>
+              <a:t>.</a:t>
+            </a:r>
+            <a:r>
+              <a:rPr lang="en-CA" sz="2000" dirty="0" smtClean="0"/>
+              <a:t> </a:t>
+            </a:r>
+            <a:endParaRPr lang="en-CA" sz="2000" dirty="0"/>
+          </a:p>
+          <a:p>
+            <a:endParaRPr lang="en-CA" sz="2800" dirty="0"/>
+          </a:p>
+          <a:p>
+            <a:pPr marL="285750" indent="-285750">
+              <a:buFont typeface="Arial" panose="020B0604020202020204" pitchFamily="34" charset="0"/>
+              <a:buChar char="•"/>
+            </a:pPr>
+            <a:r>
+              <a:rPr lang="en-CA" sz="2800" dirty="0" smtClean="0"/>
+              <a:t>Participants</a:t>
+            </a:r>
+          </a:p>
+          <a:p>
+            <a:pPr lvl="1"/>
+            <a:r>
+              <a:rPr lang="en-CA" sz="2000" b="1" dirty="0" smtClean="0"/>
+              <a:t>Subject: </a:t>
+            </a:r>
+          </a:p>
+          <a:p>
+            <a:pPr lvl="2"/>
+            <a:r>
+              <a:rPr lang="en-CA" sz="1600" dirty="0" smtClean="0"/>
+              <a:t>Defines the interface for attaching and detaching observers </a:t>
+            </a:r>
+          </a:p>
+          <a:p>
+            <a:pPr lvl="1"/>
+            <a:r>
+              <a:rPr lang="en-CA" sz="2000" b="1" dirty="0" smtClean="0"/>
+              <a:t>Concrete Subject: </a:t>
+            </a:r>
+            <a:endParaRPr lang="en-CA" sz="2000" b="1" dirty="0"/>
+          </a:p>
+          <a:p>
+            <a:pPr lvl="2"/>
+            <a:r>
+              <a:rPr lang="en-CA" sz="1600" dirty="0" smtClean="0"/>
+              <a:t>Implements the concreate subject logic.</a:t>
+            </a:r>
+            <a:endParaRPr lang="en-CA" sz="2000" dirty="0"/>
+          </a:p>
+          <a:p>
+            <a:pPr lvl="1"/>
+            <a:r>
+              <a:rPr lang="en-CA" sz="2000" b="1" dirty="0" smtClean="0"/>
+              <a:t>Observer: </a:t>
+            </a:r>
+            <a:endParaRPr lang="en-CA" sz="2000" b="1" dirty="0"/>
+          </a:p>
+          <a:p>
+            <a:pPr lvl="2"/>
+            <a:r>
+              <a:rPr lang="en-CA" sz="1600" dirty="0" smtClean="0"/>
+              <a:t>Defines the interface for sending the messages to all observers from the subject.</a:t>
+            </a:r>
+          </a:p>
+          <a:p>
+            <a:pPr lvl="1"/>
+            <a:r>
+              <a:rPr lang="en-CA" sz="2000" b="1" dirty="0" smtClean="0"/>
+              <a:t>Concrete Observer</a:t>
+            </a:r>
+            <a:r>
+              <a:rPr lang="en-CA" sz="2000" b="1" dirty="0"/>
+              <a:t>: </a:t>
+            </a:r>
+          </a:p>
+          <a:p>
+            <a:pPr lvl="2"/>
+            <a:r>
+              <a:rPr lang="en-CA" sz="1600" dirty="0" smtClean="0"/>
+              <a:t>Implements the concrete observer where it receives messages.</a:t>
+            </a:r>
+            <a:endParaRPr lang="en-CA" sz="1600" dirty="0"/>
+          </a:p>
+          <a:p>
+            <a:pPr lvl="1"/>
+            <a:endParaRPr lang="en-CA" sz="1600" dirty="0"/>
+          </a:p>
+          <a:p>
+            <a:pPr lvl="1"/>
+            <a:endParaRPr lang="en-CA" sz="2000" dirty="0"/>
+          </a:p>
+          <a:p>
+            <a:pPr marL="457200" indent="-457200">
+              <a:buFont typeface="Arial" panose="020B0604020202020204" pitchFamily="34" charset="0"/>
+              <a:buChar char="•"/>
+            </a:pPr>
+            <a:r>
+              <a:rPr lang="en-CA" sz="2800" dirty="0" smtClean="0"/>
+              <a:t>Real World Example </a:t>
+            </a:r>
+          </a:p>
+          <a:p>
+            <a:pPr lvl="2"/>
+            <a:r>
+              <a:rPr lang="en-CA" sz="2000" b="1" dirty="0" smtClean="0"/>
+              <a:t>Rx Library of .NET Framework</a:t>
+            </a:r>
+            <a:r>
+              <a:rPr lang="en-CA" sz="2000" dirty="0" smtClean="0"/>
+              <a:t>.</a:t>
+            </a:r>
+          </a:p>
+          <a:p>
+            <a:endParaRPr lang="en-CA" sz="2800" dirty="0"/>
+          </a:p>
+        </p:txBody>
+      </p:sp>
+    </p:spTree>
+    <p:extLst>
+      <p:ext uri="{BB962C8B-B14F-4D97-AF65-F5344CB8AC3E}">
+        <p14:creationId xmlns:p14="http://schemas.microsoft.com/office/powerpoint/2010/main" val="235937969"/>
+      </p:ext>
+    </p:extLst>
+  </p:cSld>
+  <p:clrMapOvr>
+    <a:masterClrMapping/>
+  </p:clrMapOvr>
+</p:sld>
+</file>
+
+<file path=ppt/slides/slide26.xml><?xml version="1.0" encoding="utf-8"?>
+<p:sld xmlns:a="http://schemas.openxmlformats.org/drawingml/2006/main" xmlns:r="http://schemas.openxmlformats.org/officeDocument/2006/relationships" xmlns:p="http://schemas.openxmlformats.org/presentationml/2006/main">
+  <p:cSld>
+    <p:spTree>
+      <p:nvGrpSpPr>
+        <p:cNvPr id="1" name=""/>
+        <p:cNvGrpSpPr/>
+        <p:nvPr/>
+      </p:nvGrpSpPr>
+      <p:grpSpPr>
+        <a:xfrm>
+          <a:off x="0" y="0"/>
+          <a:ext cx="0" cy="0"/>
+          <a:chOff x="0" y="0"/>
+          <a:chExt cx="0" cy="0"/>
+        </a:xfrm>
+      </p:grpSpPr>
+      <p:sp>
+        <p:nvSpPr>
+          <p:cNvPr id="2" name="TextBox 1"/>
+          <p:cNvSpPr txBox="1"/>
+          <p:nvPr/>
+        </p:nvSpPr>
+        <p:spPr>
+          <a:xfrm>
+            <a:off x="0" y="-3025"/>
+            <a:ext cx="11467070" cy="769441"/>
+          </a:xfrm>
+          <a:prstGeom prst="rect">
+            <a:avLst/>
+          </a:prstGeom>
+          <a:noFill/>
+        </p:spPr>
+        <p:txBody>
+          <a:bodyPr wrap="square" rtlCol="0">
+            <a:spAutoFit/>
+          </a:bodyPr>
+          <a:lstStyle/>
+          <a:p>
+            <a:r>
+              <a:rPr lang="en-CA" sz="4400" dirty="0" smtClean="0"/>
+              <a:t>Mediator Pattern</a:t>
+            </a:r>
+            <a:endParaRPr lang="en-CA" sz="4400" dirty="0"/>
+          </a:p>
+        </p:txBody>
+      </p:sp>
+      <p:sp>
+        <p:nvSpPr>
+          <p:cNvPr id="3" name="TextBox 2"/>
+          <p:cNvSpPr txBox="1"/>
+          <p:nvPr/>
+        </p:nvSpPr>
+        <p:spPr>
+          <a:xfrm>
+            <a:off x="502507" y="766416"/>
+            <a:ext cx="8748585" cy="5940088"/>
+          </a:xfrm>
+          <a:prstGeom prst="rect">
+            <a:avLst/>
+          </a:prstGeom>
+          <a:noFill/>
+        </p:spPr>
+        <p:txBody>
+          <a:bodyPr wrap="square" rtlCol="0">
+            <a:spAutoFit/>
+          </a:bodyPr>
+          <a:lstStyle/>
+          <a:p>
+            <a:pPr marL="285750" indent="-285750">
+              <a:buFont typeface="Arial" panose="020B0604020202020204" pitchFamily="34" charset="0"/>
+              <a:buChar char="•"/>
+            </a:pPr>
+            <a:r>
+              <a:rPr lang="en-CA" sz="2800" dirty="0" smtClean="0"/>
+              <a:t>Definition:</a:t>
+            </a:r>
+          </a:p>
+          <a:p>
+            <a:pPr lvl="1"/>
+            <a:r>
+              <a:rPr lang="en-US" sz="2000" dirty="0"/>
+              <a:t>Define a one-to-many dependency between objects so that when one object changes state, all its dependents are notified and updated automatically</a:t>
+            </a:r>
+            <a:r>
+              <a:rPr lang="en-US" sz="2000" dirty="0" smtClean="0"/>
+              <a:t>.</a:t>
+            </a:r>
+            <a:r>
+              <a:rPr lang="en-CA" sz="2000" dirty="0" smtClean="0"/>
+              <a:t> </a:t>
+            </a:r>
+            <a:endParaRPr lang="en-CA" sz="2000" dirty="0"/>
+          </a:p>
+          <a:p>
+            <a:endParaRPr lang="en-CA" sz="2800" dirty="0"/>
+          </a:p>
+          <a:p>
+            <a:pPr marL="285750" indent="-285750">
+              <a:buFont typeface="Arial" panose="020B0604020202020204" pitchFamily="34" charset="0"/>
+              <a:buChar char="•"/>
+            </a:pPr>
+            <a:r>
+              <a:rPr lang="en-CA" sz="2800" dirty="0" smtClean="0"/>
+              <a:t>Participants</a:t>
+            </a:r>
+          </a:p>
+          <a:p>
+            <a:pPr lvl="1"/>
+            <a:r>
+              <a:rPr lang="en-CA" sz="2000" b="1" dirty="0" smtClean="0"/>
+              <a:t>Subject: </a:t>
+            </a:r>
+          </a:p>
+          <a:p>
+            <a:pPr lvl="2"/>
+            <a:r>
+              <a:rPr lang="en-CA" sz="1600" dirty="0" smtClean="0"/>
+              <a:t>Defines the interface for attaching and detaching observers </a:t>
+            </a:r>
+          </a:p>
+          <a:p>
+            <a:pPr lvl="1"/>
+            <a:r>
+              <a:rPr lang="en-CA" sz="2000" b="1" dirty="0" smtClean="0"/>
+              <a:t>Concrete Subject: </a:t>
+            </a:r>
+            <a:endParaRPr lang="en-CA" sz="2000" b="1" dirty="0"/>
+          </a:p>
+          <a:p>
+            <a:pPr lvl="2"/>
+            <a:r>
+              <a:rPr lang="en-CA" sz="1600" dirty="0" smtClean="0"/>
+              <a:t>Implements the concreate subject logic.</a:t>
+            </a:r>
+            <a:endParaRPr lang="en-CA" sz="2000" dirty="0"/>
+          </a:p>
+          <a:p>
+            <a:pPr lvl="1"/>
+            <a:r>
+              <a:rPr lang="en-CA" sz="2000" b="1" dirty="0" smtClean="0"/>
+              <a:t>Observer: </a:t>
+            </a:r>
+            <a:endParaRPr lang="en-CA" sz="2000" b="1" dirty="0"/>
+          </a:p>
+          <a:p>
+            <a:pPr lvl="2"/>
+            <a:r>
+              <a:rPr lang="en-CA" sz="1600" dirty="0" smtClean="0"/>
+              <a:t>Defines the interface for sending the messages to all observers from the subject.</a:t>
+            </a:r>
+          </a:p>
+          <a:p>
+            <a:pPr lvl="1"/>
+            <a:r>
+              <a:rPr lang="en-CA" sz="2000" b="1" dirty="0" smtClean="0"/>
+              <a:t>Concrete Observer</a:t>
+            </a:r>
+            <a:r>
+              <a:rPr lang="en-CA" sz="2000" b="1" dirty="0"/>
+              <a:t>: </a:t>
+            </a:r>
+          </a:p>
+          <a:p>
+            <a:pPr lvl="2"/>
+            <a:r>
+              <a:rPr lang="en-CA" sz="1600" dirty="0" smtClean="0"/>
+              <a:t>Implements the concrete observer where it receives messages.</a:t>
+            </a:r>
+            <a:endParaRPr lang="en-CA" sz="1600" dirty="0"/>
+          </a:p>
+          <a:p>
+            <a:pPr lvl="1"/>
+            <a:endParaRPr lang="en-CA" sz="1600" dirty="0"/>
+          </a:p>
+          <a:p>
+            <a:pPr lvl="1"/>
+            <a:endParaRPr lang="en-CA" sz="2000" dirty="0"/>
+          </a:p>
+          <a:p>
+            <a:pPr marL="457200" indent="-457200">
+              <a:buFont typeface="Arial" panose="020B0604020202020204" pitchFamily="34" charset="0"/>
+              <a:buChar char="•"/>
+            </a:pPr>
+            <a:r>
+              <a:rPr lang="en-CA" sz="2800" dirty="0" smtClean="0"/>
+              <a:t>Real World Example </a:t>
+            </a:r>
+          </a:p>
+          <a:p>
+            <a:pPr lvl="2"/>
+            <a:r>
+              <a:rPr lang="en-CA" sz="2000" b="1" dirty="0" smtClean="0"/>
+              <a:t>Rx Library of .NET Framework</a:t>
+            </a:r>
+            <a:r>
+              <a:rPr lang="en-CA" sz="2000" dirty="0" smtClean="0"/>
+              <a:t>.</a:t>
+            </a:r>
+          </a:p>
+          <a:p>
+            <a:endParaRPr lang="en-CA" sz="2800" dirty="0"/>
+          </a:p>
+        </p:txBody>
+      </p:sp>
+    </p:spTree>
+    <p:extLst>
+      <p:ext uri="{BB962C8B-B14F-4D97-AF65-F5344CB8AC3E}">
+        <p14:creationId xmlns:p14="http://schemas.microsoft.com/office/powerpoint/2010/main" val="4053276851"/>
+      </p:ext>
+    </p:extLst>
+  </p:cSld>
+  <p:clrMapOvr>
+    <a:masterClrMapping/>
+  </p:clrMapOvr>
+</p:sld>
+</file>
+
+<file path=ppt/slides/slide27.xml><?xml version="1.0" encoding="utf-8"?>
+<p:sld xmlns:a="http://schemas.openxmlformats.org/drawingml/2006/main" xmlns:r="http://schemas.openxmlformats.org/officeDocument/2006/relationships" xmlns:p="http://schemas.openxmlformats.org/presentationml/2006/main">
+  <p:cSld>
+    <p:spTree>
+      <p:nvGrpSpPr>
+        <p:cNvPr id="1" name=""/>
+        <p:cNvGrpSpPr/>
+        <p:nvPr/>
+      </p:nvGrpSpPr>
+      <p:grpSpPr>
+        <a:xfrm>
+          <a:off x="0" y="0"/>
+          <a:ext cx="0" cy="0"/>
+          <a:chOff x="0" y="0"/>
+          <a:chExt cx="0" cy="0"/>
+        </a:xfrm>
+      </p:grpSpPr>
+      <p:sp>
+        <p:nvSpPr>
+          <p:cNvPr id="2" name="TextBox 1"/>
+          <p:cNvSpPr txBox="1"/>
+          <p:nvPr/>
+        </p:nvSpPr>
+        <p:spPr>
+          <a:xfrm>
+            <a:off x="0" y="-3025"/>
+            <a:ext cx="11467070" cy="769441"/>
+          </a:xfrm>
+          <a:prstGeom prst="rect">
+            <a:avLst/>
+          </a:prstGeom>
+          <a:noFill/>
+        </p:spPr>
+        <p:txBody>
+          <a:bodyPr wrap="square" rtlCol="0">
+            <a:spAutoFit/>
+          </a:bodyPr>
+          <a:lstStyle/>
+          <a:p>
+            <a:r>
+              <a:rPr lang="en-CA" sz="4400" dirty="0" smtClean="0"/>
+              <a:t>Visitor Pattern</a:t>
+            </a:r>
+            <a:endParaRPr lang="en-CA" sz="4400" dirty="0"/>
+          </a:p>
+        </p:txBody>
+      </p:sp>
+      <p:sp>
+        <p:nvSpPr>
+          <p:cNvPr id="3" name="TextBox 2"/>
+          <p:cNvSpPr txBox="1"/>
+          <p:nvPr/>
+        </p:nvSpPr>
+        <p:spPr>
+          <a:xfrm>
+            <a:off x="502507" y="766416"/>
+            <a:ext cx="8748585" cy="5940088"/>
+          </a:xfrm>
+          <a:prstGeom prst="rect">
+            <a:avLst/>
+          </a:prstGeom>
+          <a:noFill/>
+        </p:spPr>
+        <p:txBody>
+          <a:bodyPr wrap="square" rtlCol="0">
+            <a:spAutoFit/>
+          </a:bodyPr>
+          <a:lstStyle/>
+          <a:p>
+            <a:pPr marL="285750" indent="-285750">
+              <a:buFont typeface="Arial" panose="020B0604020202020204" pitchFamily="34" charset="0"/>
+              <a:buChar char="•"/>
+            </a:pPr>
+            <a:r>
+              <a:rPr lang="en-CA" sz="2800" dirty="0" smtClean="0"/>
+              <a:t>Definition:</a:t>
+            </a:r>
+          </a:p>
+          <a:p>
+            <a:pPr lvl="1"/>
+            <a:r>
+              <a:rPr lang="en-US" sz="2000" dirty="0"/>
+              <a:t>Define a one-to-many dependency between objects so that when one object changes state, all its dependents are notified and updated automatically</a:t>
+            </a:r>
+            <a:r>
+              <a:rPr lang="en-US" sz="2000" dirty="0" smtClean="0"/>
+              <a:t>.</a:t>
+            </a:r>
+            <a:r>
+              <a:rPr lang="en-CA" sz="2000" dirty="0" smtClean="0"/>
+              <a:t> </a:t>
+            </a:r>
+            <a:endParaRPr lang="en-CA" sz="2000" dirty="0"/>
+          </a:p>
+          <a:p>
+            <a:endParaRPr lang="en-CA" sz="2800" dirty="0"/>
+          </a:p>
+          <a:p>
+            <a:pPr marL="285750" indent="-285750">
+              <a:buFont typeface="Arial" panose="020B0604020202020204" pitchFamily="34" charset="0"/>
+              <a:buChar char="•"/>
+            </a:pPr>
+            <a:r>
+              <a:rPr lang="en-CA" sz="2800" dirty="0" smtClean="0"/>
+              <a:t>Participants</a:t>
+            </a:r>
+          </a:p>
+          <a:p>
+            <a:pPr lvl="1"/>
+            <a:r>
+              <a:rPr lang="en-CA" sz="2000" b="1" dirty="0" smtClean="0"/>
+              <a:t>Subject: </a:t>
+            </a:r>
+          </a:p>
+          <a:p>
+            <a:pPr lvl="2"/>
+            <a:r>
+              <a:rPr lang="en-CA" sz="1600" dirty="0" smtClean="0"/>
+              <a:t>Defines the interface for attaching and detaching observers </a:t>
+            </a:r>
+          </a:p>
+          <a:p>
+            <a:pPr lvl="1"/>
+            <a:r>
+              <a:rPr lang="en-CA" sz="2000" b="1" dirty="0" smtClean="0"/>
+              <a:t>Concrete Subject: </a:t>
+            </a:r>
+            <a:endParaRPr lang="en-CA" sz="2000" b="1" dirty="0"/>
+          </a:p>
+          <a:p>
+            <a:pPr lvl="2"/>
+            <a:r>
+              <a:rPr lang="en-CA" sz="1600" dirty="0" smtClean="0"/>
+              <a:t>Implements the concreate subject logic.</a:t>
+            </a:r>
+            <a:endParaRPr lang="en-CA" sz="2000" dirty="0"/>
+          </a:p>
+          <a:p>
+            <a:pPr lvl="1"/>
+            <a:r>
+              <a:rPr lang="en-CA" sz="2000" b="1" dirty="0" smtClean="0"/>
+              <a:t>Observer: </a:t>
+            </a:r>
+            <a:endParaRPr lang="en-CA" sz="2000" b="1" dirty="0"/>
+          </a:p>
+          <a:p>
+            <a:pPr lvl="2"/>
+            <a:r>
+              <a:rPr lang="en-CA" sz="1600" dirty="0" smtClean="0"/>
+              <a:t>Defines the interface for sending the messages to all observers from the subject.</a:t>
+            </a:r>
+          </a:p>
+          <a:p>
+            <a:pPr lvl="1"/>
+            <a:r>
+              <a:rPr lang="en-CA" sz="2000" b="1" dirty="0" smtClean="0"/>
+              <a:t>Concrete Observer</a:t>
+            </a:r>
+            <a:r>
+              <a:rPr lang="en-CA" sz="2000" b="1" dirty="0"/>
+              <a:t>: </a:t>
+            </a:r>
+          </a:p>
+          <a:p>
+            <a:pPr lvl="2"/>
+            <a:r>
+              <a:rPr lang="en-CA" sz="1600" dirty="0" smtClean="0"/>
+              <a:t>Implements the concrete observer where it receives messages.</a:t>
+            </a:r>
+            <a:endParaRPr lang="en-CA" sz="1600" dirty="0"/>
+          </a:p>
+          <a:p>
+            <a:pPr lvl="1"/>
+            <a:endParaRPr lang="en-CA" sz="1600" dirty="0"/>
+          </a:p>
+          <a:p>
+            <a:pPr lvl="1"/>
+            <a:endParaRPr lang="en-CA" sz="2000" dirty="0"/>
+          </a:p>
+          <a:p>
+            <a:pPr marL="457200" indent="-457200">
+              <a:buFont typeface="Arial" panose="020B0604020202020204" pitchFamily="34" charset="0"/>
+              <a:buChar char="•"/>
+            </a:pPr>
+            <a:r>
+              <a:rPr lang="en-CA" sz="2800" dirty="0" smtClean="0"/>
+              <a:t>Real World Example </a:t>
+            </a:r>
+          </a:p>
+          <a:p>
+            <a:pPr lvl="2"/>
+            <a:r>
+              <a:rPr lang="en-CA" sz="2000" b="1" dirty="0" smtClean="0"/>
+              <a:t>Rx Library of .NET Framework</a:t>
+            </a:r>
+            <a:r>
+              <a:rPr lang="en-CA" sz="2000" dirty="0" smtClean="0"/>
+              <a:t>.</a:t>
+            </a:r>
+          </a:p>
+          <a:p>
+            <a:endParaRPr lang="en-CA" sz="2800" dirty="0"/>
+          </a:p>
+        </p:txBody>
+      </p:sp>
+    </p:spTree>
+    <p:extLst>
+      <p:ext uri="{BB962C8B-B14F-4D97-AF65-F5344CB8AC3E}">
+        <p14:creationId xmlns:p14="http://schemas.microsoft.com/office/powerpoint/2010/main" val="1519676815"/>
+      </p:ext>
+    </p:extLst>
+  </p:cSld>
+  <p:clrMapOvr>
+    <a:masterClrMapping/>
+  </p:clrMapOvr>
+</p:sld>
+</file>
+
+<file path=ppt/slides/slide28.xml><?xml version="1.0" encoding="utf-8"?>
+<p:sld xmlns:a="http://schemas.openxmlformats.org/drawingml/2006/main" xmlns:r="http://schemas.openxmlformats.org/officeDocument/2006/relationships" xmlns:p="http://schemas.openxmlformats.org/presentationml/2006/main">
+  <p:cSld>
+    <p:spTree>
+      <p:nvGrpSpPr>
+        <p:cNvPr id="1" name=""/>
+        <p:cNvGrpSpPr/>
+        <p:nvPr/>
+      </p:nvGrpSpPr>
+      <p:grpSpPr>
+        <a:xfrm>
+          <a:off x="0" y="0"/>
+          <a:ext cx="0" cy="0"/>
+          <a:chOff x="0" y="0"/>
+          <a:chExt cx="0" cy="0"/>
+        </a:xfrm>
+      </p:grpSpPr>
+      <p:sp>
+        <p:nvSpPr>
+          <p:cNvPr id="2" name="TextBox 1"/>
+          <p:cNvSpPr txBox="1"/>
+          <p:nvPr/>
+        </p:nvSpPr>
+        <p:spPr>
+          <a:xfrm>
+            <a:off x="0" y="-3025"/>
+            <a:ext cx="11467070" cy="769441"/>
+          </a:xfrm>
+          <a:prstGeom prst="rect">
+            <a:avLst/>
+          </a:prstGeom>
+          <a:noFill/>
+        </p:spPr>
+        <p:txBody>
+          <a:bodyPr wrap="square" rtlCol="0">
+            <a:spAutoFit/>
+          </a:bodyPr>
+          <a:lstStyle/>
+          <a:p>
+            <a:r>
+              <a:rPr lang="en-CA" sz="4400" dirty="0" smtClean="0"/>
+              <a:t>Composite Pattern</a:t>
+            </a:r>
+            <a:endParaRPr lang="en-CA" sz="4400" dirty="0"/>
+          </a:p>
+        </p:txBody>
+      </p:sp>
+      <p:sp>
+        <p:nvSpPr>
+          <p:cNvPr id="3" name="TextBox 2"/>
+          <p:cNvSpPr txBox="1"/>
+          <p:nvPr/>
+        </p:nvSpPr>
+        <p:spPr>
+          <a:xfrm>
+            <a:off x="502507" y="766416"/>
+            <a:ext cx="8748585" cy="5940088"/>
+          </a:xfrm>
+          <a:prstGeom prst="rect">
+            <a:avLst/>
+          </a:prstGeom>
+          <a:noFill/>
+        </p:spPr>
+        <p:txBody>
+          <a:bodyPr wrap="square" rtlCol="0">
+            <a:spAutoFit/>
+          </a:bodyPr>
+          <a:lstStyle/>
+          <a:p>
+            <a:pPr marL="285750" indent="-285750">
+              <a:buFont typeface="Arial" panose="020B0604020202020204" pitchFamily="34" charset="0"/>
+              <a:buChar char="•"/>
+            </a:pPr>
+            <a:r>
+              <a:rPr lang="en-CA" sz="2800" dirty="0" smtClean="0"/>
+              <a:t>Definition:</a:t>
+            </a:r>
+          </a:p>
+          <a:p>
+            <a:pPr lvl="1"/>
+            <a:r>
+              <a:rPr lang="en-US" sz="2000" dirty="0"/>
+              <a:t>Define a one-to-many dependency between objects so that when one object changes state, all its dependents are notified and updated automatically</a:t>
+            </a:r>
+            <a:r>
+              <a:rPr lang="en-US" sz="2000" dirty="0" smtClean="0"/>
+              <a:t>.</a:t>
+            </a:r>
+            <a:r>
+              <a:rPr lang="en-CA" sz="2000" dirty="0" smtClean="0"/>
+              <a:t> </a:t>
+            </a:r>
+            <a:endParaRPr lang="en-CA" sz="2000" dirty="0"/>
+          </a:p>
+          <a:p>
+            <a:endParaRPr lang="en-CA" sz="2800" dirty="0"/>
+          </a:p>
+          <a:p>
+            <a:pPr marL="285750" indent="-285750">
+              <a:buFont typeface="Arial" panose="020B0604020202020204" pitchFamily="34" charset="0"/>
+              <a:buChar char="•"/>
+            </a:pPr>
+            <a:r>
+              <a:rPr lang="en-CA" sz="2800" dirty="0" smtClean="0"/>
+              <a:t>Participants</a:t>
+            </a:r>
+          </a:p>
+          <a:p>
+            <a:pPr lvl="1"/>
+            <a:r>
+              <a:rPr lang="en-CA" sz="2000" b="1" dirty="0" smtClean="0"/>
+              <a:t>Subject: </a:t>
+            </a:r>
+          </a:p>
+          <a:p>
+            <a:pPr lvl="2"/>
+            <a:r>
+              <a:rPr lang="en-CA" sz="1600" dirty="0" smtClean="0"/>
+              <a:t>Defines the interface for attaching and detaching observers </a:t>
+            </a:r>
+          </a:p>
+          <a:p>
+            <a:pPr lvl="1"/>
+            <a:r>
+              <a:rPr lang="en-CA" sz="2000" b="1" dirty="0" smtClean="0"/>
+              <a:t>Concrete Subject: </a:t>
+            </a:r>
+            <a:endParaRPr lang="en-CA" sz="2000" b="1" dirty="0"/>
+          </a:p>
+          <a:p>
+            <a:pPr lvl="2"/>
+            <a:r>
+              <a:rPr lang="en-CA" sz="1600" dirty="0" smtClean="0"/>
+              <a:t>Implements the concreate subject logic.</a:t>
+            </a:r>
+            <a:endParaRPr lang="en-CA" sz="2000" dirty="0"/>
+          </a:p>
+          <a:p>
+            <a:pPr lvl="1"/>
+            <a:r>
+              <a:rPr lang="en-CA" sz="2000" b="1" dirty="0" smtClean="0"/>
+              <a:t>Observer: </a:t>
+            </a:r>
+            <a:endParaRPr lang="en-CA" sz="2000" b="1" dirty="0"/>
+          </a:p>
+          <a:p>
+            <a:pPr lvl="2"/>
+            <a:r>
+              <a:rPr lang="en-CA" sz="1600" dirty="0" smtClean="0"/>
+              <a:t>Defines the interface for sending the messages to all observers from the subject.</a:t>
+            </a:r>
+          </a:p>
+          <a:p>
+            <a:pPr lvl="1"/>
+            <a:r>
+              <a:rPr lang="en-CA" sz="2000" b="1" dirty="0" smtClean="0"/>
+              <a:t>Concrete Observer</a:t>
+            </a:r>
+            <a:r>
+              <a:rPr lang="en-CA" sz="2000" b="1" dirty="0"/>
+              <a:t>: </a:t>
+            </a:r>
+          </a:p>
+          <a:p>
+            <a:pPr lvl="2"/>
+            <a:r>
+              <a:rPr lang="en-CA" sz="1600" dirty="0" smtClean="0"/>
+              <a:t>Implements the concrete observer where it receives messages.</a:t>
+            </a:r>
+            <a:endParaRPr lang="en-CA" sz="1600" dirty="0"/>
+          </a:p>
+          <a:p>
+            <a:pPr lvl="1"/>
+            <a:endParaRPr lang="en-CA" sz="1600" dirty="0"/>
+          </a:p>
+          <a:p>
+            <a:pPr lvl="1"/>
+            <a:endParaRPr lang="en-CA" sz="2000" dirty="0"/>
+          </a:p>
+          <a:p>
+            <a:pPr marL="457200" indent="-457200">
+              <a:buFont typeface="Arial" panose="020B0604020202020204" pitchFamily="34" charset="0"/>
+              <a:buChar char="•"/>
+            </a:pPr>
+            <a:r>
+              <a:rPr lang="en-CA" sz="2800" dirty="0" smtClean="0"/>
+              <a:t>Real World Example </a:t>
+            </a:r>
+          </a:p>
+          <a:p>
+            <a:pPr lvl="2"/>
+            <a:r>
+              <a:rPr lang="en-CA" sz="2000" b="1" dirty="0" smtClean="0"/>
+              <a:t>Rx Library of .NET Framework</a:t>
+            </a:r>
+            <a:r>
+              <a:rPr lang="en-CA" sz="2000" dirty="0" smtClean="0"/>
+              <a:t>.</a:t>
+            </a:r>
+          </a:p>
+          <a:p>
+            <a:endParaRPr lang="en-CA" sz="2800" dirty="0"/>
+          </a:p>
+        </p:txBody>
+      </p:sp>
+    </p:spTree>
+    <p:extLst>
+      <p:ext uri="{BB962C8B-B14F-4D97-AF65-F5344CB8AC3E}">
+        <p14:creationId xmlns:p14="http://schemas.microsoft.com/office/powerpoint/2010/main" val="3090240187"/>
+      </p:ext>
+    </p:extLst>
+  </p:cSld>
+  <p:clrMapOvr>
+    <a:masterClrMapping/>
+  </p:clrMapOvr>
+</p:sld>
+</file>
+
+<file path=ppt/slides/slide29.xml><?xml version="1.0" encoding="utf-8"?>
+<p:sld xmlns:a="http://schemas.openxmlformats.org/drawingml/2006/main" xmlns:r="http://schemas.openxmlformats.org/officeDocument/2006/relationships" xmlns:p="http://schemas.openxmlformats.org/presentationml/2006/main">
+  <p:cSld>
+    <p:spTree>
+      <p:nvGrpSpPr>
+        <p:cNvPr id="1" name=""/>
+        <p:cNvGrpSpPr/>
+        <p:nvPr/>
+      </p:nvGrpSpPr>
+      <p:grpSpPr>
+        <a:xfrm>
+          <a:off x="0" y="0"/>
+          <a:ext cx="0" cy="0"/>
+          <a:chOff x="0" y="0"/>
+          <a:chExt cx="0" cy="0"/>
+        </a:xfrm>
+      </p:grpSpPr>
+      <p:sp>
+        <p:nvSpPr>
+          <p:cNvPr id="2" name="TextBox 1"/>
+          <p:cNvSpPr txBox="1"/>
+          <p:nvPr/>
+        </p:nvSpPr>
+        <p:spPr>
+          <a:xfrm>
+            <a:off x="0" y="-3025"/>
+            <a:ext cx="11467070" cy="769441"/>
+          </a:xfrm>
+          <a:prstGeom prst="rect">
+            <a:avLst/>
+          </a:prstGeom>
+          <a:noFill/>
+        </p:spPr>
+        <p:txBody>
+          <a:bodyPr wrap="square" rtlCol="0">
+            <a:spAutoFit/>
+          </a:bodyPr>
+          <a:lstStyle/>
+          <a:p>
+            <a:r>
+              <a:rPr lang="en-CA" sz="4400" dirty="0" smtClean="0"/>
+              <a:t>Flyweight Pattern</a:t>
+            </a:r>
+            <a:endParaRPr lang="en-CA" sz="4400" dirty="0"/>
+          </a:p>
+        </p:txBody>
+      </p:sp>
+      <p:sp>
+        <p:nvSpPr>
+          <p:cNvPr id="3" name="TextBox 2"/>
+          <p:cNvSpPr txBox="1"/>
+          <p:nvPr/>
+        </p:nvSpPr>
+        <p:spPr>
+          <a:xfrm>
+            <a:off x="502507" y="766416"/>
+            <a:ext cx="8748585" cy="5940088"/>
+          </a:xfrm>
+          <a:prstGeom prst="rect">
+            <a:avLst/>
+          </a:prstGeom>
+          <a:noFill/>
+        </p:spPr>
+        <p:txBody>
+          <a:bodyPr wrap="square" rtlCol="0">
+            <a:spAutoFit/>
+          </a:bodyPr>
+          <a:lstStyle/>
+          <a:p>
+            <a:pPr marL="285750" indent="-285750">
+              <a:buFont typeface="Arial" panose="020B0604020202020204" pitchFamily="34" charset="0"/>
+              <a:buChar char="•"/>
+            </a:pPr>
+            <a:r>
+              <a:rPr lang="en-CA" sz="2800" dirty="0" smtClean="0"/>
+              <a:t>Definition:</a:t>
+            </a:r>
+          </a:p>
+          <a:p>
+            <a:pPr lvl="1"/>
+            <a:r>
+              <a:rPr lang="en-US" sz="2000" dirty="0"/>
+              <a:t>Define a one-to-many dependency between objects so that when one object changes state, all its dependents are notified and updated automatically</a:t>
+            </a:r>
+            <a:r>
+              <a:rPr lang="en-US" sz="2000" dirty="0" smtClean="0"/>
+              <a:t>.</a:t>
+            </a:r>
+            <a:r>
+              <a:rPr lang="en-CA" sz="2000" dirty="0" smtClean="0"/>
+              <a:t> </a:t>
+            </a:r>
+            <a:endParaRPr lang="en-CA" sz="2000" dirty="0"/>
+          </a:p>
+          <a:p>
+            <a:endParaRPr lang="en-CA" sz="2800" dirty="0"/>
+          </a:p>
+          <a:p>
+            <a:pPr marL="285750" indent="-285750">
+              <a:buFont typeface="Arial" panose="020B0604020202020204" pitchFamily="34" charset="0"/>
+              <a:buChar char="•"/>
+            </a:pPr>
+            <a:r>
+              <a:rPr lang="en-CA" sz="2800" dirty="0" smtClean="0"/>
+              <a:t>Participants</a:t>
+            </a:r>
+          </a:p>
+          <a:p>
+            <a:pPr lvl="1"/>
+            <a:r>
+              <a:rPr lang="en-CA" sz="2000" b="1" dirty="0" smtClean="0"/>
+              <a:t>Subject: </a:t>
+            </a:r>
+          </a:p>
+          <a:p>
+            <a:pPr lvl="2"/>
+            <a:r>
+              <a:rPr lang="en-CA" sz="1600" dirty="0" smtClean="0"/>
+              <a:t>Defines the interface for attaching and detaching observers </a:t>
+            </a:r>
+          </a:p>
+          <a:p>
+            <a:pPr lvl="1"/>
+            <a:r>
+              <a:rPr lang="en-CA" sz="2000" b="1" dirty="0" smtClean="0"/>
+              <a:t>Concrete Subject: </a:t>
+            </a:r>
+            <a:endParaRPr lang="en-CA" sz="2000" b="1" dirty="0"/>
+          </a:p>
+          <a:p>
+            <a:pPr lvl="2"/>
+            <a:r>
+              <a:rPr lang="en-CA" sz="1600" dirty="0" smtClean="0"/>
+              <a:t>Implements the concreate subject logic.</a:t>
+            </a:r>
+            <a:endParaRPr lang="en-CA" sz="2000" dirty="0"/>
+          </a:p>
+          <a:p>
+            <a:pPr lvl="1"/>
+            <a:r>
+              <a:rPr lang="en-CA" sz="2000" b="1" dirty="0" smtClean="0"/>
+              <a:t>Observer: </a:t>
+            </a:r>
+            <a:endParaRPr lang="en-CA" sz="2000" b="1" dirty="0"/>
+          </a:p>
+          <a:p>
+            <a:pPr lvl="2"/>
+            <a:r>
+              <a:rPr lang="en-CA" sz="1600" dirty="0" smtClean="0"/>
+              <a:t>Defines the interface for sending the messages to all observers from the subject.</a:t>
+            </a:r>
+          </a:p>
+          <a:p>
+            <a:pPr lvl="1"/>
+            <a:r>
+              <a:rPr lang="en-CA" sz="2000" b="1" dirty="0" smtClean="0"/>
+              <a:t>Concrete Observer</a:t>
+            </a:r>
+            <a:r>
+              <a:rPr lang="en-CA" sz="2000" b="1" dirty="0"/>
+              <a:t>: </a:t>
+            </a:r>
+          </a:p>
+          <a:p>
+            <a:pPr lvl="2"/>
+            <a:r>
+              <a:rPr lang="en-CA" sz="1600" dirty="0" smtClean="0"/>
+              <a:t>Implements the concrete observer where it receives messages.</a:t>
+            </a:r>
+            <a:endParaRPr lang="en-CA" sz="1600" dirty="0"/>
+          </a:p>
+          <a:p>
+            <a:pPr lvl="1"/>
+            <a:endParaRPr lang="en-CA" sz="1600" dirty="0"/>
+          </a:p>
+          <a:p>
+            <a:pPr lvl="1"/>
+            <a:endParaRPr lang="en-CA" sz="2000" dirty="0"/>
+          </a:p>
+          <a:p>
+            <a:pPr marL="457200" indent="-457200">
+              <a:buFont typeface="Arial" panose="020B0604020202020204" pitchFamily="34" charset="0"/>
+              <a:buChar char="•"/>
+            </a:pPr>
+            <a:r>
+              <a:rPr lang="en-CA" sz="2800" dirty="0" smtClean="0"/>
+              <a:t>Real World Example </a:t>
+            </a:r>
+          </a:p>
+          <a:p>
+            <a:pPr lvl="2"/>
+            <a:r>
+              <a:rPr lang="en-CA" sz="2000" b="1" dirty="0" smtClean="0"/>
+              <a:t>Rx Library of .NET Framework</a:t>
+            </a:r>
+            <a:r>
+              <a:rPr lang="en-CA" sz="2000" dirty="0" smtClean="0"/>
+              <a:t>.</a:t>
+            </a:r>
+          </a:p>
+          <a:p>
+            <a:endParaRPr lang="en-CA" sz="2800" dirty="0"/>
+          </a:p>
+        </p:txBody>
+      </p:sp>
+    </p:spTree>
+    <p:extLst>
+      <p:ext uri="{BB962C8B-B14F-4D97-AF65-F5344CB8AC3E}">
+        <p14:creationId xmlns:p14="http://schemas.microsoft.com/office/powerpoint/2010/main" val="4094446664"/>
       </p:ext>
     </p:extLst>
   </p:cSld>
@@ -4522,11 +7752,7 @@
             </a:pPr>
             <a:r>
               <a:rPr lang="en-CA" sz="2800" dirty="0" smtClean="0"/>
-              <a:t>Why do we care about </a:t>
-            </a:r>
-            <a:r>
-              <a:rPr lang="en-CA" sz="2800" dirty="0" smtClean="0"/>
-              <a:t>Design Patterns</a:t>
+              <a:t>Why do we care about Design Patterns</a:t>
             </a:r>
           </a:p>
           <a:p>
@@ -4536,13 +7762,8 @@
             </a:pPr>
             <a:r>
               <a:rPr lang="en-CA" sz="2800" dirty="0" smtClean="0"/>
-              <a:t>Design Patterns Categories</a:t>
-            </a:r>
-            <a:r>
-              <a:rPr lang="en-CA" sz="2800" dirty="0" smtClean="0"/>
-              <a:t> </a:t>
-            </a:r>
-            <a:endParaRPr lang="en-CA" sz="2800" dirty="0" smtClean="0"/>
+              <a:t>Design Patterns Categories </a:t>
+            </a:r>
           </a:p>
           <a:p>
             <a:pPr marL="285750" indent="-285750">
@@ -4551,13 +7772,8 @@
             </a:pPr>
             <a:r>
               <a:rPr lang="en-CA" sz="2800" dirty="0" smtClean="0"/>
-              <a:t>When to apply Design </a:t>
-            </a:r>
-            <a:r>
-              <a:rPr lang="en-CA" sz="2800" dirty="0" smtClean="0"/>
-              <a:t>Patterns</a:t>
-            </a:r>
-            <a:endParaRPr lang="en-CA" sz="2800" dirty="0" smtClean="0"/>
+              <a:t>When to apply Design Patterns</a:t>
+            </a:r>
           </a:p>
           <a:p>
             <a:pPr marL="285750" indent="-285750">
@@ -4568,7 +7784,6 @@
               <a:rPr lang="en-CA" sz="2800" dirty="0" smtClean="0"/>
               <a:t>Developer life with Patterns</a:t>
             </a:r>
-            <a:endParaRPr lang="en-CA" sz="2800" dirty="0" smtClean="0"/>
           </a:p>
         </p:txBody>
       </p:sp>
@@ -4576,6 +7791,442 @@
     <p:extLst>
       <p:ext uri="{BB962C8B-B14F-4D97-AF65-F5344CB8AC3E}">
         <p14:creationId xmlns:p14="http://schemas.microsoft.com/office/powerpoint/2010/main" val="344064583"/>
+      </p:ext>
+    </p:extLst>
+  </p:cSld>
+  <p:clrMapOvr>
+    <a:masterClrMapping/>
+  </p:clrMapOvr>
+</p:sld>
+</file>
+
+<file path=ppt/slides/slide30.xml><?xml version="1.0" encoding="utf-8"?>
+<p:sld xmlns:a="http://schemas.openxmlformats.org/drawingml/2006/main" xmlns:r="http://schemas.openxmlformats.org/officeDocument/2006/relationships" xmlns:p="http://schemas.openxmlformats.org/presentationml/2006/main">
+  <p:cSld>
+    <p:spTree>
+      <p:nvGrpSpPr>
+        <p:cNvPr id="1" name=""/>
+        <p:cNvGrpSpPr/>
+        <p:nvPr/>
+      </p:nvGrpSpPr>
+      <p:grpSpPr>
+        <a:xfrm>
+          <a:off x="0" y="0"/>
+          <a:ext cx="0" cy="0"/>
+          <a:chOff x="0" y="0"/>
+          <a:chExt cx="0" cy="0"/>
+        </a:xfrm>
+      </p:grpSpPr>
+      <p:sp>
+        <p:nvSpPr>
+          <p:cNvPr id="2" name="TextBox 1"/>
+          <p:cNvSpPr txBox="1"/>
+          <p:nvPr/>
+        </p:nvSpPr>
+        <p:spPr>
+          <a:xfrm>
+            <a:off x="0" y="-3025"/>
+            <a:ext cx="11467070" cy="769441"/>
+          </a:xfrm>
+          <a:prstGeom prst="rect">
+            <a:avLst/>
+          </a:prstGeom>
+          <a:noFill/>
+        </p:spPr>
+        <p:txBody>
+          <a:bodyPr wrap="square" rtlCol="0">
+            <a:spAutoFit/>
+          </a:bodyPr>
+          <a:lstStyle/>
+          <a:p>
+            <a:r>
+              <a:rPr lang="en-CA" sz="4400" dirty="0" smtClean="0"/>
+              <a:t>Bridge Pattern</a:t>
+            </a:r>
+            <a:endParaRPr lang="en-CA" sz="4400" dirty="0"/>
+          </a:p>
+        </p:txBody>
+      </p:sp>
+      <p:sp>
+        <p:nvSpPr>
+          <p:cNvPr id="3" name="TextBox 2"/>
+          <p:cNvSpPr txBox="1"/>
+          <p:nvPr/>
+        </p:nvSpPr>
+        <p:spPr>
+          <a:xfrm>
+            <a:off x="502507" y="766416"/>
+            <a:ext cx="8748585" cy="5940088"/>
+          </a:xfrm>
+          <a:prstGeom prst="rect">
+            <a:avLst/>
+          </a:prstGeom>
+          <a:noFill/>
+        </p:spPr>
+        <p:txBody>
+          <a:bodyPr wrap="square" rtlCol="0">
+            <a:spAutoFit/>
+          </a:bodyPr>
+          <a:lstStyle/>
+          <a:p>
+            <a:pPr marL="285750" indent="-285750">
+              <a:buFont typeface="Arial" panose="020B0604020202020204" pitchFamily="34" charset="0"/>
+              <a:buChar char="•"/>
+            </a:pPr>
+            <a:r>
+              <a:rPr lang="en-CA" sz="2800" dirty="0" smtClean="0"/>
+              <a:t>Definition:</a:t>
+            </a:r>
+          </a:p>
+          <a:p>
+            <a:pPr lvl="1"/>
+            <a:r>
+              <a:rPr lang="en-US" sz="2000" dirty="0"/>
+              <a:t>Define a one-to-many dependency between objects so that when one object changes state, all its dependents are notified and updated automatically</a:t>
+            </a:r>
+            <a:r>
+              <a:rPr lang="en-US" sz="2000" dirty="0" smtClean="0"/>
+              <a:t>.</a:t>
+            </a:r>
+            <a:r>
+              <a:rPr lang="en-CA" sz="2000" dirty="0" smtClean="0"/>
+              <a:t> </a:t>
+            </a:r>
+            <a:endParaRPr lang="en-CA" sz="2000" dirty="0"/>
+          </a:p>
+          <a:p>
+            <a:endParaRPr lang="en-CA" sz="2800" dirty="0"/>
+          </a:p>
+          <a:p>
+            <a:pPr marL="285750" indent="-285750">
+              <a:buFont typeface="Arial" panose="020B0604020202020204" pitchFamily="34" charset="0"/>
+              <a:buChar char="•"/>
+            </a:pPr>
+            <a:r>
+              <a:rPr lang="en-CA" sz="2800" dirty="0" smtClean="0"/>
+              <a:t>Participants</a:t>
+            </a:r>
+          </a:p>
+          <a:p>
+            <a:pPr lvl="1"/>
+            <a:r>
+              <a:rPr lang="en-CA" sz="2000" b="1" dirty="0" smtClean="0"/>
+              <a:t>Subject: </a:t>
+            </a:r>
+          </a:p>
+          <a:p>
+            <a:pPr lvl="2"/>
+            <a:r>
+              <a:rPr lang="en-CA" sz="1600" dirty="0" smtClean="0"/>
+              <a:t>Defines the interface for attaching and detaching observers </a:t>
+            </a:r>
+          </a:p>
+          <a:p>
+            <a:pPr lvl="1"/>
+            <a:r>
+              <a:rPr lang="en-CA" sz="2000" b="1" dirty="0" smtClean="0"/>
+              <a:t>Concrete Subject: </a:t>
+            </a:r>
+            <a:endParaRPr lang="en-CA" sz="2000" b="1" dirty="0"/>
+          </a:p>
+          <a:p>
+            <a:pPr lvl="2"/>
+            <a:r>
+              <a:rPr lang="en-CA" sz="1600" dirty="0" smtClean="0"/>
+              <a:t>Implements the concreate subject logic.</a:t>
+            </a:r>
+            <a:endParaRPr lang="en-CA" sz="2000" dirty="0"/>
+          </a:p>
+          <a:p>
+            <a:pPr lvl="1"/>
+            <a:r>
+              <a:rPr lang="en-CA" sz="2000" b="1" dirty="0" smtClean="0"/>
+              <a:t>Observer: </a:t>
+            </a:r>
+            <a:endParaRPr lang="en-CA" sz="2000" b="1" dirty="0"/>
+          </a:p>
+          <a:p>
+            <a:pPr lvl="2"/>
+            <a:r>
+              <a:rPr lang="en-CA" sz="1600" dirty="0" smtClean="0"/>
+              <a:t>Defines the interface for sending the messages to all observers from the subject.</a:t>
+            </a:r>
+          </a:p>
+          <a:p>
+            <a:pPr lvl="1"/>
+            <a:r>
+              <a:rPr lang="en-CA" sz="2000" b="1" dirty="0" smtClean="0"/>
+              <a:t>Concrete Observer</a:t>
+            </a:r>
+            <a:r>
+              <a:rPr lang="en-CA" sz="2000" b="1" dirty="0"/>
+              <a:t>: </a:t>
+            </a:r>
+          </a:p>
+          <a:p>
+            <a:pPr lvl="2"/>
+            <a:r>
+              <a:rPr lang="en-CA" sz="1600" dirty="0" smtClean="0"/>
+              <a:t>Implements the concrete observer where it receives messages.</a:t>
+            </a:r>
+            <a:endParaRPr lang="en-CA" sz="1600" dirty="0"/>
+          </a:p>
+          <a:p>
+            <a:pPr lvl="1"/>
+            <a:endParaRPr lang="en-CA" sz="1600" dirty="0"/>
+          </a:p>
+          <a:p>
+            <a:pPr lvl="1"/>
+            <a:endParaRPr lang="en-CA" sz="2000" dirty="0"/>
+          </a:p>
+          <a:p>
+            <a:pPr marL="457200" indent="-457200">
+              <a:buFont typeface="Arial" panose="020B0604020202020204" pitchFamily="34" charset="0"/>
+              <a:buChar char="•"/>
+            </a:pPr>
+            <a:r>
+              <a:rPr lang="en-CA" sz="2800" dirty="0" smtClean="0"/>
+              <a:t>Real World Example </a:t>
+            </a:r>
+          </a:p>
+          <a:p>
+            <a:pPr lvl="2"/>
+            <a:r>
+              <a:rPr lang="en-CA" sz="2000" b="1" dirty="0" smtClean="0"/>
+              <a:t>Rx Library of .NET Framework</a:t>
+            </a:r>
+            <a:r>
+              <a:rPr lang="en-CA" sz="2000" dirty="0" smtClean="0"/>
+              <a:t>.</a:t>
+            </a:r>
+          </a:p>
+          <a:p>
+            <a:endParaRPr lang="en-CA" sz="2800" dirty="0"/>
+          </a:p>
+        </p:txBody>
+      </p:sp>
+    </p:spTree>
+    <p:extLst>
+      <p:ext uri="{BB962C8B-B14F-4D97-AF65-F5344CB8AC3E}">
+        <p14:creationId xmlns:p14="http://schemas.microsoft.com/office/powerpoint/2010/main" val="2035668669"/>
+      </p:ext>
+    </p:extLst>
+  </p:cSld>
+  <p:clrMapOvr>
+    <a:masterClrMapping/>
+  </p:clrMapOvr>
+</p:sld>
+</file>
+
+<file path=ppt/slides/slide31.xml><?xml version="1.0" encoding="utf-8"?>
+<p:sld xmlns:a="http://schemas.openxmlformats.org/drawingml/2006/main" xmlns:r="http://schemas.openxmlformats.org/officeDocument/2006/relationships" xmlns:p="http://schemas.openxmlformats.org/presentationml/2006/main">
+  <p:cSld>
+    <p:spTree>
+      <p:nvGrpSpPr>
+        <p:cNvPr id="1" name=""/>
+        <p:cNvGrpSpPr/>
+        <p:nvPr/>
+      </p:nvGrpSpPr>
+      <p:grpSpPr>
+        <a:xfrm>
+          <a:off x="0" y="0"/>
+          <a:ext cx="0" cy="0"/>
+          <a:chOff x="0" y="0"/>
+          <a:chExt cx="0" cy="0"/>
+        </a:xfrm>
+      </p:grpSpPr>
+      <p:sp>
+        <p:nvSpPr>
+          <p:cNvPr id="2" name="TextBox 1"/>
+          <p:cNvSpPr txBox="1"/>
+          <p:nvPr/>
+        </p:nvSpPr>
+        <p:spPr>
+          <a:xfrm>
+            <a:off x="0" y="-3025"/>
+            <a:ext cx="11467070" cy="769441"/>
+          </a:xfrm>
+          <a:prstGeom prst="rect">
+            <a:avLst/>
+          </a:prstGeom>
+          <a:noFill/>
+        </p:spPr>
+        <p:txBody>
+          <a:bodyPr wrap="square" rtlCol="0">
+            <a:spAutoFit/>
+          </a:bodyPr>
+          <a:lstStyle/>
+          <a:p>
+            <a:r>
+              <a:rPr lang="en-CA" sz="4400" dirty="0" smtClean="0"/>
+              <a:t>Prototype Pattern</a:t>
+            </a:r>
+            <a:endParaRPr lang="en-CA" sz="4400" dirty="0"/>
+          </a:p>
+        </p:txBody>
+      </p:sp>
+      <p:sp>
+        <p:nvSpPr>
+          <p:cNvPr id="3" name="TextBox 2"/>
+          <p:cNvSpPr txBox="1"/>
+          <p:nvPr/>
+        </p:nvSpPr>
+        <p:spPr>
+          <a:xfrm>
+            <a:off x="502507" y="766416"/>
+            <a:ext cx="8748585" cy="5940088"/>
+          </a:xfrm>
+          <a:prstGeom prst="rect">
+            <a:avLst/>
+          </a:prstGeom>
+          <a:noFill/>
+        </p:spPr>
+        <p:txBody>
+          <a:bodyPr wrap="square" rtlCol="0">
+            <a:spAutoFit/>
+          </a:bodyPr>
+          <a:lstStyle/>
+          <a:p>
+            <a:pPr marL="285750" indent="-285750">
+              <a:buFont typeface="Arial" panose="020B0604020202020204" pitchFamily="34" charset="0"/>
+              <a:buChar char="•"/>
+            </a:pPr>
+            <a:r>
+              <a:rPr lang="en-CA" sz="2800" dirty="0" smtClean="0"/>
+              <a:t>Definition:</a:t>
+            </a:r>
+          </a:p>
+          <a:p>
+            <a:pPr lvl="1"/>
+            <a:r>
+              <a:rPr lang="en-US" sz="2000" dirty="0"/>
+              <a:t>Define a one-to-many dependency between objects so that when one object changes state, all its dependents are notified and updated automatically</a:t>
+            </a:r>
+            <a:r>
+              <a:rPr lang="en-US" sz="2000" dirty="0" smtClean="0"/>
+              <a:t>.</a:t>
+            </a:r>
+            <a:r>
+              <a:rPr lang="en-CA" sz="2000" dirty="0" smtClean="0"/>
+              <a:t> </a:t>
+            </a:r>
+            <a:endParaRPr lang="en-CA" sz="2000" dirty="0"/>
+          </a:p>
+          <a:p>
+            <a:endParaRPr lang="en-CA" sz="2800" dirty="0"/>
+          </a:p>
+          <a:p>
+            <a:pPr marL="285750" indent="-285750">
+              <a:buFont typeface="Arial" panose="020B0604020202020204" pitchFamily="34" charset="0"/>
+              <a:buChar char="•"/>
+            </a:pPr>
+            <a:r>
+              <a:rPr lang="en-CA" sz="2800" dirty="0" smtClean="0"/>
+              <a:t>Participants</a:t>
+            </a:r>
+          </a:p>
+          <a:p>
+            <a:pPr lvl="1"/>
+            <a:r>
+              <a:rPr lang="en-CA" sz="2000" b="1" dirty="0" smtClean="0"/>
+              <a:t>Subject: </a:t>
+            </a:r>
+          </a:p>
+          <a:p>
+            <a:pPr lvl="2"/>
+            <a:r>
+              <a:rPr lang="en-CA" sz="1600" dirty="0" smtClean="0"/>
+              <a:t>Defines the interface for attaching and detaching observers </a:t>
+            </a:r>
+          </a:p>
+          <a:p>
+            <a:pPr lvl="1"/>
+            <a:r>
+              <a:rPr lang="en-CA" sz="2000" b="1" dirty="0" smtClean="0"/>
+              <a:t>Concrete Subject: </a:t>
+            </a:r>
+            <a:endParaRPr lang="en-CA" sz="2000" b="1" dirty="0"/>
+          </a:p>
+          <a:p>
+            <a:pPr lvl="2"/>
+            <a:r>
+              <a:rPr lang="en-CA" sz="1600" dirty="0" smtClean="0"/>
+              <a:t>Implements the concreate subject logic.</a:t>
+            </a:r>
+            <a:endParaRPr lang="en-CA" sz="2000" dirty="0"/>
+          </a:p>
+          <a:p>
+            <a:pPr lvl="1"/>
+            <a:r>
+              <a:rPr lang="en-CA" sz="2000" b="1" dirty="0" smtClean="0"/>
+              <a:t>Observer: </a:t>
+            </a:r>
+            <a:endParaRPr lang="en-CA" sz="2000" b="1" dirty="0"/>
+          </a:p>
+          <a:p>
+            <a:pPr lvl="2"/>
+            <a:r>
+              <a:rPr lang="en-CA" sz="1600" dirty="0" smtClean="0"/>
+              <a:t>Defines the interface for sending the messages to all observers from the subject.</a:t>
+            </a:r>
+          </a:p>
+          <a:p>
+            <a:pPr lvl="1"/>
+            <a:r>
+              <a:rPr lang="en-CA" sz="2000" b="1" dirty="0" smtClean="0"/>
+              <a:t>Concrete Observer</a:t>
+            </a:r>
+            <a:r>
+              <a:rPr lang="en-CA" sz="2000" b="1" dirty="0"/>
+              <a:t>: </a:t>
+            </a:r>
+          </a:p>
+          <a:p>
+            <a:pPr lvl="2"/>
+            <a:r>
+              <a:rPr lang="en-CA" sz="1600" dirty="0" smtClean="0"/>
+              <a:t>Implements the concrete observer where it receives messages.</a:t>
+            </a:r>
+            <a:endParaRPr lang="en-CA" sz="1600" dirty="0"/>
+          </a:p>
+          <a:p>
+            <a:pPr lvl="1"/>
+            <a:endParaRPr lang="en-CA" sz="1600" dirty="0"/>
+          </a:p>
+          <a:p>
+            <a:pPr lvl="1"/>
+            <a:endParaRPr lang="en-CA" sz="2000" dirty="0"/>
+          </a:p>
+          <a:p>
+            <a:pPr marL="457200" indent="-457200">
+              <a:buFont typeface="Arial" panose="020B0604020202020204" pitchFamily="34" charset="0"/>
+              <a:buChar char="•"/>
+            </a:pPr>
+            <a:r>
+              <a:rPr lang="en-CA" sz="2800" dirty="0" smtClean="0"/>
+              <a:t>Real World Example </a:t>
+            </a:r>
+          </a:p>
+          <a:p>
+            <a:pPr lvl="2"/>
+            <a:r>
+              <a:rPr lang="en-CA" sz="2000" b="1" dirty="0" smtClean="0"/>
+              <a:t>Rx Library of .NET Framework</a:t>
+            </a:r>
+            <a:r>
+              <a:rPr lang="en-CA" sz="2000" dirty="0" smtClean="0"/>
+              <a:t>.</a:t>
+            </a:r>
+          </a:p>
+          <a:p>
+            <a:endParaRPr lang="en-CA" sz="2800" dirty="0"/>
+          </a:p>
+        </p:txBody>
+      </p:sp>
+    </p:spTree>
+    <p:extLst>
+      <p:ext uri="{BB962C8B-B14F-4D97-AF65-F5344CB8AC3E}">
+        <p14:creationId xmlns:p14="http://schemas.microsoft.com/office/powerpoint/2010/main" val="2405723492"/>
       </p:ext>
     </p:extLst>
   </p:cSld>
@@ -4640,7 +8291,7 @@
         </p:nvSpPr>
         <p:spPr>
           <a:xfrm>
-            <a:off x="1771134" y="2364259"/>
+            <a:off x="1771134" y="1532242"/>
             <a:ext cx="8748585" cy="3539430"/>
           </a:xfrm>
           <a:prstGeom prst="rect">
@@ -4662,7 +8313,6 @@
               <a:rPr lang="en-CA" sz="2800" dirty="0" smtClean="0"/>
               <a:t>General solution to a common recurring problem presented on software development</a:t>
             </a:r>
-            <a:endParaRPr lang="en-CA" sz="2800" dirty="0" smtClean="0"/>
           </a:p>
           <a:p>
             <a:pPr marL="285750" indent="-285750">
@@ -4683,7 +8333,6 @@
               <a:rPr lang="en-CA" sz="2800" dirty="0" smtClean="0"/>
               <a:t>Emerges from the experiences of community trying to solve software design problems</a:t>
             </a:r>
-            <a:endParaRPr lang="en-CA" sz="2800" dirty="0" smtClean="0"/>
           </a:p>
           <a:p>
             <a:pPr marL="285750" indent="-285750">
@@ -4694,7 +8343,6 @@
               <a:rPr lang="en-CA" sz="2800" dirty="0" smtClean="0"/>
               <a:t>Abstractions on top of code</a:t>
             </a:r>
-            <a:endParaRPr lang="en-CA" sz="2800" dirty="0" smtClean="0"/>
           </a:p>
           <a:p>
             <a:pPr marL="285750" indent="-285750">
@@ -4705,7 +8353,6 @@
               <a:rPr lang="en-CA" sz="2800" dirty="0" smtClean="0"/>
               <a:t>A framework for developers to exchange experiences on</a:t>
             </a:r>
-            <a:endParaRPr lang="en-CA" sz="2800" dirty="0" smtClean="0"/>
           </a:p>
         </p:txBody>
       </p:sp>
@@ -4778,7 +8425,7 @@
         <p:spPr>
           <a:xfrm>
             <a:off x="1771134" y="2364259"/>
-            <a:ext cx="8748585" cy="1384995"/>
+            <a:ext cx="8748585" cy="1815882"/>
           </a:xfrm>
           <a:prstGeom prst="rect">
             <a:avLst/>
@@ -4799,7 +8446,6 @@
               <a:rPr lang="en-CA" sz="2800" dirty="0" smtClean="0"/>
               <a:t>Are not a finished solution</a:t>
             </a:r>
-            <a:endParaRPr lang="en-CA" sz="2800" dirty="0" smtClean="0"/>
           </a:p>
           <a:p>
             <a:pPr marL="285750" indent="-285750">
@@ -4810,7 +8456,6 @@
               <a:rPr lang="en-CA" sz="2800" dirty="0" smtClean="0"/>
               <a:t>Are not algorithms </a:t>
             </a:r>
-            <a:endParaRPr lang="en-CA" sz="2800" dirty="0" smtClean="0"/>
           </a:p>
           <a:p>
             <a:pPr marL="285750" indent="-285750">
@@ -4819,9 +8464,22 @@
             </a:pPr>
             <a:r>
               <a:rPr lang="en-CA" sz="2800" dirty="0" smtClean="0"/>
-              <a:t>Are not specific implementations of problems</a:t>
-            </a:r>
-            <a:endParaRPr lang="en-CA" sz="2800" dirty="0" smtClean="0"/>
+              <a:t>Are not specific implementations of </a:t>
+            </a:r>
+            <a:r>
+              <a:rPr lang="en-CA" sz="2800" dirty="0" smtClean="0"/>
+              <a:t>problems</a:t>
+            </a:r>
+          </a:p>
+          <a:p>
+            <a:pPr marL="285750" indent="-285750">
+              <a:buFont typeface="Arial" panose="020B0604020202020204" pitchFamily="34" charset="0"/>
+              <a:buChar char="•"/>
+            </a:pPr>
+            <a:r>
+              <a:rPr lang="en-CA" sz="2800" dirty="0" smtClean="0"/>
+              <a:t>Are not a silver bullet that solves software problems</a:t>
+            </a:r>
           </a:p>
         </p:txBody>
       </p:sp>
@@ -4894,7 +8552,7 @@
         <p:spPr>
           <a:xfrm>
             <a:off x="1771134" y="2364259"/>
-            <a:ext cx="8748585" cy="2246769"/>
+            <a:ext cx="8748585" cy="2677656"/>
           </a:xfrm>
           <a:prstGeom prst="rect">
             <a:avLst/>
@@ -4915,6 +8573,46 @@
               <a:rPr lang="en-CA" sz="2800" dirty="0" smtClean="0"/>
               <a:t>Speed up development </a:t>
             </a:r>
+          </a:p>
+          <a:p>
+            <a:pPr marL="285750" indent="-285750">
+              <a:buFont typeface="Arial" panose="020B0604020202020204" pitchFamily="34" charset="0"/>
+              <a:buChar char="•"/>
+            </a:pPr>
+            <a:r>
+              <a:rPr lang="en-CA" sz="2800" dirty="0" smtClean="0"/>
+              <a:t>Gives a shared language between developers</a:t>
+            </a:r>
+          </a:p>
+          <a:p>
+            <a:pPr marL="285750" indent="-285750">
+              <a:buFont typeface="Arial" panose="020B0604020202020204" pitchFamily="34" charset="0"/>
+              <a:buChar char="•"/>
+            </a:pPr>
+            <a:r>
+              <a:rPr lang="en-CA" sz="2800" dirty="0" smtClean="0"/>
+              <a:t>Avoids re-inventing de wheel over and over </a:t>
+            </a:r>
+          </a:p>
+          <a:p>
+            <a:pPr marL="285750" indent="-285750">
+              <a:buFont typeface="Arial" panose="020B0604020202020204" pitchFamily="34" charset="0"/>
+              <a:buChar char="•"/>
+            </a:pPr>
+            <a:r>
+              <a:rPr lang="en-CA" sz="2800" dirty="0" smtClean="0"/>
+              <a:t>Provides a strong proven solution to an specific problem</a:t>
+            </a:r>
+          </a:p>
+          <a:p>
+            <a:pPr marL="285750" indent="-285750">
+              <a:buFont typeface="Arial" panose="020B0604020202020204" pitchFamily="34" charset="0"/>
+              <a:buChar char="•"/>
+            </a:pPr>
+            <a:r>
+              <a:rPr lang="en-CA" sz="2800" dirty="0" smtClean="0"/>
+              <a:t>Improves system and application design </a:t>
+            </a:r>
             <a:endParaRPr lang="en-CA" sz="2800" dirty="0" smtClean="0"/>
           </a:p>
           <a:p>
@@ -4924,38 +8622,9 @@
             </a:pPr>
             <a:r>
               <a:rPr lang="en-CA" sz="2800" dirty="0" smtClean="0"/>
-              <a:t>Gives a shared language between developers</a:t>
-            </a:r>
-          </a:p>
-          <a:p>
-            <a:pPr marL="285750" indent="-285750">
-              <a:buFont typeface="Arial" panose="020B0604020202020204" pitchFamily="34" charset="0"/>
-              <a:buChar char="•"/>
-            </a:pPr>
-            <a:r>
-              <a:rPr lang="en-CA" sz="2800" dirty="0" smtClean="0"/>
-              <a:t>Avoids re-inventing de wheel over and over </a:t>
-            </a:r>
-          </a:p>
-          <a:p>
-            <a:pPr marL="285750" indent="-285750">
-              <a:buFont typeface="Arial" panose="020B0604020202020204" pitchFamily="34" charset="0"/>
-              <a:buChar char="•"/>
-            </a:pPr>
-            <a:r>
-              <a:rPr lang="en-CA" sz="2800" dirty="0" smtClean="0"/>
-              <a:t>Provides a strong proven solution to an specific problem</a:t>
-            </a:r>
-          </a:p>
-          <a:p>
-            <a:pPr marL="285750" indent="-285750">
-              <a:buFont typeface="Arial" panose="020B0604020202020204" pitchFamily="34" charset="0"/>
-              <a:buChar char="•"/>
-            </a:pPr>
-            <a:r>
-              <a:rPr lang="en-CA" sz="2800" dirty="0" smtClean="0"/>
-              <a:t>Improves system and application design </a:t>
-            </a:r>
+              <a:t>Produces a more maintainable solution </a:t>
+            </a:r>
+            <a:endParaRPr lang="en-CA" sz="2800" dirty="0" smtClean="0"/>
           </a:p>
         </p:txBody>
       </p:sp>
@@ -5049,7 +8718,6 @@
               <a:rPr lang="en-CA" sz="2800" dirty="0" smtClean="0"/>
               <a:t>Higher Level Enterprise Patterns </a:t>
             </a:r>
-            <a:endParaRPr lang="en-CA" sz="2800" dirty="0" smtClean="0"/>
           </a:p>
           <a:p>
             <a:pPr marL="285750" indent="-285750">
@@ -5153,7 +8821,6 @@
               <a:rPr lang="en-CA" sz="2800" dirty="0" smtClean="0"/>
               <a:t>Creational</a:t>
             </a:r>
-            <a:endParaRPr lang="en-CA" sz="2800" dirty="0" smtClean="0"/>
           </a:p>
           <a:p>
             <a:pPr marL="285750" indent="-285750">
@@ -5184,7 +8851,6 @@
               <a:rPr lang="en-CA" sz="2800" dirty="0" smtClean="0"/>
               <a:t>Security  </a:t>
             </a:r>
-            <a:endParaRPr lang="en-CA" sz="2800" dirty="0" smtClean="0"/>
           </a:p>
           <a:p>
             <a:pPr marL="285750" indent="-285750">
@@ -5205,7 +8871,6 @@
               <a:rPr lang="en-CA" sz="2800" dirty="0" smtClean="0"/>
               <a:t>Messaging</a:t>
             </a:r>
-            <a:endParaRPr lang="en-CA" sz="2800" dirty="0" smtClean="0"/>
           </a:p>
           <a:p>
             <a:pPr marL="285750" indent="-285750">
@@ -5246,7 +8911,6 @@
               <a:rPr lang="en-CA" sz="2800" dirty="0" smtClean="0"/>
               <a:t>Distributed</a:t>
             </a:r>
-            <a:endParaRPr lang="en-CA" sz="2800" dirty="0" smtClean="0"/>
           </a:p>
           <a:p>
             <a:pPr marL="285750" indent="-285750">
@@ -5277,7 +8941,6 @@
               <a:rPr lang="en-CA" sz="2800" dirty="0" smtClean="0"/>
               <a:t>Architectural</a:t>
             </a:r>
-            <a:endParaRPr lang="en-CA" sz="2800" dirty="0" smtClean="0"/>
           </a:p>
           <a:p>
             <a:endParaRPr lang="en-CA" sz="2800" dirty="0" smtClean="0"/>
@@ -5421,7 +9084,6 @@
               <a:rPr lang="en-CA" sz="2800" dirty="0" smtClean="0"/>
               <a:t>Real World Example</a:t>
             </a:r>
-            <a:endParaRPr lang="en-CA" sz="2800" dirty="0" smtClean="0"/>
           </a:p>
         </p:txBody>
       </p:sp>

</xml_diff>

<commit_message>
Added the chain of responsibility and template method
</commit_message>
<xml_diff>
--- a/DesignPatterns101.pptx
+++ b/DesignPatterns101.pptx
@@ -3778,7 +3778,7 @@
         <p:spPr>
           <a:xfrm>
             <a:off x="502507" y="766416"/>
-            <a:ext cx="8748585" cy="4278094"/>
+            <a:ext cx="8748585" cy="3847207"/>
           </a:xfrm>
           <a:prstGeom prst="rect">
             <a:avLst/>
@@ -3857,16 +3857,13 @@
             </a:pPr>
             <a:r>
               <a:rPr lang="en-CA" sz="2800" dirty="0" smtClean="0"/>
-              <a:t>Real World Example </a:t>
-            </a:r>
-          </a:p>
-          <a:p>
-            <a:pPr lvl="1"/>
-            <a:r>
-              <a:rPr lang="en-CA" sz="2800" dirty="0" smtClean="0"/>
-              <a:t>System.</a:t>
-            </a:r>
-            <a:endParaRPr lang="en-CA" sz="2800" dirty="0"/>
+              <a:t>Real World </a:t>
+            </a:r>
+            <a:r>
+              <a:rPr lang="en-CA" sz="2800" smtClean="0"/>
+              <a:t>Example </a:t>
+            </a:r>
+            <a:endParaRPr lang="en-CA" sz="2800" dirty="0" smtClean="0"/>
           </a:p>
         </p:txBody>
       </p:sp>

</xml_diff>